<commit_message>
Added Traveling for Outside Basinhold
</commit_message>
<xml_diff>
--- a/Banners/Banners.pptx
+++ b/Banners/Banners.pptx
@@ -23,6 +23,7 @@
     <p:sldId id="268" r:id="rId18"/>
     <p:sldId id="269" r:id="rId19"/>
     <p:sldId id="270" r:id="rId20"/>
+    <p:sldId id="271" r:id="rId21"/>
   </p:sldIdLst>
   <p:sldSz cy="5143500" cx="9144000"/>
   <p:notesSz cx="6858000" cy="9144000"/>
@@ -782,239 +783,455 @@
               <a:spcAft>
                 <a:spcPts val="0"/>
               </a:spcAft>
-              <a:buNone/>
-            </a:pPr>
-            <a:r>
-              <a:rPr lang="en"/>
+              <a:buClr>
+                <a:schemeClr val="dk1"/>
+              </a:buClr>
+              <a:buSzPts val="1100"/>
+              <a:buFont typeface="Arial"/>
+              <a:buNone/>
+            </a:pPr>
+            <a:r>
+              <a:rPr lang="en">
+                <a:solidFill>
+                  <a:schemeClr val="dk1"/>
+                </a:solidFill>
+              </a:rPr>
               <a:t>1 - Central Minaria</a:t>
             </a:r>
-            <a:endParaRPr/>
-          </a:p>
-          <a:p>
-            <a:pPr indent="0" lvl="0" marL="0" rtl="0" algn="l">
-              <a:spcBef>
-                <a:spcPts val="0"/>
-              </a:spcBef>
-              <a:spcAft>
-                <a:spcPts val="0"/>
-              </a:spcAft>
-              <a:buNone/>
-            </a:pPr>
-            <a:r>
-              <a:rPr lang="en"/>
+            <a:endParaRPr>
+              <a:solidFill>
+                <a:schemeClr val="dk1"/>
+              </a:solidFill>
+            </a:endParaRPr>
+          </a:p>
+          <a:p>
+            <a:pPr indent="0" lvl="0" marL="0" rtl="0" algn="l">
+              <a:spcBef>
+                <a:spcPts val="0"/>
+              </a:spcBef>
+              <a:spcAft>
+                <a:spcPts val="0"/>
+              </a:spcAft>
+              <a:buClr>
+                <a:schemeClr val="dk1"/>
+              </a:buClr>
+              <a:buSzPts val="1100"/>
+              <a:buFont typeface="Arial"/>
+              <a:buNone/>
+            </a:pPr>
+            <a:r>
+              <a:rPr lang="en">
+                <a:solidFill>
+                  <a:schemeClr val="dk1"/>
+                </a:solidFill>
+              </a:rPr>
               <a:t>2 - Chauntea</a:t>
             </a:r>
-            <a:endParaRPr/>
-          </a:p>
-          <a:p>
-            <a:pPr indent="0" lvl="0" marL="0" rtl="0" algn="l">
-              <a:spcBef>
-                <a:spcPts val="0"/>
-              </a:spcBef>
-              <a:spcAft>
-                <a:spcPts val="0"/>
-              </a:spcAft>
-              <a:buNone/>
-            </a:pPr>
-            <a:r>
-              <a:rPr lang="en"/>
+            <a:endParaRPr>
+              <a:solidFill>
+                <a:schemeClr val="dk1"/>
+              </a:solidFill>
+            </a:endParaRPr>
+          </a:p>
+          <a:p>
+            <a:pPr indent="0" lvl="0" marL="0" rtl="0" algn="l">
+              <a:spcBef>
+                <a:spcPts val="0"/>
+              </a:spcBef>
+              <a:spcAft>
+                <a:spcPts val="0"/>
+              </a:spcAft>
+              <a:buClr>
+                <a:schemeClr val="dk1"/>
+              </a:buClr>
+              <a:buSzPts val="1100"/>
+              <a:buFont typeface="Arial"/>
+              <a:buNone/>
+            </a:pPr>
+            <a:r>
+              <a:rPr lang="en">
+                <a:solidFill>
+                  <a:schemeClr val="dk1"/>
+                </a:solidFill>
+              </a:rPr>
               <a:t>3 - East Side Minaria</a:t>
             </a:r>
-            <a:endParaRPr/>
-          </a:p>
-          <a:p>
-            <a:pPr indent="0" lvl="0" marL="0" rtl="0" algn="l">
-              <a:spcBef>
-                <a:spcPts val="0"/>
-              </a:spcBef>
-              <a:spcAft>
-                <a:spcPts val="0"/>
-              </a:spcAft>
-              <a:buNone/>
-            </a:pPr>
-            <a:r>
-              <a:rPr lang="en"/>
+            <a:endParaRPr>
+              <a:solidFill>
+                <a:schemeClr val="dk1"/>
+              </a:solidFill>
+            </a:endParaRPr>
+          </a:p>
+          <a:p>
+            <a:pPr indent="0" lvl="0" marL="0" rtl="0" algn="l">
+              <a:spcBef>
+                <a:spcPts val="0"/>
+              </a:spcBef>
+              <a:spcAft>
+                <a:spcPts val="0"/>
+              </a:spcAft>
+              <a:buClr>
+                <a:schemeClr val="dk1"/>
+              </a:buClr>
+              <a:buSzPts val="1100"/>
+              <a:buFont typeface="Arial"/>
+              <a:buNone/>
+            </a:pPr>
+            <a:r>
+              <a:rPr lang="en">
+                <a:solidFill>
+                  <a:schemeClr val="dk1"/>
+                </a:solidFill>
+              </a:rPr>
               <a:t>4 - Exynn</a:t>
             </a:r>
-            <a:endParaRPr/>
-          </a:p>
-          <a:p>
-            <a:pPr indent="0" lvl="0" marL="0" rtl="0" algn="l">
-              <a:spcBef>
-                <a:spcPts val="0"/>
-              </a:spcBef>
-              <a:spcAft>
-                <a:spcPts val="0"/>
-              </a:spcAft>
-              <a:buNone/>
-            </a:pPr>
-            <a:r>
-              <a:rPr lang="en"/>
+            <a:endParaRPr>
+              <a:solidFill>
+                <a:schemeClr val="dk1"/>
+              </a:solidFill>
+            </a:endParaRPr>
+          </a:p>
+          <a:p>
+            <a:pPr indent="0" lvl="0" marL="0" rtl="0" algn="l">
+              <a:spcBef>
+                <a:spcPts val="0"/>
+              </a:spcBef>
+              <a:spcAft>
+                <a:spcPts val="0"/>
+              </a:spcAft>
+              <a:buClr>
+                <a:schemeClr val="dk1"/>
+              </a:buClr>
+              <a:buSzPts val="1100"/>
+              <a:buFont typeface="Arial"/>
+              <a:buNone/>
+            </a:pPr>
+            <a:r>
+              <a:rPr lang="en">
+                <a:solidFill>
+                  <a:schemeClr val="dk1"/>
+                </a:solidFill>
+              </a:rPr>
               <a:t>5 - Flatcoat</a:t>
             </a:r>
-            <a:endParaRPr/>
-          </a:p>
-          <a:p>
-            <a:pPr indent="0" lvl="0" marL="0" rtl="0" algn="l">
-              <a:spcBef>
-                <a:spcPts val="0"/>
-              </a:spcBef>
-              <a:spcAft>
-                <a:spcPts val="0"/>
-              </a:spcAft>
-              <a:buNone/>
-            </a:pPr>
-            <a:r>
-              <a:rPr lang="en"/>
+            <a:endParaRPr>
+              <a:solidFill>
+                <a:schemeClr val="dk1"/>
+              </a:solidFill>
+            </a:endParaRPr>
+          </a:p>
+          <a:p>
+            <a:pPr indent="0" lvl="0" marL="0" rtl="0" algn="l">
+              <a:spcBef>
+                <a:spcPts val="0"/>
+              </a:spcBef>
+              <a:spcAft>
+                <a:spcPts val="0"/>
+              </a:spcAft>
+              <a:buClr>
+                <a:schemeClr val="dk1"/>
+              </a:buClr>
+              <a:buSzPts val="1100"/>
+              <a:buFont typeface="Arial"/>
+              <a:buNone/>
+            </a:pPr>
+            <a:r>
+              <a:rPr lang="en">
+                <a:solidFill>
+                  <a:schemeClr val="dk1"/>
+                </a:solidFill>
+              </a:rPr>
               <a:t>6 - Grumbar</a:t>
             </a:r>
-            <a:endParaRPr/>
-          </a:p>
-          <a:p>
-            <a:pPr indent="0" lvl="0" marL="0" rtl="0" algn="l">
-              <a:spcBef>
-                <a:spcPts val="0"/>
-              </a:spcBef>
-              <a:spcAft>
-                <a:spcPts val="0"/>
-              </a:spcAft>
-              <a:buNone/>
-            </a:pPr>
-            <a:r>
-              <a:rPr lang="en"/>
+            <a:endParaRPr>
+              <a:solidFill>
+                <a:schemeClr val="dk1"/>
+              </a:solidFill>
+            </a:endParaRPr>
+          </a:p>
+          <a:p>
+            <a:pPr indent="0" lvl="0" marL="0" rtl="0" algn="l">
+              <a:spcBef>
+                <a:spcPts val="0"/>
+              </a:spcBef>
+              <a:spcAft>
+                <a:spcPts val="0"/>
+              </a:spcAft>
+              <a:buClr>
+                <a:schemeClr val="dk1"/>
+              </a:buClr>
+              <a:buSzPts val="1100"/>
+              <a:buFont typeface="Arial"/>
+              <a:buNone/>
+            </a:pPr>
+            <a:r>
+              <a:rPr lang="en">
+                <a:solidFill>
+                  <a:schemeClr val="dk1"/>
+                </a:solidFill>
+              </a:rPr>
               <a:t>7 - Holdfast</a:t>
             </a:r>
-            <a:endParaRPr/>
-          </a:p>
-          <a:p>
-            <a:pPr indent="0" lvl="0" marL="0" rtl="0" algn="l">
-              <a:spcBef>
-                <a:spcPts val="0"/>
-              </a:spcBef>
-              <a:spcAft>
-                <a:spcPts val="0"/>
-              </a:spcAft>
-              <a:buNone/>
-            </a:pPr>
-            <a:r>
-              <a:rPr lang="en"/>
+            <a:endParaRPr>
+              <a:solidFill>
+                <a:schemeClr val="dk1"/>
+              </a:solidFill>
+            </a:endParaRPr>
+          </a:p>
+          <a:p>
+            <a:pPr indent="0" lvl="0" marL="0" rtl="0" algn="l">
+              <a:spcBef>
+                <a:spcPts val="0"/>
+              </a:spcBef>
+              <a:spcAft>
+                <a:spcPts val="0"/>
+              </a:spcAft>
+              <a:buClr>
+                <a:schemeClr val="dk1"/>
+              </a:buClr>
+              <a:buSzPts val="1100"/>
+              <a:buFont typeface="Arial"/>
+              <a:buNone/>
+            </a:pPr>
+            <a:r>
+              <a:rPr lang="en">
+                <a:solidFill>
+                  <a:schemeClr val="dk1"/>
+                </a:solidFill>
+              </a:rPr>
               <a:t>8 - Justice Bringers</a:t>
             </a:r>
-            <a:endParaRPr/>
-          </a:p>
-          <a:p>
-            <a:pPr indent="0" lvl="0" marL="0" rtl="0" algn="l">
-              <a:spcBef>
-                <a:spcPts val="0"/>
-              </a:spcBef>
-              <a:spcAft>
-                <a:spcPts val="0"/>
-              </a:spcAft>
-              <a:buNone/>
-            </a:pPr>
-            <a:r>
-              <a:rPr lang="en"/>
+            <a:endParaRPr>
+              <a:solidFill>
+                <a:schemeClr val="dk1"/>
+              </a:solidFill>
+            </a:endParaRPr>
+          </a:p>
+          <a:p>
+            <a:pPr indent="0" lvl="0" marL="0" rtl="0" algn="l">
+              <a:spcBef>
+                <a:spcPts val="0"/>
+              </a:spcBef>
+              <a:spcAft>
+                <a:spcPts val="0"/>
+              </a:spcAft>
+              <a:buClr>
+                <a:schemeClr val="dk1"/>
+              </a:buClr>
+              <a:buSzPts val="1100"/>
+              <a:buFont typeface="Arial"/>
+              <a:buNone/>
+            </a:pPr>
+            <a:r>
+              <a:rPr lang="en">
+                <a:solidFill>
+                  <a:schemeClr val="dk1"/>
+                </a:solidFill>
+              </a:rPr>
               <a:t>9 - Kelemvor</a:t>
             </a:r>
-            <a:endParaRPr/>
-          </a:p>
-          <a:p>
-            <a:pPr indent="0" lvl="0" marL="0" rtl="0" algn="l">
-              <a:spcBef>
-                <a:spcPts val="0"/>
-              </a:spcBef>
-              <a:spcAft>
-                <a:spcPts val="0"/>
-              </a:spcAft>
-              <a:buNone/>
-            </a:pPr>
-            <a:r>
-              <a:rPr lang="en"/>
+            <a:endParaRPr>
+              <a:solidFill>
+                <a:schemeClr val="dk1"/>
+              </a:solidFill>
+            </a:endParaRPr>
+          </a:p>
+          <a:p>
+            <a:pPr indent="0" lvl="0" marL="0" rtl="0" algn="l">
+              <a:spcBef>
+                <a:spcPts val="0"/>
+              </a:spcBef>
+              <a:spcAft>
+                <a:spcPts val="0"/>
+              </a:spcAft>
+              <a:buClr>
+                <a:schemeClr val="dk1"/>
+              </a:buClr>
+              <a:buSzPts val="1100"/>
+              <a:buFont typeface="Arial"/>
+              <a:buNone/>
+            </a:pPr>
+            <a:r>
+              <a:rPr lang="en">
+                <a:solidFill>
+                  <a:schemeClr val="dk1"/>
+                </a:solidFill>
+              </a:rPr>
               <a:t>10 - Minaria</a:t>
             </a:r>
-            <a:endParaRPr/>
-          </a:p>
-          <a:p>
-            <a:pPr indent="0" lvl="0" marL="0" rtl="0" algn="l">
-              <a:spcBef>
-                <a:spcPts val="0"/>
-              </a:spcBef>
-              <a:spcAft>
-                <a:spcPts val="0"/>
-              </a:spcAft>
-              <a:buNone/>
-            </a:pPr>
-            <a:r>
-              <a:rPr lang="en"/>
+            <a:endParaRPr>
+              <a:solidFill>
+                <a:schemeClr val="dk1"/>
+              </a:solidFill>
+            </a:endParaRPr>
+          </a:p>
+          <a:p>
+            <a:pPr indent="0" lvl="0" marL="0" rtl="0" algn="l">
+              <a:spcBef>
+                <a:spcPts val="0"/>
+              </a:spcBef>
+              <a:spcAft>
+                <a:spcPts val="0"/>
+              </a:spcAft>
+              <a:buClr>
+                <a:schemeClr val="dk1"/>
+              </a:buClr>
+              <a:buSzPts val="1100"/>
+              <a:buFont typeface="Arial"/>
+              <a:buNone/>
+            </a:pPr>
+            <a:r>
+              <a:rPr lang="en">
+                <a:solidFill>
+                  <a:schemeClr val="dk1"/>
+                </a:solidFill>
+              </a:rPr>
               <a:t>11 - Myrkul</a:t>
             </a:r>
-            <a:endParaRPr/>
-          </a:p>
-          <a:p>
-            <a:pPr indent="0" lvl="0" marL="0" rtl="0" algn="l">
-              <a:spcBef>
-                <a:spcPts val="0"/>
-              </a:spcBef>
-              <a:spcAft>
-                <a:spcPts val="0"/>
-              </a:spcAft>
-              <a:buNone/>
-            </a:pPr>
-            <a:r>
-              <a:rPr lang="en"/>
+            <a:endParaRPr>
+              <a:solidFill>
+                <a:schemeClr val="dk1"/>
+              </a:solidFill>
+            </a:endParaRPr>
+          </a:p>
+          <a:p>
+            <a:pPr indent="0" lvl="0" marL="0" rtl="0" algn="l">
+              <a:spcBef>
+                <a:spcPts val="0"/>
+              </a:spcBef>
+              <a:spcAft>
+                <a:spcPts val="0"/>
+              </a:spcAft>
+              <a:buClr>
+                <a:schemeClr val="dk1"/>
+              </a:buClr>
+              <a:buSzPts val="1100"/>
+              <a:buFont typeface="Arial"/>
+              <a:buNone/>
+            </a:pPr>
+            <a:r>
+              <a:rPr lang="en">
+                <a:solidFill>
+                  <a:schemeClr val="dk1"/>
+                </a:solidFill>
+              </a:rPr>
               <a:t>12 - Talos</a:t>
             </a:r>
-            <a:endParaRPr/>
-          </a:p>
-          <a:p>
-            <a:pPr indent="0" lvl="0" marL="0" rtl="0" algn="l">
-              <a:spcBef>
-                <a:spcPts val="0"/>
-              </a:spcBef>
-              <a:spcAft>
-                <a:spcPts val="0"/>
-              </a:spcAft>
-              <a:buNone/>
-            </a:pPr>
-            <a:r>
-              <a:rPr lang="en"/>
-              <a:t>13 - </a:t>
-            </a:r>
-            <a:r>
-              <a:rPr lang="en"/>
-              <a:t>Veronna</a:t>
-            </a:r>
-            <a:endParaRPr/>
-          </a:p>
-          <a:p>
-            <a:pPr indent="0" lvl="0" marL="0" rtl="0" algn="l">
-              <a:spcBef>
-                <a:spcPts val="0"/>
-              </a:spcBef>
-              <a:spcAft>
-                <a:spcPts val="0"/>
-              </a:spcAft>
-              <a:buNone/>
-            </a:pPr>
-            <a:r>
-              <a:rPr lang="en"/>
+            <a:endParaRPr>
+              <a:solidFill>
+                <a:schemeClr val="dk1"/>
+              </a:solidFill>
+            </a:endParaRPr>
+          </a:p>
+          <a:p>
+            <a:pPr indent="0" lvl="0" marL="0" rtl="0" algn="l">
+              <a:spcBef>
+                <a:spcPts val="0"/>
+              </a:spcBef>
+              <a:spcAft>
+                <a:spcPts val="0"/>
+              </a:spcAft>
+              <a:buClr>
+                <a:schemeClr val="dk1"/>
+              </a:buClr>
+              <a:buSzPts val="1100"/>
+              <a:buFont typeface="Arial"/>
+              <a:buNone/>
+            </a:pPr>
+            <a:r>
+              <a:rPr lang="en">
+                <a:solidFill>
+                  <a:schemeClr val="dk1"/>
+                </a:solidFill>
+              </a:rPr>
+              <a:t>13 - Veronna</a:t>
+            </a:r>
+            <a:endParaRPr>
+              <a:solidFill>
+                <a:schemeClr val="dk1"/>
+              </a:solidFill>
+            </a:endParaRPr>
+          </a:p>
+          <a:p>
+            <a:pPr indent="0" lvl="0" marL="0" rtl="0" algn="l">
+              <a:spcBef>
+                <a:spcPts val="0"/>
+              </a:spcBef>
+              <a:spcAft>
+                <a:spcPts val="0"/>
+              </a:spcAft>
+              <a:buClr>
+                <a:schemeClr val="dk1"/>
+              </a:buClr>
+              <a:buSzPts val="1100"/>
+              <a:buFont typeface="Arial"/>
+              <a:buNone/>
+            </a:pPr>
+            <a:r>
+              <a:rPr lang="en">
+                <a:solidFill>
+                  <a:schemeClr val="dk1"/>
+                </a:solidFill>
+              </a:rPr>
               <a:t>14 - West Side Minaria</a:t>
             </a:r>
-            <a:endParaRPr/>
-          </a:p>
-          <a:p>
-            <a:pPr indent="0" lvl="0" marL="0" rtl="0" algn="l">
-              <a:spcBef>
-                <a:spcPts val="0"/>
-              </a:spcBef>
-              <a:spcAft>
-                <a:spcPts val="0"/>
-              </a:spcAft>
-              <a:buNone/>
-            </a:pPr>
-            <a:r>
-              <a:rPr lang="en"/>
+            <a:endParaRPr>
+              <a:solidFill>
+                <a:schemeClr val="dk1"/>
+              </a:solidFill>
+            </a:endParaRPr>
+          </a:p>
+          <a:p>
+            <a:pPr indent="0" lvl="0" marL="0" rtl="0" algn="l">
+              <a:spcBef>
+                <a:spcPts val="0"/>
+              </a:spcBef>
+              <a:spcAft>
+                <a:spcPts val="0"/>
+              </a:spcAft>
+              <a:buClr>
+                <a:schemeClr val="dk1"/>
+              </a:buClr>
+              <a:buSzPts val="1100"/>
+              <a:buFont typeface="Arial"/>
+              <a:buNone/>
+            </a:pPr>
+            <a:r>
+              <a:rPr lang="en">
+                <a:solidFill>
+                  <a:schemeClr val="dk1"/>
+                </a:solidFill>
+              </a:rPr>
               <a:t>15 - Zehir</a:t>
+            </a:r>
+            <a:endParaRPr>
+              <a:solidFill>
+                <a:schemeClr val="dk1"/>
+              </a:solidFill>
+            </a:endParaRPr>
+          </a:p>
+          <a:p>
+            <a:pPr indent="0" lvl="0" marL="0" rtl="0" algn="l">
+              <a:spcBef>
+                <a:spcPts val="0"/>
+              </a:spcBef>
+              <a:spcAft>
+                <a:spcPts val="0"/>
+              </a:spcAft>
+              <a:buClr>
+                <a:schemeClr val="dk1"/>
+              </a:buClr>
+              <a:buSzPts val="1100"/>
+              <a:buFont typeface="Arial"/>
+              <a:buNone/>
+            </a:pPr>
+            <a:r>
+              <a:rPr lang="en">
+                <a:solidFill>
+                  <a:schemeClr val="dk1"/>
+                </a:solidFill>
+              </a:rPr>
+              <a:t>16 - Hadaar</a:t>
             </a:r>
             <a:endParaRPr/>
           </a:p>
@@ -1531,7 +1748,40 @@
               </a:rPr>
               <a:t>15 - Zehir</a:t>
             </a:r>
-            <a:endParaRPr/>
+            <a:endParaRPr>
+              <a:solidFill>
+                <a:schemeClr val="dk1"/>
+              </a:solidFill>
+            </a:endParaRPr>
+          </a:p>
+          <a:p>
+            <a:pPr indent="0" lvl="0" marL="0" rtl="0" algn="l">
+              <a:spcBef>
+                <a:spcPts val="0"/>
+              </a:spcBef>
+              <a:spcAft>
+                <a:spcPts val="0"/>
+              </a:spcAft>
+              <a:buClr>
+                <a:schemeClr val="dk1"/>
+              </a:buClr>
+              <a:buSzPts val="1100"/>
+              <a:buFont typeface="Arial"/>
+              <a:buNone/>
+            </a:pPr>
+            <a:r>
+              <a:rPr lang="en">
+                <a:solidFill>
+                  <a:schemeClr val="dk1"/>
+                </a:solidFill>
+              </a:rPr>
+              <a:t>16 - Hadaar</a:t>
+            </a:r>
+            <a:endParaRPr>
+              <a:solidFill>
+                <a:schemeClr val="dk1"/>
+              </a:solidFill>
+            </a:endParaRPr>
           </a:p>
         </p:txBody>
       </p:sp>
@@ -2046,7 +2296,40 @@
               </a:rPr>
               <a:t>15 - Zehir</a:t>
             </a:r>
-            <a:endParaRPr/>
+            <a:endParaRPr>
+              <a:solidFill>
+                <a:schemeClr val="dk1"/>
+              </a:solidFill>
+            </a:endParaRPr>
+          </a:p>
+          <a:p>
+            <a:pPr indent="0" lvl="0" marL="0" rtl="0" algn="l">
+              <a:spcBef>
+                <a:spcPts val="0"/>
+              </a:spcBef>
+              <a:spcAft>
+                <a:spcPts val="0"/>
+              </a:spcAft>
+              <a:buClr>
+                <a:schemeClr val="dk1"/>
+              </a:buClr>
+              <a:buSzPts val="1100"/>
+              <a:buFont typeface="Arial"/>
+              <a:buNone/>
+            </a:pPr>
+            <a:r>
+              <a:rPr lang="en">
+                <a:solidFill>
+                  <a:schemeClr val="dk1"/>
+                </a:solidFill>
+              </a:rPr>
+              <a:t>16 - Hadaar</a:t>
+            </a:r>
+            <a:endParaRPr>
+              <a:solidFill>
+                <a:schemeClr val="dk1"/>
+              </a:solidFill>
+            </a:endParaRPr>
           </a:p>
         </p:txBody>
       </p:sp>
@@ -2561,7 +2844,40 @@
               </a:rPr>
               <a:t>15 - Zehir</a:t>
             </a:r>
-            <a:endParaRPr/>
+            <a:endParaRPr>
+              <a:solidFill>
+                <a:schemeClr val="dk1"/>
+              </a:solidFill>
+            </a:endParaRPr>
+          </a:p>
+          <a:p>
+            <a:pPr indent="0" lvl="0" marL="0" rtl="0" algn="l">
+              <a:spcBef>
+                <a:spcPts val="0"/>
+              </a:spcBef>
+              <a:spcAft>
+                <a:spcPts val="0"/>
+              </a:spcAft>
+              <a:buClr>
+                <a:schemeClr val="dk1"/>
+              </a:buClr>
+              <a:buSzPts val="1100"/>
+              <a:buFont typeface="Arial"/>
+              <a:buNone/>
+            </a:pPr>
+            <a:r>
+              <a:rPr lang="en">
+                <a:solidFill>
+                  <a:schemeClr val="dk1"/>
+                </a:solidFill>
+              </a:rPr>
+              <a:t>16 - Hadaar</a:t>
+            </a:r>
+            <a:endParaRPr>
+              <a:solidFill>
+                <a:schemeClr val="dk1"/>
+              </a:solidFill>
+            </a:endParaRPr>
           </a:p>
         </p:txBody>
       </p:sp>
@@ -3076,7 +3392,40 @@
               </a:rPr>
               <a:t>15 - Zehir</a:t>
             </a:r>
-            <a:endParaRPr/>
+            <a:endParaRPr>
+              <a:solidFill>
+                <a:schemeClr val="dk1"/>
+              </a:solidFill>
+            </a:endParaRPr>
+          </a:p>
+          <a:p>
+            <a:pPr indent="0" lvl="0" marL="0" rtl="0" algn="l">
+              <a:spcBef>
+                <a:spcPts val="0"/>
+              </a:spcBef>
+              <a:spcAft>
+                <a:spcPts val="0"/>
+              </a:spcAft>
+              <a:buClr>
+                <a:schemeClr val="dk1"/>
+              </a:buClr>
+              <a:buSzPts val="1100"/>
+              <a:buFont typeface="Arial"/>
+              <a:buNone/>
+            </a:pPr>
+            <a:r>
+              <a:rPr lang="en">
+                <a:solidFill>
+                  <a:schemeClr val="dk1"/>
+                </a:solidFill>
+              </a:rPr>
+              <a:t>16 - Hadaar</a:t>
+            </a:r>
+            <a:endParaRPr>
+              <a:solidFill>
+                <a:schemeClr val="dk1"/>
+              </a:solidFill>
+            </a:endParaRPr>
           </a:p>
         </p:txBody>
       </p:sp>
@@ -3591,7 +3940,40 @@
               </a:rPr>
               <a:t>15 - Zehir</a:t>
             </a:r>
-            <a:endParaRPr/>
+            <a:endParaRPr>
+              <a:solidFill>
+                <a:schemeClr val="dk1"/>
+              </a:solidFill>
+            </a:endParaRPr>
+          </a:p>
+          <a:p>
+            <a:pPr indent="0" lvl="0" marL="0" rtl="0" algn="l">
+              <a:spcBef>
+                <a:spcPts val="0"/>
+              </a:spcBef>
+              <a:spcAft>
+                <a:spcPts val="0"/>
+              </a:spcAft>
+              <a:buClr>
+                <a:schemeClr val="dk1"/>
+              </a:buClr>
+              <a:buSzPts val="1100"/>
+              <a:buFont typeface="Arial"/>
+              <a:buNone/>
+            </a:pPr>
+            <a:r>
+              <a:rPr lang="en">
+                <a:solidFill>
+                  <a:schemeClr val="dk1"/>
+                </a:solidFill>
+              </a:rPr>
+              <a:t>16 - Hadaar</a:t>
+            </a:r>
+            <a:endParaRPr>
+              <a:solidFill>
+                <a:schemeClr val="dk1"/>
+              </a:solidFill>
+            </a:endParaRPr>
           </a:p>
         </p:txBody>
       </p:sp>
@@ -4106,7 +4488,588 @@
               </a:rPr>
               <a:t>15 - Zehir</a:t>
             </a:r>
-            <a:endParaRPr/>
+            <a:endParaRPr>
+              <a:solidFill>
+                <a:schemeClr val="dk1"/>
+              </a:solidFill>
+            </a:endParaRPr>
+          </a:p>
+          <a:p>
+            <a:pPr indent="0" lvl="0" marL="0" rtl="0" algn="l">
+              <a:spcBef>
+                <a:spcPts val="0"/>
+              </a:spcBef>
+              <a:spcAft>
+                <a:spcPts val="0"/>
+              </a:spcAft>
+              <a:buClr>
+                <a:schemeClr val="dk1"/>
+              </a:buClr>
+              <a:buSzPts val="1100"/>
+              <a:buFont typeface="Arial"/>
+              <a:buNone/>
+            </a:pPr>
+            <a:r>
+              <a:rPr lang="en">
+                <a:solidFill>
+                  <a:schemeClr val="dk1"/>
+                </a:solidFill>
+              </a:rPr>
+              <a:t>16 - Hadaar</a:t>
+            </a:r>
+            <a:endParaRPr>
+              <a:solidFill>
+                <a:schemeClr val="dk1"/>
+              </a:solidFill>
+            </a:endParaRPr>
+          </a:p>
+        </p:txBody>
+      </p:sp>
+    </p:spTree>
+  </p:cSld>
+  <p:clrMapOvr>
+    <a:masterClrMapping/>
+  </p:clrMapOvr>
+</p:notes>
+</file>
+
+<file path=ppt/notesSlides/notesSlide16.xml><?xml version="1.0" encoding="utf-8"?>
+<p:notes xmlns:a="http://schemas.openxmlformats.org/drawingml/2006/main" xmlns:r="http://schemas.openxmlformats.org/officeDocument/2006/relationships" xmlns:mc="http://schemas.openxmlformats.org/markup-compatibility/2006" xmlns:mv="urn:schemas-microsoft-com:mac:vml" xmlns:p="http://schemas.openxmlformats.org/presentationml/2006/main" xmlns:c="http://schemas.openxmlformats.org/drawingml/2006/chart" xmlns:dgm="http://schemas.openxmlformats.org/drawingml/2006/diagram" xmlns:o="urn:schemas-microsoft-com:office:office" xmlns:v="urn:schemas-microsoft-com:vml" xmlns:pvml="urn:schemas-microsoft-com:office:powerpoint" xmlns:com="http://schemas.openxmlformats.org/drawingml/2006/compatibility" xmlns:p14="http://schemas.microsoft.com/office/powerpoint/2010/main" xmlns:p15="http://schemas.microsoft.com/office/powerpoint/2012/main" xmlns:ahyp="http://schemas.microsoft.com/office/drawing/2018/hyperlinkcolor" showMasterPhAnim="0" showMasterSp="0">
+  <p:cSld>
+    <p:spTree>
+      <p:nvGrpSpPr>
+        <p:cNvPr id="125" name="Shape 125"/>
+        <p:cNvGrpSpPr/>
+        <p:nvPr/>
+      </p:nvGrpSpPr>
+      <p:grpSpPr>
+        <a:xfrm>
+          <a:off x="0" y="0"/>
+          <a:ext cx="0" cy="0"/>
+          <a:chOff x="0" y="0"/>
+          <a:chExt cx="0" cy="0"/>
+        </a:xfrm>
+      </p:grpSpPr>
+      <p:sp>
+        <p:nvSpPr>
+          <p:cNvPr id="126" name="Google Shape;126;g22cc5dae5d2_0_0:notes"/>
+          <p:cNvSpPr/>
+          <p:nvPr>
+            <p:ph idx="2" type="sldImg"/>
+          </p:nvPr>
+        </p:nvSpPr>
+        <p:spPr>
+          <a:xfrm>
+            <a:off x="381300" y="685800"/>
+            <a:ext cx="6096000" cy="3429000"/>
+          </a:xfrm>
+          <a:custGeom>
+            <a:rect b="b" l="l" r="r" t="t"/>
+            <a:pathLst>
+              <a:path extrusionOk="0" h="120000" w="120000">
+                <a:moveTo>
+                  <a:pt x="0" y="0"/>
+                </a:moveTo>
+                <a:lnTo>
+                  <a:pt x="120000" y="0"/>
+                </a:lnTo>
+                <a:lnTo>
+                  <a:pt x="120000" y="120000"/>
+                </a:lnTo>
+                <a:lnTo>
+                  <a:pt x="0" y="120000"/>
+                </a:lnTo>
+                <a:close/>
+              </a:path>
+            </a:pathLst>
+          </a:custGeom>
+        </p:spPr>
+      </p:sp>
+      <p:sp>
+        <p:nvSpPr>
+          <p:cNvPr id="127" name="Google Shape;127;g22cc5dae5d2_0_0:notes"/>
+          <p:cNvSpPr txBox="1"/>
+          <p:nvPr>
+            <p:ph idx="1" type="body"/>
+          </p:nvPr>
+        </p:nvSpPr>
+        <p:spPr>
+          <a:xfrm>
+            <a:off x="685800" y="4343400"/>
+            <a:ext cx="5486400" cy="4114800"/>
+          </a:xfrm>
+          <a:prstGeom prst="rect">
+            <a:avLst/>
+          </a:prstGeom>
+        </p:spPr>
+        <p:txBody>
+          <a:bodyPr anchorCtr="0" anchor="t" bIns="91425" lIns="91425" spcFirstLastPara="1" rIns="91425" wrap="square" tIns="91425">
+            <a:noAutofit/>
+          </a:bodyPr>
+          <a:lstStyle/>
+          <a:p>
+            <a:pPr indent="0" lvl="0" marL="0" rtl="0" algn="l">
+              <a:spcBef>
+                <a:spcPts val="0"/>
+              </a:spcBef>
+              <a:spcAft>
+                <a:spcPts val="0"/>
+              </a:spcAft>
+              <a:buClr>
+                <a:schemeClr val="dk1"/>
+              </a:buClr>
+              <a:buSzPts val="1100"/>
+              <a:buFont typeface="Arial"/>
+              <a:buNone/>
+            </a:pPr>
+            <a:r>
+              <a:rPr lang="en">
+                <a:solidFill>
+                  <a:schemeClr val="dk1"/>
+                </a:solidFill>
+              </a:rPr>
+              <a:t>1 - Central Minaria</a:t>
+            </a:r>
+            <a:endParaRPr>
+              <a:solidFill>
+                <a:schemeClr val="dk1"/>
+              </a:solidFill>
+            </a:endParaRPr>
+          </a:p>
+          <a:p>
+            <a:pPr indent="0" lvl="0" marL="0" rtl="0" algn="l">
+              <a:spcBef>
+                <a:spcPts val="0"/>
+              </a:spcBef>
+              <a:spcAft>
+                <a:spcPts val="0"/>
+              </a:spcAft>
+              <a:buClr>
+                <a:schemeClr val="dk1"/>
+              </a:buClr>
+              <a:buSzPts val="1100"/>
+              <a:buFont typeface="Arial"/>
+              <a:buNone/>
+            </a:pPr>
+            <a:r>
+              <a:rPr lang="en">
+                <a:solidFill>
+                  <a:schemeClr val="dk1"/>
+                </a:solidFill>
+              </a:rPr>
+              <a:t>2 - Chauntea</a:t>
+            </a:r>
+            <a:endParaRPr>
+              <a:solidFill>
+                <a:schemeClr val="dk1"/>
+              </a:solidFill>
+            </a:endParaRPr>
+          </a:p>
+          <a:p>
+            <a:pPr indent="0" lvl="0" marL="0" rtl="0" algn="l">
+              <a:spcBef>
+                <a:spcPts val="0"/>
+              </a:spcBef>
+              <a:spcAft>
+                <a:spcPts val="0"/>
+              </a:spcAft>
+              <a:buClr>
+                <a:schemeClr val="dk1"/>
+              </a:buClr>
+              <a:buSzPts val="1100"/>
+              <a:buFont typeface="Arial"/>
+              <a:buNone/>
+            </a:pPr>
+            <a:r>
+              <a:rPr lang="en">
+                <a:solidFill>
+                  <a:schemeClr val="dk1"/>
+                </a:solidFill>
+              </a:rPr>
+              <a:t>3 - East Side Minaria</a:t>
+            </a:r>
+            <a:endParaRPr>
+              <a:solidFill>
+                <a:schemeClr val="dk1"/>
+              </a:solidFill>
+            </a:endParaRPr>
+          </a:p>
+          <a:p>
+            <a:pPr indent="0" lvl="0" marL="0" rtl="0" algn="l">
+              <a:spcBef>
+                <a:spcPts val="0"/>
+              </a:spcBef>
+              <a:spcAft>
+                <a:spcPts val="0"/>
+              </a:spcAft>
+              <a:buClr>
+                <a:schemeClr val="dk1"/>
+              </a:buClr>
+              <a:buSzPts val="1100"/>
+              <a:buFont typeface="Arial"/>
+              <a:buNone/>
+            </a:pPr>
+            <a:r>
+              <a:rPr lang="en">
+                <a:solidFill>
+                  <a:schemeClr val="dk1"/>
+                </a:solidFill>
+              </a:rPr>
+              <a:t>4 - Exynn</a:t>
+            </a:r>
+            <a:endParaRPr>
+              <a:solidFill>
+                <a:schemeClr val="dk1"/>
+              </a:solidFill>
+            </a:endParaRPr>
+          </a:p>
+          <a:p>
+            <a:pPr indent="0" lvl="0" marL="0" rtl="0" algn="l">
+              <a:spcBef>
+                <a:spcPts val="0"/>
+              </a:spcBef>
+              <a:spcAft>
+                <a:spcPts val="0"/>
+              </a:spcAft>
+              <a:buClr>
+                <a:schemeClr val="dk1"/>
+              </a:buClr>
+              <a:buSzPts val="1100"/>
+              <a:buFont typeface="Arial"/>
+              <a:buNone/>
+            </a:pPr>
+            <a:r>
+              <a:rPr lang="en">
+                <a:solidFill>
+                  <a:schemeClr val="dk1"/>
+                </a:solidFill>
+              </a:rPr>
+              <a:t>5 - Flatcoat</a:t>
+            </a:r>
+            <a:endParaRPr>
+              <a:solidFill>
+                <a:schemeClr val="dk1"/>
+              </a:solidFill>
+            </a:endParaRPr>
+          </a:p>
+          <a:p>
+            <a:pPr indent="0" lvl="0" marL="0" rtl="0" algn="l">
+              <a:spcBef>
+                <a:spcPts val="0"/>
+              </a:spcBef>
+              <a:spcAft>
+                <a:spcPts val="0"/>
+              </a:spcAft>
+              <a:buClr>
+                <a:schemeClr val="dk1"/>
+              </a:buClr>
+              <a:buSzPts val="1100"/>
+              <a:buFont typeface="Arial"/>
+              <a:buNone/>
+            </a:pPr>
+            <a:r>
+              <a:rPr lang="en">
+                <a:solidFill>
+                  <a:schemeClr val="dk1"/>
+                </a:solidFill>
+              </a:rPr>
+              <a:t>6 - Grumbar</a:t>
+            </a:r>
+            <a:endParaRPr>
+              <a:solidFill>
+                <a:schemeClr val="dk1"/>
+              </a:solidFill>
+            </a:endParaRPr>
+          </a:p>
+          <a:p>
+            <a:pPr indent="0" lvl="0" marL="0" rtl="0" algn="l">
+              <a:spcBef>
+                <a:spcPts val="0"/>
+              </a:spcBef>
+              <a:spcAft>
+                <a:spcPts val="0"/>
+              </a:spcAft>
+              <a:buClr>
+                <a:schemeClr val="dk1"/>
+              </a:buClr>
+              <a:buSzPts val="1100"/>
+              <a:buFont typeface="Arial"/>
+              <a:buNone/>
+            </a:pPr>
+            <a:r>
+              <a:rPr lang="en">
+                <a:solidFill>
+                  <a:schemeClr val="dk1"/>
+                </a:solidFill>
+              </a:rPr>
+              <a:t>7 - Holdfast</a:t>
+            </a:r>
+            <a:endParaRPr>
+              <a:solidFill>
+                <a:schemeClr val="dk1"/>
+              </a:solidFill>
+            </a:endParaRPr>
+          </a:p>
+          <a:p>
+            <a:pPr indent="0" lvl="0" marL="0" rtl="0" algn="l">
+              <a:spcBef>
+                <a:spcPts val="0"/>
+              </a:spcBef>
+              <a:spcAft>
+                <a:spcPts val="0"/>
+              </a:spcAft>
+              <a:buClr>
+                <a:schemeClr val="dk1"/>
+              </a:buClr>
+              <a:buSzPts val="1100"/>
+              <a:buFont typeface="Arial"/>
+              <a:buNone/>
+            </a:pPr>
+            <a:r>
+              <a:rPr lang="en">
+                <a:solidFill>
+                  <a:schemeClr val="dk1"/>
+                </a:solidFill>
+              </a:rPr>
+              <a:t>8 - Justice Bringers</a:t>
+            </a:r>
+            <a:endParaRPr>
+              <a:solidFill>
+                <a:schemeClr val="dk1"/>
+              </a:solidFill>
+            </a:endParaRPr>
+          </a:p>
+          <a:p>
+            <a:pPr indent="0" lvl="0" marL="0" rtl="0" algn="l">
+              <a:spcBef>
+                <a:spcPts val="0"/>
+              </a:spcBef>
+              <a:spcAft>
+                <a:spcPts val="0"/>
+              </a:spcAft>
+              <a:buClr>
+                <a:schemeClr val="dk1"/>
+              </a:buClr>
+              <a:buSzPts val="1100"/>
+              <a:buFont typeface="Arial"/>
+              <a:buNone/>
+            </a:pPr>
+            <a:r>
+              <a:rPr lang="en">
+                <a:solidFill>
+                  <a:schemeClr val="dk1"/>
+                </a:solidFill>
+              </a:rPr>
+              <a:t>9 - Kelemvor</a:t>
+            </a:r>
+            <a:endParaRPr>
+              <a:solidFill>
+                <a:schemeClr val="dk1"/>
+              </a:solidFill>
+            </a:endParaRPr>
+          </a:p>
+          <a:p>
+            <a:pPr indent="0" lvl="0" marL="0" rtl="0" algn="l">
+              <a:spcBef>
+                <a:spcPts val="0"/>
+              </a:spcBef>
+              <a:spcAft>
+                <a:spcPts val="0"/>
+              </a:spcAft>
+              <a:buClr>
+                <a:schemeClr val="dk1"/>
+              </a:buClr>
+              <a:buSzPts val="1100"/>
+              <a:buFont typeface="Arial"/>
+              <a:buNone/>
+            </a:pPr>
+            <a:r>
+              <a:rPr lang="en">
+                <a:solidFill>
+                  <a:schemeClr val="dk1"/>
+                </a:solidFill>
+              </a:rPr>
+              <a:t>10 - Minaria</a:t>
+            </a:r>
+            <a:endParaRPr>
+              <a:solidFill>
+                <a:schemeClr val="dk1"/>
+              </a:solidFill>
+            </a:endParaRPr>
+          </a:p>
+          <a:p>
+            <a:pPr indent="0" lvl="0" marL="0" rtl="0" algn="l">
+              <a:spcBef>
+                <a:spcPts val="0"/>
+              </a:spcBef>
+              <a:spcAft>
+                <a:spcPts val="0"/>
+              </a:spcAft>
+              <a:buClr>
+                <a:schemeClr val="dk1"/>
+              </a:buClr>
+              <a:buSzPts val="1100"/>
+              <a:buFont typeface="Arial"/>
+              <a:buNone/>
+            </a:pPr>
+            <a:r>
+              <a:rPr lang="en">
+                <a:solidFill>
+                  <a:schemeClr val="dk1"/>
+                </a:solidFill>
+              </a:rPr>
+              <a:t>11 - Myrkul</a:t>
+            </a:r>
+            <a:endParaRPr>
+              <a:solidFill>
+                <a:schemeClr val="dk1"/>
+              </a:solidFill>
+            </a:endParaRPr>
+          </a:p>
+          <a:p>
+            <a:pPr indent="0" lvl="0" marL="0" rtl="0" algn="l">
+              <a:spcBef>
+                <a:spcPts val="0"/>
+              </a:spcBef>
+              <a:spcAft>
+                <a:spcPts val="0"/>
+              </a:spcAft>
+              <a:buClr>
+                <a:schemeClr val="dk1"/>
+              </a:buClr>
+              <a:buSzPts val="1100"/>
+              <a:buFont typeface="Arial"/>
+              <a:buNone/>
+            </a:pPr>
+            <a:r>
+              <a:rPr lang="en">
+                <a:solidFill>
+                  <a:schemeClr val="dk1"/>
+                </a:solidFill>
+              </a:rPr>
+              <a:t>12 - Talos</a:t>
+            </a:r>
+            <a:endParaRPr>
+              <a:solidFill>
+                <a:schemeClr val="dk1"/>
+              </a:solidFill>
+            </a:endParaRPr>
+          </a:p>
+          <a:p>
+            <a:pPr indent="0" lvl="0" marL="0" rtl="0" algn="l">
+              <a:spcBef>
+                <a:spcPts val="0"/>
+              </a:spcBef>
+              <a:spcAft>
+                <a:spcPts val="0"/>
+              </a:spcAft>
+              <a:buClr>
+                <a:schemeClr val="dk1"/>
+              </a:buClr>
+              <a:buSzPts val="1100"/>
+              <a:buFont typeface="Arial"/>
+              <a:buNone/>
+            </a:pPr>
+            <a:r>
+              <a:rPr lang="en">
+                <a:solidFill>
+                  <a:schemeClr val="dk1"/>
+                </a:solidFill>
+              </a:rPr>
+              <a:t>13 - Veronna</a:t>
+            </a:r>
+            <a:endParaRPr>
+              <a:solidFill>
+                <a:schemeClr val="dk1"/>
+              </a:solidFill>
+            </a:endParaRPr>
+          </a:p>
+          <a:p>
+            <a:pPr indent="0" lvl="0" marL="0" rtl="0" algn="l">
+              <a:spcBef>
+                <a:spcPts val="0"/>
+              </a:spcBef>
+              <a:spcAft>
+                <a:spcPts val="0"/>
+              </a:spcAft>
+              <a:buClr>
+                <a:schemeClr val="dk1"/>
+              </a:buClr>
+              <a:buSzPts val="1100"/>
+              <a:buFont typeface="Arial"/>
+              <a:buNone/>
+            </a:pPr>
+            <a:r>
+              <a:rPr lang="en">
+                <a:solidFill>
+                  <a:schemeClr val="dk1"/>
+                </a:solidFill>
+              </a:rPr>
+              <a:t>14 - West Side Minaria</a:t>
+            </a:r>
+            <a:endParaRPr>
+              <a:solidFill>
+                <a:schemeClr val="dk1"/>
+              </a:solidFill>
+            </a:endParaRPr>
+          </a:p>
+          <a:p>
+            <a:pPr indent="0" lvl="0" marL="0" rtl="0" algn="l">
+              <a:spcBef>
+                <a:spcPts val="0"/>
+              </a:spcBef>
+              <a:spcAft>
+                <a:spcPts val="0"/>
+              </a:spcAft>
+              <a:buClr>
+                <a:schemeClr val="dk1"/>
+              </a:buClr>
+              <a:buSzPts val="1100"/>
+              <a:buFont typeface="Arial"/>
+              <a:buNone/>
+            </a:pPr>
+            <a:r>
+              <a:rPr lang="en">
+                <a:solidFill>
+                  <a:schemeClr val="dk1"/>
+                </a:solidFill>
+              </a:rPr>
+              <a:t>15 - Zehir</a:t>
+            </a:r>
+            <a:endParaRPr>
+              <a:solidFill>
+                <a:schemeClr val="dk1"/>
+              </a:solidFill>
+            </a:endParaRPr>
+          </a:p>
+          <a:p>
+            <a:pPr indent="0" lvl="0" marL="0" rtl="0" algn="l">
+              <a:spcBef>
+                <a:spcPts val="0"/>
+              </a:spcBef>
+              <a:spcAft>
+                <a:spcPts val="0"/>
+              </a:spcAft>
+              <a:buClr>
+                <a:schemeClr val="dk1"/>
+              </a:buClr>
+              <a:buSzPts val="1100"/>
+              <a:buFont typeface="Arial"/>
+              <a:buNone/>
+            </a:pPr>
+            <a:r>
+              <a:rPr lang="en">
+                <a:solidFill>
+                  <a:schemeClr val="dk1"/>
+                </a:solidFill>
+              </a:rPr>
+              <a:t>16 - Hadaar</a:t>
+            </a:r>
+            <a:endParaRPr>
+              <a:solidFill>
+                <a:schemeClr val="dk1"/>
+              </a:solidFill>
+            </a:endParaRPr>
           </a:p>
         </p:txBody>
       </p:sp>
@@ -4621,7 +5584,40 @@
               </a:rPr>
               <a:t>15 - Zehir</a:t>
             </a:r>
-            <a:endParaRPr/>
+            <a:endParaRPr>
+              <a:solidFill>
+                <a:schemeClr val="dk1"/>
+              </a:solidFill>
+            </a:endParaRPr>
+          </a:p>
+          <a:p>
+            <a:pPr indent="0" lvl="0" marL="0" rtl="0" algn="l">
+              <a:spcBef>
+                <a:spcPts val="0"/>
+              </a:spcBef>
+              <a:spcAft>
+                <a:spcPts val="0"/>
+              </a:spcAft>
+              <a:buClr>
+                <a:schemeClr val="dk1"/>
+              </a:buClr>
+              <a:buSzPts val="1100"/>
+              <a:buFont typeface="Arial"/>
+              <a:buNone/>
+            </a:pPr>
+            <a:r>
+              <a:rPr lang="en">
+                <a:solidFill>
+                  <a:schemeClr val="dk1"/>
+                </a:solidFill>
+              </a:rPr>
+              <a:t>16 - Hadaar</a:t>
+            </a:r>
+            <a:endParaRPr>
+              <a:solidFill>
+                <a:schemeClr val="dk1"/>
+              </a:solidFill>
+            </a:endParaRPr>
           </a:p>
         </p:txBody>
       </p:sp>
@@ -5136,7 +6132,40 @@
               </a:rPr>
               <a:t>15 - Zehir</a:t>
             </a:r>
-            <a:endParaRPr/>
+            <a:endParaRPr>
+              <a:solidFill>
+                <a:schemeClr val="dk1"/>
+              </a:solidFill>
+            </a:endParaRPr>
+          </a:p>
+          <a:p>
+            <a:pPr indent="0" lvl="0" marL="0" rtl="0" algn="l">
+              <a:spcBef>
+                <a:spcPts val="0"/>
+              </a:spcBef>
+              <a:spcAft>
+                <a:spcPts val="0"/>
+              </a:spcAft>
+              <a:buClr>
+                <a:schemeClr val="dk1"/>
+              </a:buClr>
+              <a:buSzPts val="1100"/>
+              <a:buFont typeface="Arial"/>
+              <a:buNone/>
+            </a:pPr>
+            <a:r>
+              <a:rPr lang="en">
+                <a:solidFill>
+                  <a:schemeClr val="dk1"/>
+                </a:solidFill>
+              </a:rPr>
+              <a:t>16 - Hadaar</a:t>
+            </a:r>
+            <a:endParaRPr>
+              <a:solidFill>
+                <a:schemeClr val="dk1"/>
+              </a:solidFill>
+            </a:endParaRPr>
           </a:p>
         </p:txBody>
       </p:sp>
@@ -5651,7 +6680,40 @@
               </a:rPr>
               <a:t>15 - Zehir</a:t>
             </a:r>
-            <a:endParaRPr/>
+            <a:endParaRPr>
+              <a:solidFill>
+                <a:schemeClr val="dk1"/>
+              </a:solidFill>
+            </a:endParaRPr>
+          </a:p>
+          <a:p>
+            <a:pPr indent="0" lvl="0" marL="0" rtl="0" algn="l">
+              <a:spcBef>
+                <a:spcPts val="0"/>
+              </a:spcBef>
+              <a:spcAft>
+                <a:spcPts val="0"/>
+              </a:spcAft>
+              <a:buClr>
+                <a:schemeClr val="dk1"/>
+              </a:buClr>
+              <a:buSzPts val="1100"/>
+              <a:buFont typeface="Arial"/>
+              <a:buNone/>
+            </a:pPr>
+            <a:r>
+              <a:rPr lang="en">
+                <a:solidFill>
+                  <a:schemeClr val="dk1"/>
+                </a:solidFill>
+              </a:rPr>
+              <a:t>16 - Hadaar</a:t>
+            </a:r>
+            <a:endParaRPr>
+              <a:solidFill>
+                <a:schemeClr val="dk1"/>
+              </a:solidFill>
+            </a:endParaRPr>
           </a:p>
         </p:txBody>
       </p:sp>
@@ -6166,7 +7228,40 @@
               </a:rPr>
               <a:t>15 - Zehir</a:t>
             </a:r>
-            <a:endParaRPr/>
+            <a:endParaRPr>
+              <a:solidFill>
+                <a:schemeClr val="dk1"/>
+              </a:solidFill>
+            </a:endParaRPr>
+          </a:p>
+          <a:p>
+            <a:pPr indent="0" lvl="0" marL="0" rtl="0" algn="l">
+              <a:spcBef>
+                <a:spcPts val="0"/>
+              </a:spcBef>
+              <a:spcAft>
+                <a:spcPts val="0"/>
+              </a:spcAft>
+              <a:buClr>
+                <a:schemeClr val="dk1"/>
+              </a:buClr>
+              <a:buSzPts val="1100"/>
+              <a:buFont typeface="Arial"/>
+              <a:buNone/>
+            </a:pPr>
+            <a:r>
+              <a:rPr lang="en">
+                <a:solidFill>
+                  <a:schemeClr val="dk1"/>
+                </a:solidFill>
+              </a:rPr>
+              <a:t>16 - Hadaar</a:t>
+            </a:r>
+            <a:endParaRPr>
+              <a:solidFill>
+                <a:schemeClr val="dk1"/>
+              </a:solidFill>
+            </a:endParaRPr>
           </a:p>
         </p:txBody>
       </p:sp>
@@ -6681,7 +7776,40 @@
               </a:rPr>
               <a:t>15 - Zehir</a:t>
             </a:r>
-            <a:endParaRPr/>
+            <a:endParaRPr>
+              <a:solidFill>
+                <a:schemeClr val="dk1"/>
+              </a:solidFill>
+            </a:endParaRPr>
+          </a:p>
+          <a:p>
+            <a:pPr indent="0" lvl="0" marL="0" rtl="0" algn="l">
+              <a:spcBef>
+                <a:spcPts val="0"/>
+              </a:spcBef>
+              <a:spcAft>
+                <a:spcPts val="0"/>
+              </a:spcAft>
+              <a:buClr>
+                <a:schemeClr val="dk1"/>
+              </a:buClr>
+              <a:buSzPts val="1100"/>
+              <a:buFont typeface="Arial"/>
+              <a:buNone/>
+            </a:pPr>
+            <a:r>
+              <a:rPr lang="en">
+                <a:solidFill>
+                  <a:schemeClr val="dk1"/>
+                </a:solidFill>
+              </a:rPr>
+              <a:t>16 - Hadaar</a:t>
+            </a:r>
+            <a:endParaRPr>
+              <a:solidFill>
+                <a:schemeClr val="dk1"/>
+              </a:solidFill>
+            </a:endParaRPr>
           </a:p>
         </p:txBody>
       </p:sp>
@@ -7196,7 +8324,40 @@
               </a:rPr>
               <a:t>15 - Zehir</a:t>
             </a:r>
-            <a:endParaRPr/>
+            <a:endParaRPr>
+              <a:solidFill>
+                <a:schemeClr val="dk1"/>
+              </a:solidFill>
+            </a:endParaRPr>
+          </a:p>
+          <a:p>
+            <a:pPr indent="0" lvl="0" marL="0" rtl="0" algn="l">
+              <a:spcBef>
+                <a:spcPts val="0"/>
+              </a:spcBef>
+              <a:spcAft>
+                <a:spcPts val="0"/>
+              </a:spcAft>
+              <a:buClr>
+                <a:schemeClr val="dk1"/>
+              </a:buClr>
+              <a:buSzPts val="1100"/>
+              <a:buFont typeface="Arial"/>
+              <a:buNone/>
+            </a:pPr>
+            <a:r>
+              <a:rPr lang="en">
+                <a:solidFill>
+                  <a:schemeClr val="dk1"/>
+                </a:solidFill>
+              </a:rPr>
+              <a:t>16 - Hadaar</a:t>
+            </a:r>
+            <a:endParaRPr>
+              <a:solidFill>
+                <a:schemeClr val="dk1"/>
+              </a:solidFill>
+            </a:endParaRPr>
           </a:p>
         </p:txBody>
       </p:sp>
@@ -7711,7 +8872,40 @@
               </a:rPr>
               <a:t>15 - Zehir</a:t>
             </a:r>
-            <a:endParaRPr/>
+            <a:endParaRPr>
+              <a:solidFill>
+                <a:schemeClr val="dk1"/>
+              </a:solidFill>
+            </a:endParaRPr>
+          </a:p>
+          <a:p>
+            <a:pPr indent="0" lvl="0" marL="0" rtl="0" algn="l">
+              <a:spcBef>
+                <a:spcPts val="0"/>
+              </a:spcBef>
+              <a:spcAft>
+                <a:spcPts val="0"/>
+              </a:spcAft>
+              <a:buClr>
+                <a:schemeClr val="dk1"/>
+              </a:buClr>
+              <a:buSzPts val="1100"/>
+              <a:buFont typeface="Arial"/>
+              <a:buNone/>
+            </a:pPr>
+            <a:r>
+              <a:rPr lang="en">
+                <a:solidFill>
+                  <a:schemeClr val="dk1"/>
+                </a:solidFill>
+              </a:rPr>
+              <a:t>16 - Hadaar</a:t>
+            </a:r>
+            <a:endParaRPr>
+              <a:solidFill>
+                <a:schemeClr val="dk1"/>
+              </a:solidFill>
+            </a:endParaRPr>
           </a:p>
         </p:txBody>
       </p:sp>
@@ -8226,7 +9420,40 @@
               </a:rPr>
               <a:t>15 - Zehir</a:t>
             </a:r>
-            <a:endParaRPr/>
+            <a:endParaRPr>
+              <a:solidFill>
+                <a:schemeClr val="dk1"/>
+              </a:solidFill>
+            </a:endParaRPr>
+          </a:p>
+          <a:p>
+            <a:pPr indent="0" lvl="0" marL="0" rtl="0" algn="l">
+              <a:spcBef>
+                <a:spcPts val="0"/>
+              </a:spcBef>
+              <a:spcAft>
+                <a:spcPts val="0"/>
+              </a:spcAft>
+              <a:buClr>
+                <a:schemeClr val="dk1"/>
+              </a:buClr>
+              <a:buSzPts val="1100"/>
+              <a:buFont typeface="Arial"/>
+              <a:buNone/>
+            </a:pPr>
+            <a:r>
+              <a:rPr lang="en">
+                <a:solidFill>
+                  <a:schemeClr val="dk1"/>
+                </a:solidFill>
+              </a:rPr>
+              <a:t>16 - Hadaar</a:t>
+            </a:r>
+            <a:endParaRPr>
+              <a:solidFill>
+                <a:schemeClr val="dk1"/>
+              </a:solidFill>
+            </a:endParaRPr>
           </a:p>
         </p:txBody>
       </p:sp>
@@ -13321,6 +14548,59 @@
 </p:sld>
 </file>
 
+<file path=ppt/slides/slide16.xml><?xml version="1.0" encoding="utf-8"?>
+<p:sld xmlns:a="http://schemas.openxmlformats.org/drawingml/2006/main" xmlns:r="http://schemas.openxmlformats.org/officeDocument/2006/relationships" xmlns:mc="http://schemas.openxmlformats.org/markup-compatibility/2006" xmlns:mv="urn:schemas-microsoft-com:mac:vml" xmlns:p="http://schemas.openxmlformats.org/presentationml/2006/main" xmlns:c="http://schemas.openxmlformats.org/drawingml/2006/chart" xmlns:dgm="http://schemas.openxmlformats.org/drawingml/2006/diagram" xmlns:o="urn:schemas-microsoft-com:office:office" xmlns:v="urn:schemas-microsoft-com:vml" xmlns:pvml="urn:schemas-microsoft-com:office:powerpoint" xmlns:com="http://schemas.openxmlformats.org/drawingml/2006/compatibility" xmlns:p14="http://schemas.microsoft.com/office/powerpoint/2010/main" xmlns:p15="http://schemas.microsoft.com/office/powerpoint/2012/main" xmlns:ahyp="http://schemas.microsoft.com/office/drawing/2018/hyperlinkcolor">
+  <p:cSld>
+    <p:spTree>
+      <p:nvGrpSpPr>
+        <p:cNvPr id="128" name="Shape 128"/>
+        <p:cNvGrpSpPr/>
+        <p:nvPr/>
+      </p:nvGrpSpPr>
+      <p:grpSpPr>
+        <a:xfrm>
+          <a:off x="0" y="0"/>
+          <a:ext cx="0" cy="0"/>
+          <a:chOff x="0" y="0"/>
+          <a:chExt cx="0" cy="0"/>
+        </a:xfrm>
+      </p:grpSpPr>
+      <p:pic>
+        <p:nvPicPr>
+          <p:cNvPr id="129" name="Google Shape;129;p28"/>
+          <p:cNvPicPr preferRelativeResize="0"/>
+          <p:nvPr/>
+        </p:nvPicPr>
+        <p:blipFill>
+          <a:blip r:embed="rId3">
+            <a:alphaModFix/>
+          </a:blip>
+          <a:stretch>
+            <a:fillRect/>
+          </a:stretch>
+        </p:blipFill>
+        <p:spPr>
+          <a:xfrm>
+            <a:off x="2414588" y="414338"/>
+            <a:ext cx="4314825" cy="4314825"/>
+          </a:xfrm>
+          <a:prstGeom prst="rect">
+            <a:avLst/>
+          </a:prstGeom>
+          <a:noFill/>
+          <a:ln>
+            <a:noFill/>
+          </a:ln>
+        </p:spPr>
+      </p:pic>
+    </p:spTree>
+  </p:cSld>
+  <p:clrMapOvr>
+    <a:masterClrMapping/>
+  </p:clrMapOvr>
+</p:sld>
+</file>
+
 <file path=ppt/slides/slide2.xml><?xml version="1.0" encoding="utf-8"?>
 <p:sld xmlns:a="http://schemas.openxmlformats.org/drawingml/2006/main" xmlns:r="http://schemas.openxmlformats.org/officeDocument/2006/relationships" xmlns:mc="http://schemas.openxmlformats.org/markup-compatibility/2006" xmlns:mv="urn:schemas-microsoft-com:mac:vml" xmlns:p="http://schemas.openxmlformats.org/presentationml/2006/main" xmlns:c="http://schemas.openxmlformats.org/drawingml/2006/chart" xmlns:dgm="http://schemas.openxmlformats.org/drawingml/2006/diagram" xmlns:o="urn:schemas-microsoft-com:office:office" xmlns:v="urn:schemas-microsoft-com:vml" xmlns:pvml="urn:schemas-microsoft-com:office:powerpoint" xmlns:com="http://schemas.openxmlformats.org/drawingml/2006/compatibility" xmlns:p14="http://schemas.microsoft.com/office/powerpoint/2010/main" xmlns:p15="http://schemas.microsoft.com/office/powerpoint/2012/main" xmlns:ahyp="http://schemas.microsoft.com/office/drawing/2018/hyperlinkcolor">
   <p:cSld>

</xml_diff>

<commit_message>
Getting Ready for NEW LOCATION!!!
</commit_message>
<xml_diff>
--- a/Banners/Banners.pptx
+++ b/Banners/Banners.pptx
@@ -24,6 +24,7 @@
     <p:sldId id="269" r:id="rId19"/>
     <p:sldId id="270" r:id="rId20"/>
     <p:sldId id="271" r:id="rId21"/>
+    <p:sldId id="272" r:id="rId22"/>
   </p:sldIdLst>
   <p:sldSz cy="5143500" cx="9144000"/>
   <p:notesSz cx="6858000" cy="9144000"/>
@@ -1233,7 +1234,40 @@
               </a:rPr>
               <a:t>16 - Hadaar</a:t>
             </a:r>
-            <a:endParaRPr/>
+            <a:endParaRPr>
+              <a:solidFill>
+                <a:schemeClr val="dk1"/>
+              </a:solidFill>
+            </a:endParaRPr>
+          </a:p>
+          <a:p>
+            <a:pPr indent="0" lvl="0" marL="0" rtl="0" algn="l">
+              <a:spcBef>
+                <a:spcPts val="0"/>
+              </a:spcBef>
+              <a:spcAft>
+                <a:spcPts val="0"/>
+              </a:spcAft>
+              <a:buClr>
+                <a:schemeClr val="dk1"/>
+              </a:buClr>
+              <a:buSzPts val="1100"/>
+              <a:buFont typeface="Arial"/>
+              <a:buNone/>
+            </a:pPr>
+            <a:r>
+              <a:rPr lang="en">
+                <a:solidFill>
+                  <a:schemeClr val="dk1"/>
+                </a:solidFill>
+              </a:rPr>
+              <a:t>17 - Laughing Knives</a:t>
+            </a:r>
+            <a:endParaRPr>
+              <a:solidFill>
+                <a:schemeClr val="dk1"/>
+              </a:solidFill>
+            </a:endParaRPr>
           </a:p>
         </p:txBody>
       </p:sp>
@@ -1783,6 +1817,35 @@
               </a:solidFill>
             </a:endParaRPr>
           </a:p>
+          <a:p>
+            <a:pPr indent="0" lvl="0" marL="0" rtl="0" algn="l">
+              <a:spcBef>
+                <a:spcPts val="0"/>
+              </a:spcBef>
+              <a:spcAft>
+                <a:spcPts val="0"/>
+              </a:spcAft>
+              <a:buClr>
+                <a:schemeClr val="dk1"/>
+              </a:buClr>
+              <a:buSzPts val="1100"/>
+              <a:buFont typeface="Arial"/>
+              <a:buNone/>
+            </a:pPr>
+            <a:r>
+              <a:rPr lang="en">
+                <a:solidFill>
+                  <a:schemeClr val="dk1"/>
+                </a:solidFill>
+              </a:rPr>
+              <a:t>17 - Laughing Knives</a:t>
+            </a:r>
+            <a:endParaRPr>
+              <a:solidFill>
+                <a:schemeClr val="dk1"/>
+              </a:solidFill>
+            </a:endParaRPr>
+          </a:p>
         </p:txBody>
       </p:sp>
     </p:spTree>
@@ -2331,6 +2394,35 @@
               </a:solidFill>
             </a:endParaRPr>
           </a:p>
+          <a:p>
+            <a:pPr indent="0" lvl="0" marL="0" rtl="0" algn="l">
+              <a:spcBef>
+                <a:spcPts val="0"/>
+              </a:spcBef>
+              <a:spcAft>
+                <a:spcPts val="0"/>
+              </a:spcAft>
+              <a:buClr>
+                <a:schemeClr val="dk1"/>
+              </a:buClr>
+              <a:buSzPts val="1100"/>
+              <a:buFont typeface="Arial"/>
+              <a:buNone/>
+            </a:pPr>
+            <a:r>
+              <a:rPr lang="en">
+                <a:solidFill>
+                  <a:schemeClr val="dk1"/>
+                </a:solidFill>
+              </a:rPr>
+              <a:t>17 - Laughing Knives</a:t>
+            </a:r>
+            <a:endParaRPr>
+              <a:solidFill>
+                <a:schemeClr val="dk1"/>
+              </a:solidFill>
+            </a:endParaRPr>
+          </a:p>
         </p:txBody>
       </p:sp>
     </p:spTree>
@@ -2879,6 +2971,35 @@
               </a:solidFill>
             </a:endParaRPr>
           </a:p>
+          <a:p>
+            <a:pPr indent="0" lvl="0" marL="0" rtl="0" algn="l">
+              <a:spcBef>
+                <a:spcPts val="0"/>
+              </a:spcBef>
+              <a:spcAft>
+                <a:spcPts val="0"/>
+              </a:spcAft>
+              <a:buClr>
+                <a:schemeClr val="dk1"/>
+              </a:buClr>
+              <a:buSzPts val="1100"/>
+              <a:buFont typeface="Arial"/>
+              <a:buNone/>
+            </a:pPr>
+            <a:r>
+              <a:rPr lang="en">
+                <a:solidFill>
+                  <a:schemeClr val="dk1"/>
+                </a:solidFill>
+              </a:rPr>
+              <a:t>17 - Laughing Knives</a:t>
+            </a:r>
+            <a:endParaRPr>
+              <a:solidFill>
+                <a:schemeClr val="dk1"/>
+              </a:solidFill>
+            </a:endParaRPr>
+          </a:p>
         </p:txBody>
       </p:sp>
     </p:spTree>
@@ -3427,6 +3548,35 @@
               </a:solidFill>
             </a:endParaRPr>
           </a:p>
+          <a:p>
+            <a:pPr indent="0" lvl="0" marL="0" rtl="0" algn="l">
+              <a:spcBef>
+                <a:spcPts val="0"/>
+              </a:spcBef>
+              <a:spcAft>
+                <a:spcPts val="0"/>
+              </a:spcAft>
+              <a:buClr>
+                <a:schemeClr val="dk1"/>
+              </a:buClr>
+              <a:buSzPts val="1100"/>
+              <a:buFont typeface="Arial"/>
+              <a:buNone/>
+            </a:pPr>
+            <a:r>
+              <a:rPr lang="en">
+                <a:solidFill>
+                  <a:schemeClr val="dk1"/>
+                </a:solidFill>
+              </a:rPr>
+              <a:t>17 - Laughing Knives</a:t>
+            </a:r>
+            <a:endParaRPr>
+              <a:solidFill>
+                <a:schemeClr val="dk1"/>
+              </a:solidFill>
+            </a:endParaRPr>
+          </a:p>
         </p:txBody>
       </p:sp>
     </p:spTree>
@@ -3975,6 +4125,35 @@
               </a:solidFill>
             </a:endParaRPr>
           </a:p>
+          <a:p>
+            <a:pPr indent="0" lvl="0" marL="0" rtl="0" algn="l">
+              <a:spcBef>
+                <a:spcPts val="0"/>
+              </a:spcBef>
+              <a:spcAft>
+                <a:spcPts val="0"/>
+              </a:spcAft>
+              <a:buClr>
+                <a:schemeClr val="dk1"/>
+              </a:buClr>
+              <a:buSzPts val="1100"/>
+              <a:buFont typeface="Arial"/>
+              <a:buNone/>
+            </a:pPr>
+            <a:r>
+              <a:rPr lang="en">
+                <a:solidFill>
+                  <a:schemeClr val="dk1"/>
+                </a:solidFill>
+              </a:rPr>
+              <a:t>17 - Laughing Knives</a:t>
+            </a:r>
+            <a:endParaRPr>
+              <a:solidFill>
+                <a:schemeClr val="dk1"/>
+              </a:solidFill>
+            </a:endParaRPr>
+          </a:p>
         </p:txBody>
       </p:sp>
     </p:spTree>
@@ -4523,6 +4702,35 @@
               </a:solidFill>
             </a:endParaRPr>
           </a:p>
+          <a:p>
+            <a:pPr indent="0" lvl="0" marL="0" rtl="0" algn="l">
+              <a:spcBef>
+                <a:spcPts val="0"/>
+              </a:spcBef>
+              <a:spcAft>
+                <a:spcPts val="0"/>
+              </a:spcAft>
+              <a:buClr>
+                <a:schemeClr val="dk1"/>
+              </a:buClr>
+              <a:buSzPts val="1100"/>
+              <a:buFont typeface="Arial"/>
+              <a:buNone/>
+            </a:pPr>
+            <a:r>
+              <a:rPr lang="en">
+                <a:solidFill>
+                  <a:schemeClr val="dk1"/>
+                </a:solidFill>
+              </a:rPr>
+              <a:t>17 - Laughing Knives</a:t>
+            </a:r>
+            <a:endParaRPr>
+              <a:solidFill>
+                <a:schemeClr val="dk1"/>
+              </a:solidFill>
+            </a:endParaRPr>
+          </a:p>
         </p:txBody>
       </p:sp>
     </p:spTree>
@@ -5071,6 +5279,612 @@
               </a:solidFill>
             </a:endParaRPr>
           </a:p>
+          <a:p>
+            <a:pPr indent="0" lvl="0" marL="0" rtl="0" algn="l">
+              <a:spcBef>
+                <a:spcPts val="0"/>
+              </a:spcBef>
+              <a:spcAft>
+                <a:spcPts val="0"/>
+              </a:spcAft>
+              <a:buClr>
+                <a:schemeClr val="dk1"/>
+              </a:buClr>
+              <a:buSzPts val="1100"/>
+              <a:buFont typeface="Arial"/>
+              <a:buNone/>
+            </a:pPr>
+            <a:r>
+              <a:rPr lang="en">
+                <a:solidFill>
+                  <a:schemeClr val="dk1"/>
+                </a:solidFill>
+              </a:rPr>
+              <a:t>17 - Laughing Knives</a:t>
+            </a:r>
+            <a:endParaRPr>
+              <a:solidFill>
+                <a:schemeClr val="dk1"/>
+              </a:solidFill>
+            </a:endParaRPr>
+          </a:p>
+        </p:txBody>
+      </p:sp>
+    </p:spTree>
+  </p:cSld>
+  <p:clrMapOvr>
+    <a:masterClrMapping/>
+  </p:clrMapOvr>
+</p:notes>
+</file>
+
+<file path=ppt/notesSlides/notesSlide17.xml><?xml version="1.0" encoding="utf-8"?>
+<p:notes xmlns:a="http://schemas.openxmlformats.org/drawingml/2006/main" xmlns:r="http://schemas.openxmlformats.org/officeDocument/2006/relationships" xmlns:mc="http://schemas.openxmlformats.org/markup-compatibility/2006" xmlns:mv="urn:schemas-microsoft-com:mac:vml" xmlns:p="http://schemas.openxmlformats.org/presentationml/2006/main" xmlns:c="http://schemas.openxmlformats.org/drawingml/2006/chart" xmlns:dgm="http://schemas.openxmlformats.org/drawingml/2006/diagram" xmlns:o="urn:schemas-microsoft-com:office:office" xmlns:v="urn:schemas-microsoft-com:vml" xmlns:pvml="urn:schemas-microsoft-com:office:powerpoint" xmlns:com="http://schemas.openxmlformats.org/drawingml/2006/compatibility" xmlns:p14="http://schemas.microsoft.com/office/powerpoint/2010/main" xmlns:p15="http://schemas.microsoft.com/office/powerpoint/2012/main" xmlns:ahyp="http://schemas.microsoft.com/office/drawing/2018/hyperlinkcolor" showMasterPhAnim="0" showMasterSp="0">
+  <p:cSld>
+    <p:spTree>
+      <p:nvGrpSpPr>
+        <p:cNvPr id="130" name="Shape 130"/>
+        <p:cNvGrpSpPr/>
+        <p:nvPr/>
+      </p:nvGrpSpPr>
+      <p:grpSpPr>
+        <a:xfrm>
+          <a:off x="0" y="0"/>
+          <a:ext cx="0" cy="0"/>
+          <a:chOff x="0" y="0"/>
+          <a:chExt cx="0" cy="0"/>
+        </a:xfrm>
+      </p:grpSpPr>
+      <p:sp>
+        <p:nvSpPr>
+          <p:cNvPr id="131" name="Google Shape;131;g238df183546_0_0:notes"/>
+          <p:cNvSpPr/>
+          <p:nvPr>
+            <p:ph idx="2" type="sldImg"/>
+          </p:nvPr>
+        </p:nvSpPr>
+        <p:spPr>
+          <a:xfrm>
+            <a:off x="381300" y="685800"/>
+            <a:ext cx="6096000" cy="3429000"/>
+          </a:xfrm>
+          <a:custGeom>
+            <a:rect b="b" l="l" r="r" t="t"/>
+            <a:pathLst>
+              <a:path extrusionOk="0" h="120000" w="120000">
+                <a:moveTo>
+                  <a:pt x="0" y="0"/>
+                </a:moveTo>
+                <a:lnTo>
+                  <a:pt x="120000" y="0"/>
+                </a:lnTo>
+                <a:lnTo>
+                  <a:pt x="120000" y="120000"/>
+                </a:lnTo>
+                <a:lnTo>
+                  <a:pt x="0" y="120000"/>
+                </a:lnTo>
+                <a:close/>
+              </a:path>
+            </a:pathLst>
+          </a:custGeom>
+        </p:spPr>
+      </p:sp>
+      <p:sp>
+        <p:nvSpPr>
+          <p:cNvPr id="132" name="Google Shape;132;g238df183546_0_0:notes"/>
+          <p:cNvSpPr txBox="1"/>
+          <p:nvPr>
+            <p:ph idx="1" type="body"/>
+          </p:nvPr>
+        </p:nvSpPr>
+        <p:spPr>
+          <a:xfrm>
+            <a:off x="685800" y="4343400"/>
+            <a:ext cx="5486400" cy="4114800"/>
+          </a:xfrm>
+          <a:prstGeom prst="rect">
+            <a:avLst/>
+          </a:prstGeom>
+        </p:spPr>
+        <p:txBody>
+          <a:bodyPr anchorCtr="0" anchor="t" bIns="91425" lIns="91425" spcFirstLastPara="1" rIns="91425" wrap="square" tIns="91425">
+            <a:noAutofit/>
+          </a:bodyPr>
+          <a:lstStyle/>
+          <a:p>
+            <a:pPr indent="0" lvl="0" marL="0" rtl="0" algn="l">
+              <a:spcBef>
+                <a:spcPts val="0"/>
+              </a:spcBef>
+              <a:spcAft>
+                <a:spcPts val="0"/>
+              </a:spcAft>
+              <a:buClr>
+                <a:schemeClr val="dk1"/>
+              </a:buClr>
+              <a:buSzPts val="1100"/>
+              <a:buFont typeface="Arial"/>
+              <a:buNone/>
+            </a:pPr>
+            <a:r>
+              <a:rPr lang="en">
+                <a:solidFill>
+                  <a:schemeClr val="dk1"/>
+                </a:solidFill>
+              </a:rPr>
+              <a:t>1 - Central Minaria</a:t>
+            </a:r>
+            <a:endParaRPr>
+              <a:solidFill>
+                <a:schemeClr val="dk1"/>
+              </a:solidFill>
+            </a:endParaRPr>
+          </a:p>
+          <a:p>
+            <a:pPr indent="0" lvl="0" marL="0" rtl="0" algn="l">
+              <a:spcBef>
+                <a:spcPts val="0"/>
+              </a:spcBef>
+              <a:spcAft>
+                <a:spcPts val="0"/>
+              </a:spcAft>
+              <a:buClr>
+                <a:schemeClr val="dk1"/>
+              </a:buClr>
+              <a:buSzPts val="1100"/>
+              <a:buFont typeface="Arial"/>
+              <a:buNone/>
+            </a:pPr>
+            <a:r>
+              <a:rPr lang="en">
+                <a:solidFill>
+                  <a:schemeClr val="dk1"/>
+                </a:solidFill>
+              </a:rPr>
+              <a:t>2 - Chauntea</a:t>
+            </a:r>
+            <a:endParaRPr>
+              <a:solidFill>
+                <a:schemeClr val="dk1"/>
+              </a:solidFill>
+            </a:endParaRPr>
+          </a:p>
+          <a:p>
+            <a:pPr indent="0" lvl="0" marL="0" rtl="0" algn="l">
+              <a:spcBef>
+                <a:spcPts val="0"/>
+              </a:spcBef>
+              <a:spcAft>
+                <a:spcPts val="0"/>
+              </a:spcAft>
+              <a:buClr>
+                <a:schemeClr val="dk1"/>
+              </a:buClr>
+              <a:buSzPts val="1100"/>
+              <a:buFont typeface="Arial"/>
+              <a:buNone/>
+            </a:pPr>
+            <a:r>
+              <a:rPr lang="en">
+                <a:solidFill>
+                  <a:schemeClr val="dk1"/>
+                </a:solidFill>
+              </a:rPr>
+              <a:t>3 - East Side Minaria</a:t>
+            </a:r>
+            <a:endParaRPr>
+              <a:solidFill>
+                <a:schemeClr val="dk1"/>
+              </a:solidFill>
+            </a:endParaRPr>
+          </a:p>
+          <a:p>
+            <a:pPr indent="0" lvl="0" marL="0" rtl="0" algn="l">
+              <a:spcBef>
+                <a:spcPts val="0"/>
+              </a:spcBef>
+              <a:spcAft>
+                <a:spcPts val="0"/>
+              </a:spcAft>
+              <a:buClr>
+                <a:schemeClr val="dk1"/>
+              </a:buClr>
+              <a:buSzPts val="1100"/>
+              <a:buFont typeface="Arial"/>
+              <a:buNone/>
+            </a:pPr>
+            <a:r>
+              <a:rPr lang="en">
+                <a:solidFill>
+                  <a:schemeClr val="dk1"/>
+                </a:solidFill>
+              </a:rPr>
+              <a:t>4 - Exynn</a:t>
+            </a:r>
+            <a:endParaRPr>
+              <a:solidFill>
+                <a:schemeClr val="dk1"/>
+              </a:solidFill>
+            </a:endParaRPr>
+          </a:p>
+          <a:p>
+            <a:pPr indent="0" lvl="0" marL="0" rtl="0" algn="l">
+              <a:spcBef>
+                <a:spcPts val="0"/>
+              </a:spcBef>
+              <a:spcAft>
+                <a:spcPts val="0"/>
+              </a:spcAft>
+              <a:buClr>
+                <a:schemeClr val="dk1"/>
+              </a:buClr>
+              <a:buSzPts val="1100"/>
+              <a:buFont typeface="Arial"/>
+              <a:buNone/>
+            </a:pPr>
+            <a:r>
+              <a:rPr lang="en">
+                <a:solidFill>
+                  <a:schemeClr val="dk1"/>
+                </a:solidFill>
+              </a:rPr>
+              <a:t>5 - Flatcoat</a:t>
+            </a:r>
+            <a:endParaRPr>
+              <a:solidFill>
+                <a:schemeClr val="dk1"/>
+              </a:solidFill>
+            </a:endParaRPr>
+          </a:p>
+          <a:p>
+            <a:pPr indent="0" lvl="0" marL="0" rtl="0" algn="l">
+              <a:spcBef>
+                <a:spcPts val="0"/>
+              </a:spcBef>
+              <a:spcAft>
+                <a:spcPts val="0"/>
+              </a:spcAft>
+              <a:buClr>
+                <a:schemeClr val="dk1"/>
+              </a:buClr>
+              <a:buSzPts val="1100"/>
+              <a:buFont typeface="Arial"/>
+              <a:buNone/>
+            </a:pPr>
+            <a:r>
+              <a:rPr lang="en">
+                <a:solidFill>
+                  <a:schemeClr val="dk1"/>
+                </a:solidFill>
+              </a:rPr>
+              <a:t>6 - Grumbar</a:t>
+            </a:r>
+            <a:endParaRPr>
+              <a:solidFill>
+                <a:schemeClr val="dk1"/>
+              </a:solidFill>
+            </a:endParaRPr>
+          </a:p>
+          <a:p>
+            <a:pPr indent="0" lvl="0" marL="0" rtl="0" algn="l">
+              <a:spcBef>
+                <a:spcPts val="0"/>
+              </a:spcBef>
+              <a:spcAft>
+                <a:spcPts val="0"/>
+              </a:spcAft>
+              <a:buClr>
+                <a:schemeClr val="dk1"/>
+              </a:buClr>
+              <a:buSzPts val="1100"/>
+              <a:buFont typeface="Arial"/>
+              <a:buNone/>
+            </a:pPr>
+            <a:r>
+              <a:rPr lang="en">
+                <a:solidFill>
+                  <a:schemeClr val="dk1"/>
+                </a:solidFill>
+              </a:rPr>
+              <a:t>7 - Holdfast</a:t>
+            </a:r>
+            <a:endParaRPr>
+              <a:solidFill>
+                <a:schemeClr val="dk1"/>
+              </a:solidFill>
+            </a:endParaRPr>
+          </a:p>
+          <a:p>
+            <a:pPr indent="0" lvl="0" marL="0" rtl="0" algn="l">
+              <a:spcBef>
+                <a:spcPts val="0"/>
+              </a:spcBef>
+              <a:spcAft>
+                <a:spcPts val="0"/>
+              </a:spcAft>
+              <a:buClr>
+                <a:schemeClr val="dk1"/>
+              </a:buClr>
+              <a:buSzPts val="1100"/>
+              <a:buFont typeface="Arial"/>
+              <a:buNone/>
+            </a:pPr>
+            <a:r>
+              <a:rPr lang="en">
+                <a:solidFill>
+                  <a:schemeClr val="dk1"/>
+                </a:solidFill>
+              </a:rPr>
+              <a:t>8 - Justice Bringers</a:t>
+            </a:r>
+            <a:endParaRPr>
+              <a:solidFill>
+                <a:schemeClr val="dk1"/>
+              </a:solidFill>
+            </a:endParaRPr>
+          </a:p>
+          <a:p>
+            <a:pPr indent="0" lvl="0" marL="0" rtl="0" algn="l">
+              <a:spcBef>
+                <a:spcPts val="0"/>
+              </a:spcBef>
+              <a:spcAft>
+                <a:spcPts val="0"/>
+              </a:spcAft>
+              <a:buClr>
+                <a:schemeClr val="dk1"/>
+              </a:buClr>
+              <a:buSzPts val="1100"/>
+              <a:buFont typeface="Arial"/>
+              <a:buNone/>
+            </a:pPr>
+            <a:r>
+              <a:rPr lang="en">
+                <a:solidFill>
+                  <a:schemeClr val="dk1"/>
+                </a:solidFill>
+              </a:rPr>
+              <a:t>9 - Kelemvor</a:t>
+            </a:r>
+            <a:endParaRPr>
+              <a:solidFill>
+                <a:schemeClr val="dk1"/>
+              </a:solidFill>
+            </a:endParaRPr>
+          </a:p>
+          <a:p>
+            <a:pPr indent="0" lvl="0" marL="0" rtl="0" algn="l">
+              <a:spcBef>
+                <a:spcPts val="0"/>
+              </a:spcBef>
+              <a:spcAft>
+                <a:spcPts val="0"/>
+              </a:spcAft>
+              <a:buClr>
+                <a:schemeClr val="dk1"/>
+              </a:buClr>
+              <a:buSzPts val="1100"/>
+              <a:buFont typeface="Arial"/>
+              <a:buNone/>
+            </a:pPr>
+            <a:r>
+              <a:rPr lang="en">
+                <a:solidFill>
+                  <a:schemeClr val="dk1"/>
+                </a:solidFill>
+              </a:rPr>
+              <a:t>10 - Minaria</a:t>
+            </a:r>
+            <a:endParaRPr>
+              <a:solidFill>
+                <a:schemeClr val="dk1"/>
+              </a:solidFill>
+            </a:endParaRPr>
+          </a:p>
+          <a:p>
+            <a:pPr indent="0" lvl="0" marL="0" rtl="0" algn="l">
+              <a:spcBef>
+                <a:spcPts val="0"/>
+              </a:spcBef>
+              <a:spcAft>
+                <a:spcPts val="0"/>
+              </a:spcAft>
+              <a:buClr>
+                <a:schemeClr val="dk1"/>
+              </a:buClr>
+              <a:buSzPts val="1100"/>
+              <a:buFont typeface="Arial"/>
+              <a:buNone/>
+            </a:pPr>
+            <a:r>
+              <a:rPr lang="en">
+                <a:solidFill>
+                  <a:schemeClr val="dk1"/>
+                </a:solidFill>
+              </a:rPr>
+              <a:t>11 - Myrkul</a:t>
+            </a:r>
+            <a:endParaRPr>
+              <a:solidFill>
+                <a:schemeClr val="dk1"/>
+              </a:solidFill>
+            </a:endParaRPr>
+          </a:p>
+          <a:p>
+            <a:pPr indent="0" lvl="0" marL="0" rtl="0" algn="l">
+              <a:spcBef>
+                <a:spcPts val="0"/>
+              </a:spcBef>
+              <a:spcAft>
+                <a:spcPts val="0"/>
+              </a:spcAft>
+              <a:buClr>
+                <a:schemeClr val="dk1"/>
+              </a:buClr>
+              <a:buSzPts val="1100"/>
+              <a:buFont typeface="Arial"/>
+              <a:buNone/>
+            </a:pPr>
+            <a:r>
+              <a:rPr lang="en">
+                <a:solidFill>
+                  <a:schemeClr val="dk1"/>
+                </a:solidFill>
+              </a:rPr>
+              <a:t>12 - Talos</a:t>
+            </a:r>
+            <a:endParaRPr>
+              <a:solidFill>
+                <a:schemeClr val="dk1"/>
+              </a:solidFill>
+            </a:endParaRPr>
+          </a:p>
+          <a:p>
+            <a:pPr indent="0" lvl="0" marL="0" rtl="0" algn="l">
+              <a:spcBef>
+                <a:spcPts val="0"/>
+              </a:spcBef>
+              <a:spcAft>
+                <a:spcPts val="0"/>
+              </a:spcAft>
+              <a:buClr>
+                <a:schemeClr val="dk1"/>
+              </a:buClr>
+              <a:buSzPts val="1100"/>
+              <a:buFont typeface="Arial"/>
+              <a:buNone/>
+            </a:pPr>
+            <a:r>
+              <a:rPr lang="en">
+                <a:solidFill>
+                  <a:schemeClr val="dk1"/>
+                </a:solidFill>
+              </a:rPr>
+              <a:t>13 - Veronna</a:t>
+            </a:r>
+            <a:endParaRPr>
+              <a:solidFill>
+                <a:schemeClr val="dk1"/>
+              </a:solidFill>
+            </a:endParaRPr>
+          </a:p>
+          <a:p>
+            <a:pPr indent="0" lvl="0" marL="0" rtl="0" algn="l">
+              <a:spcBef>
+                <a:spcPts val="0"/>
+              </a:spcBef>
+              <a:spcAft>
+                <a:spcPts val="0"/>
+              </a:spcAft>
+              <a:buClr>
+                <a:schemeClr val="dk1"/>
+              </a:buClr>
+              <a:buSzPts val="1100"/>
+              <a:buFont typeface="Arial"/>
+              <a:buNone/>
+            </a:pPr>
+            <a:r>
+              <a:rPr lang="en">
+                <a:solidFill>
+                  <a:schemeClr val="dk1"/>
+                </a:solidFill>
+              </a:rPr>
+              <a:t>14 - West Side Minaria</a:t>
+            </a:r>
+            <a:endParaRPr>
+              <a:solidFill>
+                <a:schemeClr val="dk1"/>
+              </a:solidFill>
+            </a:endParaRPr>
+          </a:p>
+          <a:p>
+            <a:pPr indent="0" lvl="0" marL="0" rtl="0" algn="l">
+              <a:spcBef>
+                <a:spcPts val="0"/>
+              </a:spcBef>
+              <a:spcAft>
+                <a:spcPts val="0"/>
+              </a:spcAft>
+              <a:buClr>
+                <a:schemeClr val="dk1"/>
+              </a:buClr>
+              <a:buSzPts val="1100"/>
+              <a:buFont typeface="Arial"/>
+              <a:buNone/>
+            </a:pPr>
+            <a:r>
+              <a:rPr lang="en">
+                <a:solidFill>
+                  <a:schemeClr val="dk1"/>
+                </a:solidFill>
+              </a:rPr>
+              <a:t>15 - Zehir</a:t>
+            </a:r>
+            <a:endParaRPr>
+              <a:solidFill>
+                <a:schemeClr val="dk1"/>
+              </a:solidFill>
+            </a:endParaRPr>
+          </a:p>
+          <a:p>
+            <a:pPr indent="0" lvl="0" marL="0" rtl="0" algn="l">
+              <a:spcBef>
+                <a:spcPts val="0"/>
+              </a:spcBef>
+              <a:spcAft>
+                <a:spcPts val="0"/>
+              </a:spcAft>
+              <a:buClr>
+                <a:schemeClr val="dk1"/>
+              </a:buClr>
+              <a:buSzPts val="1100"/>
+              <a:buFont typeface="Arial"/>
+              <a:buNone/>
+            </a:pPr>
+            <a:r>
+              <a:rPr lang="en">
+                <a:solidFill>
+                  <a:schemeClr val="dk1"/>
+                </a:solidFill>
+              </a:rPr>
+              <a:t>16 - Hadaar</a:t>
+            </a:r>
+            <a:endParaRPr>
+              <a:solidFill>
+                <a:schemeClr val="dk1"/>
+              </a:solidFill>
+            </a:endParaRPr>
+          </a:p>
+          <a:p>
+            <a:pPr indent="0" lvl="0" marL="0" rtl="0" algn="l">
+              <a:spcBef>
+                <a:spcPts val="0"/>
+              </a:spcBef>
+              <a:spcAft>
+                <a:spcPts val="0"/>
+              </a:spcAft>
+              <a:buClr>
+                <a:schemeClr val="dk1"/>
+              </a:buClr>
+              <a:buSzPts val="1100"/>
+              <a:buFont typeface="Arial"/>
+              <a:buNone/>
+            </a:pPr>
+            <a:r>
+              <a:rPr lang="en">
+                <a:solidFill>
+                  <a:schemeClr val="dk1"/>
+                </a:solidFill>
+              </a:rPr>
+              <a:t>17 - Laughing Knives</a:t>
+            </a:r>
+            <a:endParaRPr>
+              <a:solidFill>
+                <a:schemeClr val="dk1"/>
+              </a:solidFill>
+            </a:endParaRPr>
+          </a:p>
         </p:txBody>
       </p:sp>
     </p:spTree>
@@ -5619,6 +6433,35 @@
               </a:solidFill>
             </a:endParaRPr>
           </a:p>
+          <a:p>
+            <a:pPr indent="0" lvl="0" marL="0" rtl="0" algn="l">
+              <a:spcBef>
+                <a:spcPts val="0"/>
+              </a:spcBef>
+              <a:spcAft>
+                <a:spcPts val="0"/>
+              </a:spcAft>
+              <a:buClr>
+                <a:schemeClr val="dk1"/>
+              </a:buClr>
+              <a:buSzPts val="1100"/>
+              <a:buFont typeface="Arial"/>
+              <a:buNone/>
+            </a:pPr>
+            <a:r>
+              <a:rPr lang="en">
+                <a:solidFill>
+                  <a:schemeClr val="dk1"/>
+                </a:solidFill>
+              </a:rPr>
+              <a:t>17 - Laughing Knives</a:t>
+            </a:r>
+            <a:endParaRPr>
+              <a:solidFill>
+                <a:schemeClr val="dk1"/>
+              </a:solidFill>
+            </a:endParaRPr>
+          </a:p>
         </p:txBody>
       </p:sp>
     </p:spTree>
@@ -6167,6 +7010,35 @@
               </a:solidFill>
             </a:endParaRPr>
           </a:p>
+          <a:p>
+            <a:pPr indent="0" lvl="0" marL="0" rtl="0" algn="l">
+              <a:spcBef>
+                <a:spcPts val="0"/>
+              </a:spcBef>
+              <a:spcAft>
+                <a:spcPts val="0"/>
+              </a:spcAft>
+              <a:buClr>
+                <a:schemeClr val="dk1"/>
+              </a:buClr>
+              <a:buSzPts val="1100"/>
+              <a:buFont typeface="Arial"/>
+              <a:buNone/>
+            </a:pPr>
+            <a:r>
+              <a:rPr lang="en">
+                <a:solidFill>
+                  <a:schemeClr val="dk1"/>
+                </a:solidFill>
+              </a:rPr>
+              <a:t>17 - Laughing Knives</a:t>
+            </a:r>
+            <a:endParaRPr>
+              <a:solidFill>
+                <a:schemeClr val="dk1"/>
+              </a:solidFill>
+            </a:endParaRPr>
+          </a:p>
         </p:txBody>
       </p:sp>
     </p:spTree>
@@ -6715,6 +7587,35 @@
               </a:solidFill>
             </a:endParaRPr>
           </a:p>
+          <a:p>
+            <a:pPr indent="0" lvl="0" marL="0" rtl="0" algn="l">
+              <a:spcBef>
+                <a:spcPts val="0"/>
+              </a:spcBef>
+              <a:spcAft>
+                <a:spcPts val="0"/>
+              </a:spcAft>
+              <a:buClr>
+                <a:schemeClr val="dk1"/>
+              </a:buClr>
+              <a:buSzPts val="1100"/>
+              <a:buFont typeface="Arial"/>
+              <a:buNone/>
+            </a:pPr>
+            <a:r>
+              <a:rPr lang="en">
+                <a:solidFill>
+                  <a:schemeClr val="dk1"/>
+                </a:solidFill>
+              </a:rPr>
+              <a:t>17 - Laughing Knives</a:t>
+            </a:r>
+            <a:endParaRPr>
+              <a:solidFill>
+                <a:schemeClr val="dk1"/>
+              </a:solidFill>
+            </a:endParaRPr>
+          </a:p>
         </p:txBody>
       </p:sp>
     </p:spTree>
@@ -7263,6 +8164,35 @@
               </a:solidFill>
             </a:endParaRPr>
           </a:p>
+          <a:p>
+            <a:pPr indent="0" lvl="0" marL="0" rtl="0" algn="l">
+              <a:spcBef>
+                <a:spcPts val="0"/>
+              </a:spcBef>
+              <a:spcAft>
+                <a:spcPts val="0"/>
+              </a:spcAft>
+              <a:buClr>
+                <a:schemeClr val="dk1"/>
+              </a:buClr>
+              <a:buSzPts val="1100"/>
+              <a:buFont typeface="Arial"/>
+              <a:buNone/>
+            </a:pPr>
+            <a:r>
+              <a:rPr lang="en">
+                <a:solidFill>
+                  <a:schemeClr val="dk1"/>
+                </a:solidFill>
+              </a:rPr>
+              <a:t>17 - Laughing Knives</a:t>
+            </a:r>
+            <a:endParaRPr>
+              <a:solidFill>
+                <a:schemeClr val="dk1"/>
+              </a:solidFill>
+            </a:endParaRPr>
+          </a:p>
         </p:txBody>
       </p:sp>
     </p:spTree>
@@ -7811,6 +8741,35 @@
               </a:solidFill>
             </a:endParaRPr>
           </a:p>
+          <a:p>
+            <a:pPr indent="0" lvl="0" marL="0" rtl="0" algn="l">
+              <a:spcBef>
+                <a:spcPts val="0"/>
+              </a:spcBef>
+              <a:spcAft>
+                <a:spcPts val="0"/>
+              </a:spcAft>
+              <a:buClr>
+                <a:schemeClr val="dk1"/>
+              </a:buClr>
+              <a:buSzPts val="1100"/>
+              <a:buFont typeface="Arial"/>
+              <a:buNone/>
+            </a:pPr>
+            <a:r>
+              <a:rPr lang="en">
+                <a:solidFill>
+                  <a:schemeClr val="dk1"/>
+                </a:solidFill>
+              </a:rPr>
+              <a:t>17 - Laughing Knives</a:t>
+            </a:r>
+            <a:endParaRPr>
+              <a:solidFill>
+                <a:schemeClr val="dk1"/>
+              </a:solidFill>
+            </a:endParaRPr>
+          </a:p>
         </p:txBody>
       </p:sp>
     </p:spTree>
@@ -8359,6 +9318,35 @@
               </a:solidFill>
             </a:endParaRPr>
           </a:p>
+          <a:p>
+            <a:pPr indent="0" lvl="0" marL="0" rtl="0" algn="l">
+              <a:spcBef>
+                <a:spcPts val="0"/>
+              </a:spcBef>
+              <a:spcAft>
+                <a:spcPts val="0"/>
+              </a:spcAft>
+              <a:buClr>
+                <a:schemeClr val="dk1"/>
+              </a:buClr>
+              <a:buSzPts val="1100"/>
+              <a:buFont typeface="Arial"/>
+              <a:buNone/>
+            </a:pPr>
+            <a:r>
+              <a:rPr lang="en">
+                <a:solidFill>
+                  <a:schemeClr val="dk1"/>
+                </a:solidFill>
+              </a:rPr>
+              <a:t>17 - Laughing Knives</a:t>
+            </a:r>
+            <a:endParaRPr>
+              <a:solidFill>
+                <a:schemeClr val="dk1"/>
+              </a:solidFill>
+            </a:endParaRPr>
+          </a:p>
         </p:txBody>
       </p:sp>
     </p:spTree>
@@ -8907,6 +9895,35 @@
               </a:solidFill>
             </a:endParaRPr>
           </a:p>
+          <a:p>
+            <a:pPr indent="0" lvl="0" marL="0" rtl="0" algn="l">
+              <a:spcBef>
+                <a:spcPts val="0"/>
+              </a:spcBef>
+              <a:spcAft>
+                <a:spcPts val="0"/>
+              </a:spcAft>
+              <a:buClr>
+                <a:schemeClr val="dk1"/>
+              </a:buClr>
+              <a:buSzPts val="1100"/>
+              <a:buFont typeface="Arial"/>
+              <a:buNone/>
+            </a:pPr>
+            <a:r>
+              <a:rPr lang="en">
+                <a:solidFill>
+                  <a:schemeClr val="dk1"/>
+                </a:solidFill>
+              </a:rPr>
+              <a:t>17 - Laughing Knives</a:t>
+            </a:r>
+            <a:endParaRPr>
+              <a:solidFill>
+                <a:schemeClr val="dk1"/>
+              </a:solidFill>
+            </a:endParaRPr>
+          </a:p>
         </p:txBody>
       </p:sp>
     </p:spTree>
@@ -9448,6 +10465,35 @@
                 </a:solidFill>
               </a:rPr>
               <a:t>16 - Hadaar</a:t>
+            </a:r>
+            <a:endParaRPr>
+              <a:solidFill>
+                <a:schemeClr val="dk1"/>
+              </a:solidFill>
+            </a:endParaRPr>
+          </a:p>
+          <a:p>
+            <a:pPr indent="0" lvl="0" marL="0" rtl="0" algn="l">
+              <a:spcBef>
+                <a:spcPts val="0"/>
+              </a:spcBef>
+              <a:spcAft>
+                <a:spcPts val="0"/>
+              </a:spcAft>
+              <a:buClr>
+                <a:schemeClr val="dk1"/>
+              </a:buClr>
+              <a:buSzPts val="1100"/>
+              <a:buFont typeface="Arial"/>
+              <a:buNone/>
+            </a:pPr>
+            <a:r>
+              <a:rPr lang="en">
+                <a:solidFill>
+                  <a:schemeClr val="dk1"/>
+                </a:solidFill>
+              </a:rPr>
+              <a:t>17 - Laughing Knives</a:t>
             </a:r>
             <a:endParaRPr>
               <a:solidFill>
@@ -14601,6 +15647,357 @@
 </p:sld>
 </file>
 
+<file path=ppt/slides/slide17.xml><?xml version="1.0" encoding="utf-8"?>
+<p:sld xmlns:a="http://schemas.openxmlformats.org/drawingml/2006/main" xmlns:r="http://schemas.openxmlformats.org/officeDocument/2006/relationships" xmlns:mc="http://schemas.openxmlformats.org/markup-compatibility/2006" xmlns:mv="urn:schemas-microsoft-com:mac:vml" xmlns:p="http://schemas.openxmlformats.org/presentationml/2006/main" xmlns:c="http://schemas.openxmlformats.org/drawingml/2006/chart" xmlns:dgm="http://schemas.openxmlformats.org/drawingml/2006/diagram" xmlns:o="urn:schemas-microsoft-com:office:office" xmlns:v="urn:schemas-microsoft-com:vml" xmlns:pvml="urn:schemas-microsoft-com:office:powerpoint" xmlns:com="http://schemas.openxmlformats.org/drawingml/2006/compatibility" xmlns:p14="http://schemas.microsoft.com/office/powerpoint/2010/main" xmlns:p15="http://schemas.microsoft.com/office/powerpoint/2012/main" xmlns:ahyp="http://schemas.microsoft.com/office/drawing/2018/hyperlinkcolor">
+  <p:cSld>
+    <p:spTree>
+      <p:nvGrpSpPr>
+        <p:cNvPr id="133" name="Shape 133"/>
+        <p:cNvGrpSpPr/>
+        <p:nvPr/>
+      </p:nvGrpSpPr>
+      <p:grpSpPr>
+        <a:xfrm>
+          <a:off x="0" y="0"/>
+          <a:ext cx="0" cy="0"/>
+          <a:chOff x="0" y="0"/>
+          <a:chExt cx="0" cy="0"/>
+        </a:xfrm>
+      </p:grpSpPr>
+      <p:pic>
+        <p:nvPicPr>
+          <p:cNvPr id="134" name="Google Shape;134;p29"/>
+          <p:cNvPicPr preferRelativeResize="0"/>
+          <p:nvPr/>
+        </p:nvPicPr>
+        <p:blipFill>
+          <a:blip r:embed="rId3">
+            <a:alphaModFix/>
+          </a:blip>
+          <a:stretch>
+            <a:fillRect/>
+          </a:stretch>
+        </p:blipFill>
+        <p:spPr>
+          <a:xfrm>
+            <a:off x="2414588" y="414338"/>
+            <a:ext cx="4314825" cy="4314825"/>
+          </a:xfrm>
+          <a:prstGeom prst="rect">
+            <a:avLst/>
+          </a:prstGeom>
+          <a:noFill/>
+          <a:ln>
+            <a:noFill/>
+          </a:ln>
+        </p:spPr>
+      </p:pic>
+      <p:sp>
+        <p:nvSpPr>
+          <p:cNvPr id="135" name="Google Shape;135;p29"/>
+          <p:cNvSpPr txBox="1"/>
+          <p:nvPr/>
+        </p:nvSpPr>
+        <p:spPr>
+          <a:xfrm>
+            <a:off x="152400" y="152400"/>
+            <a:ext cx="3000000" cy="3063000"/>
+          </a:xfrm>
+          <a:prstGeom prst="rect">
+            <a:avLst/>
+          </a:prstGeom>
+          <a:noFill/>
+          <a:ln>
+            <a:noFill/>
+          </a:ln>
+        </p:spPr>
+        <p:txBody>
+          <a:bodyPr anchorCtr="0" anchor="t" bIns="91425" lIns="91425" spcFirstLastPara="1" rIns="91425" wrap="square" tIns="91425">
+            <a:spAutoFit/>
+          </a:bodyPr>
+          <a:lstStyle/>
+          <a:p>
+            <a:pPr indent="0" lvl="0" marL="0" rtl="0" algn="l">
+              <a:spcBef>
+                <a:spcPts val="0"/>
+              </a:spcBef>
+              <a:spcAft>
+                <a:spcPts val="0"/>
+              </a:spcAft>
+              <a:buNone/>
+            </a:pPr>
+            <a:r>
+              <a:rPr lang="en" sz="1100"/>
+              <a:t>1 - Central Minaria</a:t>
+            </a:r>
+            <a:endParaRPr sz="1100"/>
+          </a:p>
+          <a:p>
+            <a:pPr indent="0" lvl="0" marL="0" rtl="0" algn="l">
+              <a:spcBef>
+                <a:spcPts val="0"/>
+              </a:spcBef>
+              <a:spcAft>
+                <a:spcPts val="0"/>
+              </a:spcAft>
+              <a:buNone/>
+            </a:pPr>
+            <a:r>
+              <a:rPr lang="en" sz="1100"/>
+              <a:t>2 - Chauntea</a:t>
+            </a:r>
+            <a:endParaRPr sz="1100"/>
+          </a:p>
+          <a:p>
+            <a:pPr indent="0" lvl="0" marL="0" rtl="0" algn="l">
+              <a:spcBef>
+                <a:spcPts val="0"/>
+              </a:spcBef>
+              <a:spcAft>
+                <a:spcPts val="0"/>
+              </a:spcAft>
+              <a:buNone/>
+            </a:pPr>
+            <a:r>
+              <a:rPr lang="en" sz="1100"/>
+              <a:t>3 - East Side Minaria</a:t>
+            </a:r>
+            <a:endParaRPr sz="1100"/>
+          </a:p>
+          <a:p>
+            <a:pPr indent="0" lvl="0" marL="0" rtl="0" algn="l">
+              <a:spcBef>
+                <a:spcPts val="0"/>
+              </a:spcBef>
+              <a:spcAft>
+                <a:spcPts val="0"/>
+              </a:spcAft>
+              <a:buNone/>
+            </a:pPr>
+            <a:r>
+              <a:rPr lang="en" sz="1100"/>
+              <a:t>4 - Exynn</a:t>
+            </a:r>
+            <a:endParaRPr sz="1100"/>
+          </a:p>
+          <a:p>
+            <a:pPr indent="0" lvl="0" marL="0" rtl="0" algn="l">
+              <a:spcBef>
+                <a:spcPts val="0"/>
+              </a:spcBef>
+              <a:spcAft>
+                <a:spcPts val="0"/>
+              </a:spcAft>
+              <a:buNone/>
+            </a:pPr>
+            <a:r>
+              <a:rPr lang="en" sz="1100"/>
+              <a:t>5 - Flatcoat</a:t>
+            </a:r>
+            <a:endParaRPr sz="1100"/>
+          </a:p>
+          <a:p>
+            <a:pPr indent="0" lvl="0" marL="0" rtl="0" algn="l">
+              <a:spcBef>
+                <a:spcPts val="0"/>
+              </a:spcBef>
+              <a:spcAft>
+                <a:spcPts val="0"/>
+              </a:spcAft>
+              <a:buNone/>
+            </a:pPr>
+            <a:r>
+              <a:rPr lang="en" sz="1100"/>
+              <a:t>6 - Grumbar</a:t>
+            </a:r>
+            <a:endParaRPr sz="1100"/>
+          </a:p>
+          <a:p>
+            <a:pPr indent="0" lvl="0" marL="0" rtl="0" algn="l">
+              <a:spcBef>
+                <a:spcPts val="0"/>
+              </a:spcBef>
+              <a:spcAft>
+                <a:spcPts val="0"/>
+              </a:spcAft>
+              <a:buNone/>
+            </a:pPr>
+            <a:r>
+              <a:rPr lang="en" sz="1100"/>
+              <a:t>7 - Holdfast</a:t>
+            </a:r>
+            <a:endParaRPr sz="1100"/>
+          </a:p>
+          <a:p>
+            <a:pPr indent="0" lvl="0" marL="0" rtl="0" algn="l">
+              <a:spcBef>
+                <a:spcPts val="0"/>
+              </a:spcBef>
+              <a:spcAft>
+                <a:spcPts val="0"/>
+              </a:spcAft>
+              <a:buNone/>
+            </a:pPr>
+            <a:r>
+              <a:rPr lang="en" sz="1100"/>
+              <a:t>8 - Justice Bringers</a:t>
+            </a:r>
+            <a:endParaRPr sz="1100"/>
+          </a:p>
+          <a:p>
+            <a:pPr indent="0" lvl="0" marL="0" rtl="0" algn="l">
+              <a:spcBef>
+                <a:spcPts val="0"/>
+              </a:spcBef>
+              <a:spcAft>
+                <a:spcPts val="0"/>
+              </a:spcAft>
+              <a:buNone/>
+            </a:pPr>
+            <a:r>
+              <a:rPr lang="en" sz="1100"/>
+              <a:t>9 - Kelemvor</a:t>
+            </a:r>
+            <a:endParaRPr sz="1100"/>
+          </a:p>
+          <a:p>
+            <a:pPr indent="0" lvl="0" marL="0" rtl="0" algn="l">
+              <a:spcBef>
+                <a:spcPts val="0"/>
+              </a:spcBef>
+              <a:spcAft>
+                <a:spcPts val="0"/>
+              </a:spcAft>
+              <a:buNone/>
+            </a:pPr>
+            <a:r>
+              <a:rPr lang="en" sz="1100"/>
+              <a:t>10 - Minaria</a:t>
+            </a:r>
+            <a:endParaRPr sz="1100"/>
+          </a:p>
+          <a:p>
+            <a:pPr indent="0" lvl="0" marL="0" rtl="0" algn="l">
+              <a:spcBef>
+                <a:spcPts val="0"/>
+              </a:spcBef>
+              <a:spcAft>
+                <a:spcPts val="0"/>
+              </a:spcAft>
+              <a:buNone/>
+            </a:pPr>
+            <a:r>
+              <a:rPr lang="en" sz="1100"/>
+              <a:t>11 - Myrkul</a:t>
+            </a:r>
+            <a:endParaRPr sz="1100"/>
+          </a:p>
+          <a:p>
+            <a:pPr indent="0" lvl="0" marL="0" rtl="0" algn="l">
+              <a:spcBef>
+                <a:spcPts val="0"/>
+              </a:spcBef>
+              <a:spcAft>
+                <a:spcPts val="0"/>
+              </a:spcAft>
+              <a:buNone/>
+            </a:pPr>
+            <a:r>
+              <a:rPr lang="en" sz="1100"/>
+              <a:t>12 - Talos</a:t>
+            </a:r>
+            <a:endParaRPr sz="1100"/>
+          </a:p>
+          <a:p>
+            <a:pPr indent="0" lvl="0" marL="0" rtl="0" algn="l">
+              <a:spcBef>
+                <a:spcPts val="0"/>
+              </a:spcBef>
+              <a:spcAft>
+                <a:spcPts val="0"/>
+              </a:spcAft>
+              <a:buNone/>
+            </a:pPr>
+            <a:r>
+              <a:rPr lang="en" sz="1100"/>
+              <a:t>13 - Veronna</a:t>
+            </a:r>
+            <a:endParaRPr sz="1100"/>
+          </a:p>
+          <a:p>
+            <a:pPr indent="0" lvl="0" marL="0" rtl="0" algn="l">
+              <a:spcBef>
+                <a:spcPts val="0"/>
+              </a:spcBef>
+              <a:spcAft>
+                <a:spcPts val="0"/>
+              </a:spcAft>
+              <a:buNone/>
+            </a:pPr>
+            <a:r>
+              <a:rPr lang="en" sz="1100"/>
+              <a:t>14 - West Side Minaria</a:t>
+            </a:r>
+            <a:endParaRPr sz="1100"/>
+          </a:p>
+          <a:p>
+            <a:pPr indent="0" lvl="0" marL="0" rtl="0" algn="l">
+              <a:spcBef>
+                <a:spcPts val="0"/>
+              </a:spcBef>
+              <a:spcAft>
+                <a:spcPts val="0"/>
+              </a:spcAft>
+              <a:buNone/>
+            </a:pPr>
+            <a:r>
+              <a:rPr lang="en" sz="1100"/>
+              <a:t>15 - Zehir</a:t>
+            </a:r>
+            <a:endParaRPr sz="1100"/>
+          </a:p>
+          <a:p>
+            <a:pPr indent="0" lvl="0" marL="0" rtl="0" algn="l">
+              <a:spcBef>
+                <a:spcPts val="0"/>
+              </a:spcBef>
+              <a:spcAft>
+                <a:spcPts val="0"/>
+              </a:spcAft>
+              <a:buNone/>
+            </a:pPr>
+            <a:r>
+              <a:rPr lang="en" sz="1100"/>
+              <a:t>16 - Hadaar</a:t>
+            </a:r>
+            <a:endParaRPr sz="1100"/>
+          </a:p>
+          <a:p>
+            <a:pPr indent="0" lvl="0" marL="0" rtl="0" algn="l">
+              <a:spcBef>
+                <a:spcPts val="0"/>
+              </a:spcBef>
+              <a:spcAft>
+                <a:spcPts val="0"/>
+              </a:spcAft>
+              <a:buNone/>
+            </a:pPr>
+            <a:r>
+              <a:rPr lang="en" sz="1100"/>
+              <a:t>17 - Laughing Knives</a:t>
+            </a:r>
+            <a:endParaRPr/>
+          </a:p>
+        </p:txBody>
+      </p:sp>
+    </p:spTree>
+  </p:cSld>
+  <p:clrMapOvr>
+    <a:masterClrMapping/>
+  </p:clrMapOvr>
+</p:sld>
+</file>
+
 <file path=ppt/slides/slide2.xml><?xml version="1.0" encoding="utf-8"?>
 <p:sld xmlns:a="http://schemas.openxmlformats.org/drawingml/2006/main" xmlns:r="http://schemas.openxmlformats.org/officeDocument/2006/relationships" xmlns:mc="http://schemas.openxmlformats.org/markup-compatibility/2006" xmlns:mv="urn:schemas-microsoft-com:mac:vml" xmlns:p="http://schemas.openxmlformats.org/presentationml/2006/main" xmlns:c="http://schemas.openxmlformats.org/drawingml/2006/chart" xmlns:dgm="http://schemas.openxmlformats.org/drawingml/2006/diagram" xmlns:o="urn:schemas-microsoft-com:office:office" xmlns:v="urn:schemas-microsoft-com:vml" xmlns:pvml="urn:schemas-microsoft-com:office:powerpoint" xmlns:com="http://schemas.openxmlformats.org/drawingml/2006/compatibility" xmlns:p14="http://schemas.microsoft.com/office/powerpoint/2010/main" xmlns:p15="http://schemas.microsoft.com/office/powerpoint/2012/main" xmlns:ahyp="http://schemas.microsoft.com/office/drawing/2018/hyperlinkcolor">
   <p:cSld>
@@ -15025,6 +16422,285 @@
 </file>
 
 <file path=ppt/theme/theme1.xml><?xml version="1.0" encoding="utf-8"?>
+<a:theme xmlns:a="http://schemas.openxmlformats.org/drawingml/2006/main" xmlns:r="http://schemas.openxmlformats.org/officeDocument/2006/relationships">
+  <a:themeElements>
+    <a:clrScheme name="Default">
+      <a:dk1>
+        <a:srgbClr val="000000"/>
+      </a:dk1>
+      <a:lt1>
+        <a:srgbClr val="FFFFFF"/>
+      </a:lt1>
+      <a:dk2>
+        <a:srgbClr val="158158"/>
+      </a:dk2>
+      <a:lt2>
+        <a:srgbClr val="F3F3F3"/>
+      </a:lt2>
+      <a:accent1>
+        <a:srgbClr val="058DC7"/>
+      </a:accent1>
+      <a:accent2>
+        <a:srgbClr val="50B432"/>
+      </a:accent2>
+      <a:accent3>
+        <a:srgbClr val="ED561B"/>
+      </a:accent3>
+      <a:accent4>
+        <a:srgbClr val="EDEF00"/>
+      </a:accent4>
+      <a:accent5>
+        <a:srgbClr val="24CBE5"/>
+      </a:accent5>
+      <a:accent6>
+        <a:srgbClr val="64E572"/>
+      </a:accent6>
+      <a:hlink>
+        <a:srgbClr val="2200CC"/>
+      </a:hlink>
+      <a:folHlink>
+        <a:srgbClr val="551A8B"/>
+      </a:folHlink>
+    </a:clrScheme>
+    <a:fontScheme name="Office">
+      <a:majorFont>
+        <a:latin typeface="Arial"/>
+        <a:ea typeface=""/>
+        <a:cs typeface=""/>
+        <a:font script="Jpan" typeface="ＭＳ Ｐゴシック"/>
+        <a:font script="Hang" typeface="맑은 고딕"/>
+        <a:font script="Hans" typeface="宋体"/>
+        <a:font script="Hant" typeface="新細明體"/>
+        <a:font script="Arab" typeface="Times New Roman"/>
+        <a:font script="Hebr" typeface="Times New Roman"/>
+        <a:font script="Thai" typeface="Angsana New"/>
+        <a:font script="Ethi" typeface="Nyala"/>
+        <a:font script="Beng" typeface="Vrinda"/>
+        <a:font script="Gujr" typeface="Shruti"/>
+        <a:font script="Khmr" typeface="MoolBoran"/>
+        <a:font script="Knda" typeface="Tunga"/>
+        <a:font script="Guru" typeface="Raavi"/>
+        <a:font script="Cans" typeface="Euphemia"/>
+        <a:font script="Cher" typeface="Plantagenet Cherokee"/>
+        <a:font script="Yiii" typeface="Microsoft Yi Baiti"/>
+        <a:font script="Tibt" typeface="Microsoft Himalaya"/>
+        <a:font script="Thaa" typeface="MV Boli"/>
+        <a:font script="Deva" typeface="Mangal"/>
+        <a:font script="Telu" typeface="Gautami"/>
+        <a:font script="Taml" typeface="Latha"/>
+        <a:font script="Syrc" typeface="Estrangelo Edessa"/>
+        <a:font script="Orya" typeface="Kalinga"/>
+        <a:font script="Mlym" typeface="Kartika"/>
+        <a:font script="Laoo" typeface="DokChampa"/>
+        <a:font script="Sinh" typeface="Iskoola Pota"/>
+        <a:font script="Mong" typeface="Mongolian Baiti"/>
+        <a:font script="Viet" typeface="Times New Roman"/>
+        <a:font script="Uigh" typeface="Microsoft Uighur"/>
+        <a:font script="Geor" typeface="Sylfaen"/>
+      </a:majorFont>
+      <a:minorFont>
+        <a:latin typeface="Arial"/>
+        <a:ea typeface=""/>
+        <a:cs typeface=""/>
+        <a:font script="Jpan" typeface="ＭＳ Ｐゴシック"/>
+        <a:font script="Hang" typeface="맑은 고딕"/>
+        <a:font script="Hans" typeface="宋体"/>
+        <a:font script="Hant" typeface="新細明體"/>
+        <a:font script="Arab" typeface="Arial"/>
+        <a:font script="Hebr" typeface="Arial"/>
+        <a:font script="Thai" typeface="Cordia New"/>
+        <a:font script="Ethi" typeface="Nyala"/>
+        <a:font script="Beng" typeface="Vrinda"/>
+        <a:font script="Gujr" typeface="Shruti"/>
+        <a:font script="Khmr" typeface="DaunPenh"/>
+        <a:font script="Knda" typeface="Tunga"/>
+        <a:font script="Guru" typeface="Raavi"/>
+        <a:font script="Cans" typeface="Euphemia"/>
+        <a:font script="Cher" typeface="Plantagenet Cherokee"/>
+        <a:font script="Yiii" typeface="Microsoft Yi Baiti"/>
+        <a:font script="Tibt" typeface="Microsoft Himalaya"/>
+        <a:font script="Thaa" typeface="MV Boli"/>
+        <a:font script="Deva" typeface="Mangal"/>
+        <a:font script="Telu" typeface="Gautami"/>
+        <a:font script="Taml" typeface="Latha"/>
+        <a:font script="Syrc" typeface="Estrangelo Edessa"/>
+        <a:font script="Orya" typeface="Kalinga"/>
+        <a:font script="Mlym" typeface="Kartika"/>
+        <a:font script="Laoo" typeface="DokChampa"/>
+        <a:font script="Sinh" typeface="Iskoola Pota"/>
+        <a:font script="Mong" typeface="Mongolian Baiti"/>
+        <a:font script="Viet" typeface="Arial"/>
+        <a:font script="Uigh" typeface="Microsoft Uighur"/>
+        <a:font script="Geor" typeface="Sylfaen"/>
+      </a:minorFont>
+    </a:fontScheme>
+    <a:fmtScheme name="Office">
+      <a:fillStyleLst>
+        <a:solidFill>
+          <a:schemeClr val="phClr"/>
+        </a:solidFill>
+        <a:gradFill rotWithShape="1">
+          <a:gsLst>
+            <a:gs pos="0">
+              <a:schemeClr val="phClr">
+                <a:tint val="50000"/>
+                <a:satMod val="300000"/>
+              </a:schemeClr>
+            </a:gs>
+            <a:gs pos="35000">
+              <a:schemeClr val="phClr">
+                <a:tint val="37000"/>
+                <a:satMod val="300000"/>
+              </a:schemeClr>
+            </a:gs>
+            <a:gs pos="100000">
+              <a:schemeClr val="phClr">
+                <a:tint val="15000"/>
+                <a:satMod val="350000"/>
+              </a:schemeClr>
+            </a:gs>
+          </a:gsLst>
+          <a:lin ang="16200000" scaled="1"/>
+        </a:gradFill>
+        <a:gradFill rotWithShape="1">
+          <a:gsLst>
+            <a:gs pos="0">
+              <a:schemeClr val="phClr">
+                <a:tint val="100000"/>
+                <a:shade val="100000"/>
+                <a:satMod val="130000"/>
+              </a:schemeClr>
+            </a:gs>
+            <a:gs pos="100000">
+              <a:schemeClr val="phClr">
+                <a:tint val="50000"/>
+                <a:shade val="100000"/>
+                <a:satMod val="350000"/>
+              </a:schemeClr>
+            </a:gs>
+          </a:gsLst>
+          <a:lin ang="16200000" scaled="0"/>
+        </a:gradFill>
+      </a:fillStyleLst>
+      <a:lnStyleLst>
+        <a:ln w="9525" cap="flat" cmpd="sng" algn="ctr">
+          <a:solidFill>
+            <a:schemeClr val="phClr">
+              <a:shade val="95000"/>
+              <a:satMod val="105000"/>
+            </a:schemeClr>
+          </a:solidFill>
+          <a:prstDash val="solid"/>
+        </a:ln>
+        <a:ln w="25400" cap="flat" cmpd="sng" algn="ctr">
+          <a:solidFill>
+            <a:schemeClr val="phClr"/>
+          </a:solidFill>
+          <a:prstDash val="solid"/>
+        </a:ln>
+        <a:ln w="38100" cap="flat" cmpd="sng" algn="ctr">
+          <a:solidFill>
+            <a:schemeClr val="phClr"/>
+          </a:solidFill>
+          <a:prstDash val="solid"/>
+        </a:ln>
+      </a:lnStyleLst>
+      <a:effectStyleLst>
+        <a:effectStyle>
+          <a:effectLst>
+            <a:outerShdw blurRad="40000" dist="20000" dir="5400000" rotWithShape="0">
+              <a:srgbClr val="000000">
+                <a:alpha val="38000"/>
+              </a:srgbClr>
+            </a:outerShdw>
+          </a:effectLst>
+        </a:effectStyle>
+        <a:effectStyle>
+          <a:effectLst>
+            <a:outerShdw blurRad="40000" dist="23000" dir="5400000" rotWithShape="0">
+              <a:srgbClr val="000000">
+                <a:alpha val="35000"/>
+              </a:srgbClr>
+            </a:outerShdw>
+          </a:effectLst>
+        </a:effectStyle>
+        <a:effectStyle>
+          <a:effectLst>
+            <a:outerShdw blurRad="40000" dist="23000" dir="5400000" rotWithShape="0">
+              <a:srgbClr val="000000">
+                <a:alpha val="35000"/>
+              </a:srgbClr>
+            </a:outerShdw>
+          </a:effectLst>
+          <a:scene3d>
+            <a:camera prst="orthographicFront">
+              <a:rot lat="0" lon="0" rev="0"/>
+            </a:camera>
+            <a:lightRig rig="threePt" dir="t">
+              <a:rot lat="0" lon="0" rev="1200000"/>
+            </a:lightRig>
+          </a:scene3d>
+          <a:sp3d>
+            <a:bevelT w="63500" h="25400"/>
+          </a:sp3d>
+        </a:effectStyle>
+      </a:effectStyleLst>
+      <a:bgFillStyleLst>
+        <a:solidFill>
+          <a:schemeClr val="phClr"/>
+        </a:solidFill>
+        <a:gradFill rotWithShape="1">
+          <a:gsLst>
+            <a:gs pos="0">
+              <a:schemeClr val="phClr">
+                <a:tint val="40000"/>
+                <a:satMod val="350000"/>
+              </a:schemeClr>
+            </a:gs>
+            <a:gs pos="40000">
+              <a:schemeClr val="phClr">
+                <a:tint val="45000"/>
+                <a:shade val="99000"/>
+                <a:satMod val="350000"/>
+              </a:schemeClr>
+            </a:gs>
+            <a:gs pos="100000">
+              <a:schemeClr val="phClr">
+                <a:shade val="20000"/>
+                <a:satMod val="255000"/>
+              </a:schemeClr>
+            </a:gs>
+          </a:gsLst>
+          <a:path path="circle">
+            <a:fillToRect l="50000" t="-80000" r="50000" b="180000"/>
+          </a:path>
+        </a:gradFill>
+        <a:gradFill rotWithShape="1">
+          <a:gsLst>
+            <a:gs pos="0">
+              <a:schemeClr val="phClr">
+                <a:tint val="80000"/>
+                <a:satMod val="300000"/>
+              </a:schemeClr>
+            </a:gs>
+            <a:gs pos="100000">
+              <a:schemeClr val="phClr">
+                <a:shade val="30000"/>
+                <a:satMod val="200000"/>
+              </a:schemeClr>
+            </a:gs>
+          </a:gsLst>
+          <a:path path="circle">
+            <a:fillToRect l="50000" t="50000" r="50000" b="50000"/>
+          </a:path>
+        </a:gradFill>
+      </a:bgFillStyleLst>
+    </a:fmtScheme>
+  </a:themeElements>
+</a:theme>
+</file>
+
+<file path=ppt/theme/theme2.xml><?xml version="1.0" encoding="utf-8"?>
 <a:theme xmlns:a="http://schemas.openxmlformats.org/drawingml/2006/main" xmlns:r="http://schemas.openxmlformats.org/officeDocument/2006/relationships" name="Simple Dark">
   <a:themeElements>
     <a:clrScheme name="Simple Dark">
@@ -15301,283 +16977,4 @@
     </a:fmtScheme>
   </a:themeElements>
 </a:theme>
-</file>
-
-<file path=ppt/theme/theme2.xml><?xml version="1.0" encoding="utf-8"?>
-<a:theme xmlns:a="http://schemas.openxmlformats.org/drawingml/2006/main" xmlns:r="http://schemas.openxmlformats.org/officeDocument/2006/relationships">
-  <a:themeElements>
-    <a:clrScheme name="Default">
-      <a:dk1>
-        <a:srgbClr val="000000"/>
-      </a:dk1>
-      <a:lt1>
-        <a:srgbClr val="FFFFFF"/>
-      </a:lt1>
-      <a:dk2>
-        <a:srgbClr val="158158"/>
-      </a:dk2>
-      <a:lt2>
-        <a:srgbClr val="F3F3F3"/>
-      </a:lt2>
-      <a:accent1>
-        <a:srgbClr val="058DC7"/>
-      </a:accent1>
-      <a:accent2>
-        <a:srgbClr val="50B432"/>
-      </a:accent2>
-      <a:accent3>
-        <a:srgbClr val="ED561B"/>
-      </a:accent3>
-      <a:accent4>
-        <a:srgbClr val="EDEF00"/>
-      </a:accent4>
-      <a:accent5>
-        <a:srgbClr val="24CBE5"/>
-      </a:accent5>
-      <a:accent6>
-        <a:srgbClr val="64E572"/>
-      </a:accent6>
-      <a:hlink>
-        <a:srgbClr val="2200CC"/>
-      </a:hlink>
-      <a:folHlink>
-        <a:srgbClr val="551A8B"/>
-      </a:folHlink>
-    </a:clrScheme>
-    <a:fontScheme name="Office">
-      <a:majorFont>
-        <a:latin typeface="Arial"/>
-        <a:ea typeface=""/>
-        <a:cs typeface=""/>
-        <a:font script="Jpan" typeface="ＭＳ Ｐゴシック"/>
-        <a:font script="Hang" typeface="맑은 고딕"/>
-        <a:font script="Hans" typeface="宋体"/>
-        <a:font script="Hant" typeface="新細明體"/>
-        <a:font script="Arab" typeface="Times New Roman"/>
-        <a:font script="Hebr" typeface="Times New Roman"/>
-        <a:font script="Thai" typeface="Angsana New"/>
-        <a:font script="Ethi" typeface="Nyala"/>
-        <a:font script="Beng" typeface="Vrinda"/>
-        <a:font script="Gujr" typeface="Shruti"/>
-        <a:font script="Khmr" typeface="MoolBoran"/>
-        <a:font script="Knda" typeface="Tunga"/>
-        <a:font script="Guru" typeface="Raavi"/>
-        <a:font script="Cans" typeface="Euphemia"/>
-        <a:font script="Cher" typeface="Plantagenet Cherokee"/>
-        <a:font script="Yiii" typeface="Microsoft Yi Baiti"/>
-        <a:font script="Tibt" typeface="Microsoft Himalaya"/>
-        <a:font script="Thaa" typeface="MV Boli"/>
-        <a:font script="Deva" typeface="Mangal"/>
-        <a:font script="Telu" typeface="Gautami"/>
-        <a:font script="Taml" typeface="Latha"/>
-        <a:font script="Syrc" typeface="Estrangelo Edessa"/>
-        <a:font script="Orya" typeface="Kalinga"/>
-        <a:font script="Mlym" typeface="Kartika"/>
-        <a:font script="Laoo" typeface="DokChampa"/>
-        <a:font script="Sinh" typeface="Iskoola Pota"/>
-        <a:font script="Mong" typeface="Mongolian Baiti"/>
-        <a:font script="Viet" typeface="Times New Roman"/>
-        <a:font script="Uigh" typeface="Microsoft Uighur"/>
-        <a:font script="Geor" typeface="Sylfaen"/>
-      </a:majorFont>
-      <a:minorFont>
-        <a:latin typeface="Arial"/>
-        <a:ea typeface=""/>
-        <a:cs typeface=""/>
-        <a:font script="Jpan" typeface="ＭＳ Ｐゴシック"/>
-        <a:font script="Hang" typeface="맑은 고딕"/>
-        <a:font script="Hans" typeface="宋体"/>
-        <a:font script="Hant" typeface="新細明體"/>
-        <a:font script="Arab" typeface="Arial"/>
-        <a:font script="Hebr" typeface="Arial"/>
-        <a:font script="Thai" typeface="Cordia New"/>
-        <a:font script="Ethi" typeface="Nyala"/>
-        <a:font script="Beng" typeface="Vrinda"/>
-        <a:font script="Gujr" typeface="Shruti"/>
-        <a:font script="Khmr" typeface="DaunPenh"/>
-        <a:font script="Knda" typeface="Tunga"/>
-        <a:font script="Guru" typeface="Raavi"/>
-        <a:font script="Cans" typeface="Euphemia"/>
-        <a:font script="Cher" typeface="Plantagenet Cherokee"/>
-        <a:font script="Yiii" typeface="Microsoft Yi Baiti"/>
-        <a:font script="Tibt" typeface="Microsoft Himalaya"/>
-        <a:font script="Thaa" typeface="MV Boli"/>
-        <a:font script="Deva" typeface="Mangal"/>
-        <a:font script="Telu" typeface="Gautami"/>
-        <a:font script="Taml" typeface="Latha"/>
-        <a:font script="Syrc" typeface="Estrangelo Edessa"/>
-        <a:font script="Orya" typeface="Kalinga"/>
-        <a:font script="Mlym" typeface="Kartika"/>
-        <a:font script="Laoo" typeface="DokChampa"/>
-        <a:font script="Sinh" typeface="Iskoola Pota"/>
-        <a:font script="Mong" typeface="Mongolian Baiti"/>
-        <a:font script="Viet" typeface="Arial"/>
-        <a:font script="Uigh" typeface="Microsoft Uighur"/>
-        <a:font script="Geor" typeface="Sylfaen"/>
-      </a:minorFont>
-    </a:fontScheme>
-    <a:fmtScheme name="Office">
-      <a:fillStyleLst>
-        <a:solidFill>
-          <a:schemeClr val="phClr"/>
-        </a:solidFill>
-        <a:gradFill rotWithShape="1">
-          <a:gsLst>
-            <a:gs pos="0">
-              <a:schemeClr val="phClr">
-                <a:tint val="50000"/>
-                <a:satMod val="300000"/>
-              </a:schemeClr>
-            </a:gs>
-            <a:gs pos="35000">
-              <a:schemeClr val="phClr">
-                <a:tint val="37000"/>
-                <a:satMod val="300000"/>
-              </a:schemeClr>
-            </a:gs>
-            <a:gs pos="100000">
-              <a:schemeClr val="phClr">
-                <a:tint val="15000"/>
-                <a:satMod val="350000"/>
-              </a:schemeClr>
-            </a:gs>
-          </a:gsLst>
-          <a:lin ang="16200000" scaled="1"/>
-        </a:gradFill>
-        <a:gradFill rotWithShape="1">
-          <a:gsLst>
-            <a:gs pos="0">
-              <a:schemeClr val="phClr">
-                <a:tint val="100000"/>
-                <a:shade val="100000"/>
-                <a:satMod val="130000"/>
-              </a:schemeClr>
-            </a:gs>
-            <a:gs pos="100000">
-              <a:schemeClr val="phClr">
-                <a:tint val="50000"/>
-                <a:shade val="100000"/>
-                <a:satMod val="350000"/>
-              </a:schemeClr>
-            </a:gs>
-          </a:gsLst>
-          <a:lin ang="16200000" scaled="0"/>
-        </a:gradFill>
-      </a:fillStyleLst>
-      <a:lnStyleLst>
-        <a:ln w="9525" cap="flat" cmpd="sng" algn="ctr">
-          <a:solidFill>
-            <a:schemeClr val="phClr">
-              <a:shade val="95000"/>
-              <a:satMod val="105000"/>
-            </a:schemeClr>
-          </a:solidFill>
-          <a:prstDash val="solid"/>
-        </a:ln>
-        <a:ln w="25400" cap="flat" cmpd="sng" algn="ctr">
-          <a:solidFill>
-            <a:schemeClr val="phClr"/>
-          </a:solidFill>
-          <a:prstDash val="solid"/>
-        </a:ln>
-        <a:ln w="38100" cap="flat" cmpd="sng" algn="ctr">
-          <a:solidFill>
-            <a:schemeClr val="phClr"/>
-          </a:solidFill>
-          <a:prstDash val="solid"/>
-        </a:ln>
-      </a:lnStyleLst>
-      <a:effectStyleLst>
-        <a:effectStyle>
-          <a:effectLst>
-            <a:outerShdw blurRad="40000" dist="20000" dir="5400000" rotWithShape="0">
-              <a:srgbClr val="000000">
-                <a:alpha val="38000"/>
-              </a:srgbClr>
-            </a:outerShdw>
-          </a:effectLst>
-        </a:effectStyle>
-        <a:effectStyle>
-          <a:effectLst>
-            <a:outerShdw blurRad="40000" dist="23000" dir="5400000" rotWithShape="0">
-              <a:srgbClr val="000000">
-                <a:alpha val="35000"/>
-              </a:srgbClr>
-            </a:outerShdw>
-          </a:effectLst>
-        </a:effectStyle>
-        <a:effectStyle>
-          <a:effectLst>
-            <a:outerShdw blurRad="40000" dist="23000" dir="5400000" rotWithShape="0">
-              <a:srgbClr val="000000">
-                <a:alpha val="35000"/>
-              </a:srgbClr>
-            </a:outerShdw>
-          </a:effectLst>
-          <a:scene3d>
-            <a:camera prst="orthographicFront">
-              <a:rot lat="0" lon="0" rev="0"/>
-            </a:camera>
-            <a:lightRig rig="threePt" dir="t">
-              <a:rot lat="0" lon="0" rev="1200000"/>
-            </a:lightRig>
-          </a:scene3d>
-          <a:sp3d>
-            <a:bevelT w="63500" h="25400"/>
-          </a:sp3d>
-        </a:effectStyle>
-      </a:effectStyleLst>
-      <a:bgFillStyleLst>
-        <a:solidFill>
-          <a:schemeClr val="phClr"/>
-        </a:solidFill>
-        <a:gradFill rotWithShape="1">
-          <a:gsLst>
-            <a:gs pos="0">
-              <a:schemeClr val="phClr">
-                <a:tint val="40000"/>
-                <a:satMod val="350000"/>
-              </a:schemeClr>
-            </a:gs>
-            <a:gs pos="40000">
-              <a:schemeClr val="phClr">
-                <a:tint val="45000"/>
-                <a:shade val="99000"/>
-                <a:satMod val="350000"/>
-              </a:schemeClr>
-            </a:gs>
-            <a:gs pos="100000">
-              <a:schemeClr val="phClr">
-                <a:shade val="20000"/>
-                <a:satMod val="255000"/>
-              </a:schemeClr>
-            </a:gs>
-          </a:gsLst>
-          <a:path path="circle">
-            <a:fillToRect l="50000" t="-80000" r="50000" b="180000"/>
-          </a:path>
-        </a:gradFill>
-        <a:gradFill rotWithShape="1">
-          <a:gsLst>
-            <a:gs pos="0">
-              <a:schemeClr val="phClr">
-                <a:tint val="80000"/>
-                <a:satMod val="300000"/>
-              </a:schemeClr>
-            </a:gs>
-            <a:gs pos="100000">
-              <a:schemeClr val="phClr">
-                <a:shade val="30000"/>
-                <a:satMod val="200000"/>
-              </a:schemeClr>
-            </a:gs>
-          </a:gsLst>
-          <a:path path="circle">
-            <a:fillToRect l="50000" t="50000" r="50000" b="50000"/>
-          </a:path>
-        </a:gradFill>
-      </a:bgFillStyleLst>
-    </a:fmtScheme>
-  </a:themeElements>
-</a:theme>
 </file>
</xml_diff>

<commit_message>
Add and Move Items
</commit_message>
<xml_diff>
--- a/Banners/Banners.pptx
+++ b/Banners/Banners.pptx
@@ -25,6 +25,9 @@
     <p:sldId id="270" r:id="rId20"/>
     <p:sldId id="271" r:id="rId21"/>
     <p:sldId id="272" r:id="rId22"/>
+    <p:sldId id="273" r:id="rId23"/>
+    <p:sldId id="274" r:id="rId24"/>
+    <p:sldId id="275" r:id="rId25"/>
   </p:sldIdLst>
   <p:sldSz cy="5143500" cx="9144000"/>
   <p:notesSz cx="6858000" cy="9144000"/>
@@ -5895,6 +5898,1334 @@
 </p:notes>
 </file>
 
+<file path=ppt/notesSlides/notesSlide18.xml><?xml version="1.0" encoding="utf-8"?>
+<p:notes xmlns:a="http://schemas.openxmlformats.org/drawingml/2006/main" xmlns:r="http://schemas.openxmlformats.org/officeDocument/2006/relationships" xmlns:mc="http://schemas.openxmlformats.org/markup-compatibility/2006" xmlns:mv="urn:schemas-microsoft-com:mac:vml" xmlns:p="http://schemas.openxmlformats.org/presentationml/2006/main" xmlns:c="http://schemas.openxmlformats.org/drawingml/2006/chart" xmlns:dgm="http://schemas.openxmlformats.org/drawingml/2006/diagram" xmlns:o="urn:schemas-microsoft-com:office:office" xmlns:v="urn:schemas-microsoft-com:vml" xmlns:pvml="urn:schemas-microsoft-com:office:powerpoint" xmlns:com="http://schemas.openxmlformats.org/drawingml/2006/compatibility" xmlns:p14="http://schemas.microsoft.com/office/powerpoint/2010/main" xmlns:p15="http://schemas.microsoft.com/office/powerpoint/2012/main" xmlns:ahyp="http://schemas.microsoft.com/office/drawing/2018/hyperlinkcolor" showMasterPhAnim="0" showMasterSp="0">
+  <p:cSld>
+    <p:spTree>
+      <p:nvGrpSpPr>
+        <p:cNvPr id="135" name="Shape 135"/>
+        <p:cNvGrpSpPr/>
+        <p:nvPr/>
+      </p:nvGrpSpPr>
+      <p:grpSpPr>
+        <a:xfrm>
+          <a:off x="0" y="0"/>
+          <a:ext cx="0" cy="0"/>
+          <a:chOff x="0" y="0"/>
+          <a:chExt cx="0" cy="0"/>
+        </a:xfrm>
+      </p:grpSpPr>
+      <p:sp>
+        <p:nvSpPr>
+          <p:cNvPr id="136" name="Google Shape;136;g2539ed2c52f_0_0:notes"/>
+          <p:cNvSpPr/>
+          <p:nvPr>
+            <p:ph idx="2" type="sldImg"/>
+          </p:nvPr>
+        </p:nvSpPr>
+        <p:spPr>
+          <a:xfrm>
+            <a:off x="381300" y="685800"/>
+            <a:ext cx="6096000" cy="3429000"/>
+          </a:xfrm>
+          <a:custGeom>
+            <a:rect b="b" l="l" r="r" t="t"/>
+            <a:pathLst>
+              <a:path extrusionOk="0" h="120000" w="120000">
+                <a:moveTo>
+                  <a:pt x="0" y="0"/>
+                </a:moveTo>
+                <a:lnTo>
+                  <a:pt x="120000" y="0"/>
+                </a:lnTo>
+                <a:lnTo>
+                  <a:pt x="120000" y="120000"/>
+                </a:lnTo>
+                <a:lnTo>
+                  <a:pt x="0" y="120000"/>
+                </a:lnTo>
+                <a:close/>
+              </a:path>
+            </a:pathLst>
+          </a:custGeom>
+        </p:spPr>
+      </p:sp>
+      <p:sp>
+        <p:nvSpPr>
+          <p:cNvPr id="137" name="Google Shape;137;g2539ed2c52f_0_0:notes"/>
+          <p:cNvSpPr txBox="1"/>
+          <p:nvPr>
+            <p:ph idx="1" type="body"/>
+          </p:nvPr>
+        </p:nvSpPr>
+        <p:spPr>
+          <a:xfrm>
+            <a:off x="685800" y="4343400"/>
+            <a:ext cx="5486400" cy="4114800"/>
+          </a:xfrm>
+          <a:prstGeom prst="rect">
+            <a:avLst/>
+          </a:prstGeom>
+        </p:spPr>
+        <p:txBody>
+          <a:bodyPr anchorCtr="0" anchor="t" bIns="91425" lIns="91425" spcFirstLastPara="1" rIns="91425" wrap="square" tIns="91425">
+            <a:noAutofit/>
+          </a:bodyPr>
+          <a:lstStyle/>
+          <a:p>
+            <a:pPr indent="0" lvl="0" marL="0" rtl="0" algn="l">
+              <a:spcBef>
+                <a:spcPts val="0"/>
+              </a:spcBef>
+              <a:spcAft>
+                <a:spcPts val="0"/>
+              </a:spcAft>
+              <a:buClr>
+                <a:schemeClr val="dk1"/>
+              </a:buClr>
+              <a:buSzPts val="1100"/>
+              <a:buFont typeface="Arial"/>
+              <a:buNone/>
+            </a:pPr>
+            <a:r>
+              <a:rPr lang="en">
+                <a:solidFill>
+                  <a:schemeClr val="dk1"/>
+                </a:solidFill>
+              </a:rPr>
+              <a:t>1 - Central Minaria</a:t>
+            </a:r>
+            <a:endParaRPr>
+              <a:solidFill>
+                <a:schemeClr val="dk1"/>
+              </a:solidFill>
+            </a:endParaRPr>
+          </a:p>
+          <a:p>
+            <a:pPr indent="0" lvl="0" marL="0" rtl="0" algn="l">
+              <a:spcBef>
+                <a:spcPts val="0"/>
+              </a:spcBef>
+              <a:spcAft>
+                <a:spcPts val="0"/>
+              </a:spcAft>
+              <a:buClr>
+                <a:schemeClr val="dk1"/>
+              </a:buClr>
+              <a:buSzPts val="1100"/>
+              <a:buFont typeface="Arial"/>
+              <a:buNone/>
+            </a:pPr>
+            <a:r>
+              <a:rPr lang="en">
+                <a:solidFill>
+                  <a:schemeClr val="dk1"/>
+                </a:solidFill>
+              </a:rPr>
+              <a:t>2 - Chauntea</a:t>
+            </a:r>
+            <a:endParaRPr>
+              <a:solidFill>
+                <a:schemeClr val="dk1"/>
+              </a:solidFill>
+            </a:endParaRPr>
+          </a:p>
+          <a:p>
+            <a:pPr indent="0" lvl="0" marL="0" rtl="0" algn="l">
+              <a:spcBef>
+                <a:spcPts val="0"/>
+              </a:spcBef>
+              <a:spcAft>
+                <a:spcPts val="0"/>
+              </a:spcAft>
+              <a:buClr>
+                <a:schemeClr val="dk1"/>
+              </a:buClr>
+              <a:buSzPts val="1100"/>
+              <a:buFont typeface="Arial"/>
+              <a:buNone/>
+            </a:pPr>
+            <a:r>
+              <a:rPr lang="en">
+                <a:solidFill>
+                  <a:schemeClr val="dk1"/>
+                </a:solidFill>
+              </a:rPr>
+              <a:t>3 - East Side Minaria</a:t>
+            </a:r>
+            <a:endParaRPr>
+              <a:solidFill>
+                <a:schemeClr val="dk1"/>
+              </a:solidFill>
+            </a:endParaRPr>
+          </a:p>
+          <a:p>
+            <a:pPr indent="0" lvl="0" marL="0" rtl="0" algn="l">
+              <a:spcBef>
+                <a:spcPts val="0"/>
+              </a:spcBef>
+              <a:spcAft>
+                <a:spcPts val="0"/>
+              </a:spcAft>
+              <a:buClr>
+                <a:schemeClr val="dk1"/>
+              </a:buClr>
+              <a:buSzPts val="1100"/>
+              <a:buFont typeface="Arial"/>
+              <a:buNone/>
+            </a:pPr>
+            <a:r>
+              <a:rPr lang="en">
+                <a:solidFill>
+                  <a:schemeClr val="dk1"/>
+                </a:solidFill>
+              </a:rPr>
+              <a:t>4 - Exynn</a:t>
+            </a:r>
+            <a:endParaRPr>
+              <a:solidFill>
+                <a:schemeClr val="dk1"/>
+              </a:solidFill>
+            </a:endParaRPr>
+          </a:p>
+          <a:p>
+            <a:pPr indent="0" lvl="0" marL="0" rtl="0" algn="l">
+              <a:spcBef>
+                <a:spcPts val="0"/>
+              </a:spcBef>
+              <a:spcAft>
+                <a:spcPts val="0"/>
+              </a:spcAft>
+              <a:buClr>
+                <a:schemeClr val="dk1"/>
+              </a:buClr>
+              <a:buSzPts val="1100"/>
+              <a:buFont typeface="Arial"/>
+              <a:buNone/>
+            </a:pPr>
+            <a:r>
+              <a:rPr lang="en">
+                <a:solidFill>
+                  <a:schemeClr val="dk1"/>
+                </a:solidFill>
+              </a:rPr>
+              <a:t>5 - Flatcoat</a:t>
+            </a:r>
+            <a:endParaRPr>
+              <a:solidFill>
+                <a:schemeClr val="dk1"/>
+              </a:solidFill>
+            </a:endParaRPr>
+          </a:p>
+          <a:p>
+            <a:pPr indent="0" lvl="0" marL="0" rtl="0" algn="l">
+              <a:spcBef>
+                <a:spcPts val="0"/>
+              </a:spcBef>
+              <a:spcAft>
+                <a:spcPts val="0"/>
+              </a:spcAft>
+              <a:buClr>
+                <a:schemeClr val="dk1"/>
+              </a:buClr>
+              <a:buSzPts val="1100"/>
+              <a:buFont typeface="Arial"/>
+              <a:buNone/>
+            </a:pPr>
+            <a:r>
+              <a:rPr lang="en">
+                <a:solidFill>
+                  <a:schemeClr val="dk1"/>
+                </a:solidFill>
+              </a:rPr>
+              <a:t>6 - Grumbar</a:t>
+            </a:r>
+            <a:endParaRPr>
+              <a:solidFill>
+                <a:schemeClr val="dk1"/>
+              </a:solidFill>
+            </a:endParaRPr>
+          </a:p>
+          <a:p>
+            <a:pPr indent="0" lvl="0" marL="0" rtl="0" algn="l">
+              <a:spcBef>
+                <a:spcPts val="0"/>
+              </a:spcBef>
+              <a:spcAft>
+                <a:spcPts val="0"/>
+              </a:spcAft>
+              <a:buClr>
+                <a:schemeClr val="dk1"/>
+              </a:buClr>
+              <a:buSzPts val="1100"/>
+              <a:buFont typeface="Arial"/>
+              <a:buNone/>
+            </a:pPr>
+            <a:r>
+              <a:rPr lang="en">
+                <a:solidFill>
+                  <a:schemeClr val="dk1"/>
+                </a:solidFill>
+              </a:rPr>
+              <a:t>7 - Holdfast</a:t>
+            </a:r>
+            <a:endParaRPr>
+              <a:solidFill>
+                <a:schemeClr val="dk1"/>
+              </a:solidFill>
+            </a:endParaRPr>
+          </a:p>
+          <a:p>
+            <a:pPr indent="0" lvl="0" marL="0" rtl="0" algn="l">
+              <a:spcBef>
+                <a:spcPts val="0"/>
+              </a:spcBef>
+              <a:spcAft>
+                <a:spcPts val="0"/>
+              </a:spcAft>
+              <a:buClr>
+                <a:schemeClr val="dk1"/>
+              </a:buClr>
+              <a:buSzPts val="1100"/>
+              <a:buFont typeface="Arial"/>
+              <a:buNone/>
+            </a:pPr>
+            <a:r>
+              <a:rPr lang="en">
+                <a:solidFill>
+                  <a:schemeClr val="dk1"/>
+                </a:solidFill>
+              </a:rPr>
+              <a:t>8 - Justice Bringers</a:t>
+            </a:r>
+            <a:endParaRPr>
+              <a:solidFill>
+                <a:schemeClr val="dk1"/>
+              </a:solidFill>
+            </a:endParaRPr>
+          </a:p>
+          <a:p>
+            <a:pPr indent="0" lvl="0" marL="0" rtl="0" algn="l">
+              <a:spcBef>
+                <a:spcPts val="0"/>
+              </a:spcBef>
+              <a:spcAft>
+                <a:spcPts val="0"/>
+              </a:spcAft>
+              <a:buClr>
+                <a:schemeClr val="dk1"/>
+              </a:buClr>
+              <a:buSzPts val="1100"/>
+              <a:buFont typeface="Arial"/>
+              <a:buNone/>
+            </a:pPr>
+            <a:r>
+              <a:rPr lang="en">
+                <a:solidFill>
+                  <a:schemeClr val="dk1"/>
+                </a:solidFill>
+              </a:rPr>
+              <a:t>9 - Kelemvor</a:t>
+            </a:r>
+            <a:endParaRPr>
+              <a:solidFill>
+                <a:schemeClr val="dk1"/>
+              </a:solidFill>
+            </a:endParaRPr>
+          </a:p>
+          <a:p>
+            <a:pPr indent="0" lvl="0" marL="0" rtl="0" algn="l">
+              <a:spcBef>
+                <a:spcPts val="0"/>
+              </a:spcBef>
+              <a:spcAft>
+                <a:spcPts val="0"/>
+              </a:spcAft>
+              <a:buClr>
+                <a:schemeClr val="dk1"/>
+              </a:buClr>
+              <a:buSzPts val="1100"/>
+              <a:buFont typeface="Arial"/>
+              <a:buNone/>
+            </a:pPr>
+            <a:r>
+              <a:rPr lang="en">
+                <a:solidFill>
+                  <a:schemeClr val="dk1"/>
+                </a:solidFill>
+              </a:rPr>
+              <a:t>10 - Minaria</a:t>
+            </a:r>
+            <a:endParaRPr>
+              <a:solidFill>
+                <a:schemeClr val="dk1"/>
+              </a:solidFill>
+            </a:endParaRPr>
+          </a:p>
+          <a:p>
+            <a:pPr indent="0" lvl="0" marL="0" rtl="0" algn="l">
+              <a:spcBef>
+                <a:spcPts val="0"/>
+              </a:spcBef>
+              <a:spcAft>
+                <a:spcPts val="0"/>
+              </a:spcAft>
+              <a:buClr>
+                <a:schemeClr val="dk1"/>
+              </a:buClr>
+              <a:buSzPts val="1100"/>
+              <a:buFont typeface="Arial"/>
+              <a:buNone/>
+            </a:pPr>
+            <a:r>
+              <a:rPr lang="en">
+                <a:solidFill>
+                  <a:schemeClr val="dk1"/>
+                </a:solidFill>
+              </a:rPr>
+              <a:t>11 - Myrkul</a:t>
+            </a:r>
+            <a:endParaRPr>
+              <a:solidFill>
+                <a:schemeClr val="dk1"/>
+              </a:solidFill>
+            </a:endParaRPr>
+          </a:p>
+          <a:p>
+            <a:pPr indent="0" lvl="0" marL="0" rtl="0" algn="l">
+              <a:spcBef>
+                <a:spcPts val="0"/>
+              </a:spcBef>
+              <a:spcAft>
+                <a:spcPts val="0"/>
+              </a:spcAft>
+              <a:buClr>
+                <a:schemeClr val="dk1"/>
+              </a:buClr>
+              <a:buSzPts val="1100"/>
+              <a:buFont typeface="Arial"/>
+              <a:buNone/>
+            </a:pPr>
+            <a:r>
+              <a:rPr lang="en">
+                <a:solidFill>
+                  <a:schemeClr val="dk1"/>
+                </a:solidFill>
+              </a:rPr>
+              <a:t>12 - Talos</a:t>
+            </a:r>
+            <a:endParaRPr>
+              <a:solidFill>
+                <a:schemeClr val="dk1"/>
+              </a:solidFill>
+            </a:endParaRPr>
+          </a:p>
+          <a:p>
+            <a:pPr indent="0" lvl="0" marL="0" rtl="0" algn="l">
+              <a:spcBef>
+                <a:spcPts val="0"/>
+              </a:spcBef>
+              <a:spcAft>
+                <a:spcPts val="0"/>
+              </a:spcAft>
+              <a:buClr>
+                <a:schemeClr val="dk1"/>
+              </a:buClr>
+              <a:buSzPts val="1100"/>
+              <a:buFont typeface="Arial"/>
+              <a:buNone/>
+            </a:pPr>
+            <a:r>
+              <a:rPr lang="en">
+                <a:solidFill>
+                  <a:schemeClr val="dk1"/>
+                </a:solidFill>
+              </a:rPr>
+              <a:t>13 - Veronna</a:t>
+            </a:r>
+            <a:endParaRPr>
+              <a:solidFill>
+                <a:schemeClr val="dk1"/>
+              </a:solidFill>
+            </a:endParaRPr>
+          </a:p>
+          <a:p>
+            <a:pPr indent="0" lvl="0" marL="0" rtl="0" algn="l">
+              <a:spcBef>
+                <a:spcPts val="0"/>
+              </a:spcBef>
+              <a:spcAft>
+                <a:spcPts val="0"/>
+              </a:spcAft>
+              <a:buClr>
+                <a:schemeClr val="dk1"/>
+              </a:buClr>
+              <a:buSzPts val="1100"/>
+              <a:buFont typeface="Arial"/>
+              <a:buNone/>
+            </a:pPr>
+            <a:r>
+              <a:rPr lang="en">
+                <a:solidFill>
+                  <a:schemeClr val="dk1"/>
+                </a:solidFill>
+              </a:rPr>
+              <a:t>14 - West Side Minaria</a:t>
+            </a:r>
+            <a:endParaRPr>
+              <a:solidFill>
+                <a:schemeClr val="dk1"/>
+              </a:solidFill>
+            </a:endParaRPr>
+          </a:p>
+          <a:p>
+            <a:pPr indent="0" lvl="0" marL="0" rtl="0" algn="l">
+              <a:spcBef>
+                <a:spcPts val="0"/>
+              </a:spcBef>
+              <a:spcAft>
+                <a:spcPts val="0"/>
+              </a:spcAft>
+              <a:buClr>
+                <a:schemeClr val="dk1"/>
+              </a:buClr>
+              <a:buSzPts val="1100"/>
+              <a:buFont typeface="Arial"/>
+              <a:buNone/>
+            </a:pPr>
+            <a:r>
+              <a:rPr lang="en">
+                <a:solidFill>
+                  <a:schemeClr val="dk1"/>
+                </a:solidFill>
+              </a:rPr>
+              <a:t>15 - Zehir</a:t>
+            </a:r>
+            <a:endParaRPr>
+              <a:solidFill>
+                <a:schemeClr val="dk1"/>
+              </a:solidFill>
+            </a:endParaRPr>
+          </a:p>
+          <a:p>
+            <a:pPr indent="0" lvl="0" marL="0" rtl="0" algn="l">
+              <a:spcBef>
+                <a:spcPts val="0"/>
+              </a:spcBef>
+              <a:spcAft>
+                <a:spcPts val="0"/>
+              </a:spcAft>
+              <a:buClr>
+                <a:schemeClr val="dk1"/>
+              </a:buClr>
+              <a:buSzPts val="1100"/>
+              <a:buFont typeface="Arial"/>
+              <a:buNone/>
+            </a:pPr>
+            <a:r>
+              <a:rPr lang="en">
+                <a:solidFill>
+                  <a:schemeClr val="dk1"/>
+                </a:solidFill>
+              </a:rPr>
+              <a:t>16 - Hadaar</a:t>
+            </a:r>
+            <a:endParaRPr>
+              <a:solidFill>
+                <a:schemeClr val="dk1"/>
+              </a:solidFill>
+            </a:endParaRPr>
+          </a:p>
+          <a:p>
+            <a:pPr indent="0" lvl="0" marL="0" rtl="0" algn="l">
+              <a:spcBef>
+                <a:spcPts val="0"/>
+              </a:spcBef>
+              <a:spcAft>
+                <a:spcPts val="0"/>
+              </a:spcAft>
+              <a:buClr>
+                <a:schemeClr val="dk1"/>
+              </a:buClr>
+              <a:buSzPts val="1100"/>
+              <a:buFont typeface="Arial"/>
+              <a:buNone/>
+            </a:pPr>
+            <a:r>
+              <a:rPr lang="en">
+                <a:solidFill>
+                  <a:schemeClr val="dk1"/>
+                </a:solidFill>
+              </a:rPr>
+              <a:t>17 - Laughing Knives</a:t>
+            </a:r>
+            <a:endParaRPr>
+              <a:solidFill>
+                <a:schemeClr val="dk1"/>
+              </a:solidFill>
+            </a:endParaRPr>
+          </a:p>
+          <a:p>
+            <a:pPr indent="0" lvl="0" marL="0" rtl="0" algn="l">
+              <a:spcBef>
+                <a:spcPts val="0"/>
+              </a:spcBef>
+              <a:spcAft>
+                <a:spcPts val="0"/>
+              </a:spcAft>
+              <a:buClr>
+                <a:schemeClr val="dk1"/>
+              </a:buClr>
+              <a:buSzPts val="1100"/>
+              <a:buFont typeface="Arial"/>
+              <a:buNone/>
+            </a:pPr>
+            <a:r>
+              <a:rPr lang="en">
+                <a:solidFill>
+                  <a:schemeClr val="dk1"/>
+                </a:solidFill>
+              </a:rPr>
+              <a:t>18 - Peralat Sword</a:t>
+            </a:r>
+            <a:endParaRPr>
+              <a:solidFill>
+                <a:schemeClr val="dk1"/>
+              </a:solidFill>
+            </a:endParaRPr>
+          </a:p>
+          <a:p>
+            <a:pPr indent="0" lvl="0" marL="0" rtl="0" algn="l">
+              <a:spcBef>
+                <a:spcPts val="0"/>
+              </a:spcBef>
+              <a:spcAft>
+                <a:spcPts val="0"/>
+              </a:spcAft>
+              <a:buClr>
+                <a:schemeClr val="dk1"/>
+              </a:buClr>
+              <a:buSzPts val="1100"/>
+              <a:buFont typeface="Arial"/>
+              <a:buNone/>
+            </a:pPr>
+            <a:r>
+              <a:rPr lang="en">
+                <a:solidFill>
+                  <a:schemeClr val="dk1"/>
+                </a:solidFill>
+              </a:rPr>
+              <a:t>19 - Peralat Armor</a:t>
+            </a:r>
+            <a:endParaRPr>
+              <a:solidFill>
+                <a:schemeClr val="dk1"/>
+              </a:solidFill>
+            </a:endParaRPr>
+          </a:p>
+          <a:p>
+            <a:pPr indent="0" lvl="0" marL="0" rtl="0" algn="l">
+              <a:spcBef>
+                <a:spcPts val="0"/>
+              </a:spcBef>
+              <a:spcAft>
+                <a:spcPts val="0"/>
+              </a:spcAft>
+              <a:buClr>
+                <a:schemeClr val="dk1"/>
+              </a:buClr>
+              <a:buSzPts val="1100"/>
+              <a:buFont typeface="Arial"/>
+              <a:buNone/>
+            </a:pPr>
+            <a:r>
+              <a:rPr lang="en">
+                <a:solidFill>
+                  <a:schemeClr val="dk1"/>
+                </a:solidFill>
+              </a:rPr>
+              <a:t>20 - Peralat Shield</a:t>
+            </a:r>
+            <a:endParaRPr>
+              <a:solidFill>
+                <a:schemeClr val="dk1"/>
+              </a:solidFill>
+            </a:endParaRPr>
+          </a:p>
+        </p:txBody>
+      </p:sp>
+    </p:spTree>
+  </p:cSld>
+  <p:clrMapOvr>
+    <a:masterClrMapping/>
+  </p:clrMapOvr>
+</p:notes>
+</file>
+
+<file path=ppt/notesSlides/notesSlide19.xml><?xml version="1.0" encoding="utf-8"?>
+<p:notes xmlns:a="http://schemas.openxmlformats.org/drawingml/2006/main" xmlns:r="http://schemas.openxmlformats.org/officeDocument/2006/relationships" xmlns:mc="http://schemas.openxmlformats.org/markup-compatibility/2006" xmlns:mv="urn:schemas-microsoft-com:mac:vml" xmlns:p="http://schemas.openxmlformats.org/presentationml/2006/main" xmlns:c="http://schemas.openxmlformats.org/drawingml/2006/chart" xmlns:dgm="http://schemas.openxmlformats.org/drawingml/2006/diagram" xmlns:o="urn:schemas-microsoft-com:office:office" xmlns:v="urn:schemas-microsoft-com:vml" xmlns:pvml="urn:schemas-microsoft-com:office:powerpoint" xmlns:com="http://schemas.openxmlformats.org/drawingml/2006/compatibility" xmlns:p14="http://schemas.microsoft.com/office/powerpoint/2010/main" xmlns:p15="http://schemas.microsoft.com/office/powerpoint/2012/main" xmlns:ahyp="http://schemas.microsoft.com/office/drawing/2018/hyperlinkcolor" showMasterPhAnim="0" showMasterSp="0">
+  <p:cSld>
+    <p:spTree>
+      <p:nvGrpSpPr>
+        <p:cNvPr id="140" name="Shape 140"/>
+        <p:cNvGrpSpPr/>
+        <p:nvPr/>
+      </p:nvGrpSpPr>
+      <p:grpSpPr>
+        <a:xfrm>
+          <a:off x="0" y="0"/>
+          <a:ext cx="0" cy="0"/>
+          <a:chOff x="0" y="0"/>
+          <a:chExt cx="0" cy="0"/>
+        </a:xfrm>
+      </p:grpSpPr>
+      <p:sp>
+        <p:nvSpPr>
+          <p:cNvPr id="141" name="Google Shape;141;g2539ed2c52f_0_4:notes"/>
+          <p:cNvSpPr/>
+          <p:nvPr>
+            <p:ph idx="2" type="sldImg"/>
+          </p:nvPr>
+        </p:nvSpPr>
+        <p:spPr>
+          <a:xfrm>
+            <a:off x="381300" y="685800"/>
+            <a:ext cx="6096000" cy="3429000"/>
+          </a:xfrm>
+          <a:custGeom>
+            <a:rect b="b" l="l" r="r" t="t"/>
+            <a:pathLst>
+              <a:path extrusionOk="0" h="120000" w="120000">
+                <a:moveTo>
+                  <a:pt x="0" y="0"/>
+                </a:moveTo>
+                <a:lnTo>
+                  <a:pt x="120000" y="0"/>
+                </a:lnTo>
+                <a:lnTo>
+                  <a:pt x="120000" y="120000"/>
+                </a:lnTo>
+                <a:lnTo>
+                  <a:pt x="0" y="120000"/>
+                </a:lnTo>
+                <a:close/>
+              </a:path>
+            </a:pathLst>
+          </a:custGeom>
+        </p:spPr>
+      </p:sp>
+      <p:sp>
+        <p:nvSpPr>
+          <p:cNvPr id="142" name="Google Shape;142;g2539ed2c52f_0_4:notes"/>
+          <p:cNvSpPr txBox="1"/>
+          <p:nvPr>
+            <p:ph idx="1" type="body"/>
+          </p:nvPr>
+        </p:nvSpPr>
+        <p:spPr>
+          <a:xfrm>
+            <a:off x="685800" y="4343400"/>
+            <a:ext cx="5486400" cy="4114800"/>
+          </a:xfrm>
+          <a:prstGeom prst="rect">
+            <a:avLst/>
+          </a:prstGeom>
+        </p:spPr>
+        <p:txBody>
+          <a:bodyPr anchorCtr="0" anchor="t" bIns="91425" lIns="91425" spcFirstLastPara="1" rIns="91425" wrap="square" tIns="91425">
+            <a:noAutofit/>
+          </a:bodyPr>
+          <a:lstStyle/>
+          <a:p>
+            <a:pPr indent="0" lvl="0" marL="0" rtl="0" algn="l">
+              <a:spcBef>
+                <a:spcPts val="0"/>
+              </a:spcBef>
+              <a:spcAft>
+                <a:spcPts val="0"/>
+              </a:spcAft>
+              <a:buClr>
+                <a:schemeClr val="dk1"/>
+              </a:buClr>
+              <a:buSzPts val="1100"/>
+              <a:buFont typeface="Arial"/>
+              <a:buNone/>
+            </a:pPr>
+            <a:r>
+              <a:rPr lang="en">
+                <a:solidFill>
+                  <a:schemeClr val="dk1"/>
+                </a:solidFill>
+              </a:rPr>
+              <a:t>1 - Central Minaria</a:t>
+            </a:r>
+            <a:endParaRPr>
+              <a:solidFill>
+                <a:schemeClr val="dk1"/>
+              </a:solidFill>
+            </a:endParaRPr>
+          </a:p>
+          <a:p>
+            <a:pPr indent="0" lvl="0" marL="0" rtl="0" algn="l">
+              <a:spcBef>
+                <a:spcPts val="0"/>
+              </a:spcBef>
+              <a:spcAft>
+                <a:spcPts val="0"/>
+              </a:spcAft>
+              <a:buClr>
+                <a:schemeClr val="dk1"/>
+              </a:buClr>
+              <a:buSzPts val="1100"/>
+              <a:buFont typeface="Arial"/>
+              <a:buNone/>
+            </a:pPr>
+            <a:r>
+              <a:rPr lang="en">
+                <a:solidFill>
+                  <a:schemeClr val="dk1"/>
+                </a:solidFill>
+              </a:rPr>
+              <a:t>2 - Chauntea</a:t>
+            </a:r>
+            <a:endParaRPr>
+              <a:solidFill>
+                <a:schemeClr val="dk1"/>
+              </a:solidFill>
+            </a:endParaRPr>
+          </a:p>
+          <a:p>
+            <a:pPr indent="0" lvl="0" marL="0" rtl="0" algn="l">
+              <a:spcBef>
+                <a:spcPts val="0"/>
+              </a:spcBef>
+              <a:spcAft>
+                <a:spcPts val="0"/>
+              </a:spcAft>
+              <a:buClr>
+                <a:schemeClr val="dk1"/>
+              </a:buClr>
+              <a:buSzPts val="1100"/>
+              <a:buFont typeface="Arial"/>
+              <a:buNone/>
+            </a:pPr>
+            <a:r>
+              <a:rPr lang="en">
+                <a:solidFill>
+                  <a:schemeClr val="dk1"/>
+                </a:solidFill>
+              </a:rPr>
+              <a:t>3 - East Side Minaria</a:t>
+            </a:r>
+            <a:endParaRPr>
+              <a:solidFill>
+                <a:schemeClr val="dk1"/>
+              </a:solidFill>
+            </a:endParaRPr>
+          </a:p>
+          <a:p>
+            <a:pPr indent="0" lvl="0" marL="0" rtl="0" algn="l">
+              <a:spcBef>
+                <a:spcPts val="0"/>
+              </a:spcBef>
+              <a:spcAft>
+                <a:spcPts val="0"/>
+              </a:spcAft>
+              <a:buClr>
+                <a:schemeClr val="dk1"/>
+              </a:buClr>
+              <a:buSzPts val="1100"/>
+              <a:buFont typeface="Arial"/>
+              <a:buNone/>
+            </a:pPr>
+            <a:r>
+              <a:rPr lang="en">
+                <a:solidFill>
+                  <a:schemeClr val="dk1"/>
+                </a:solidFill>
+              </a:rPr>
+              <a:t>4 - Exynn</a:t>
+            </a:r>
+            <a:endParaRPr>
+              <a:solidFill>
+                <a:schemeClr val="dk1"/>
+              </a:solidFill>
+            </a:endParaRPr>
+          </a:p>
+          <a:p>
+            <a:pPr indent="0" lvl="0" marL="0" rtl="0" algn="l">
+              <a:spcBef>
+                <a:spcPts val="0"/>
+              </a:spcBef>
+              <a:spcAft>
+                <a:spcPts val="0"/>
+              </a:spcAft>
+              <a:buClr>
+                <a:schemeClr val="dk1"/>
+              </a:buClr>
+              <a:buSzPts val="1100"/>
+              <a:buFont typeface="Arial"/>
+              <a:buNone/>
+            </a:pPr>
+            <a:r>
+              <a:rPr lang="en">
+                <a:solidFill>
+                  <a:schemeClr val="dk1"/>
+                </a:solidFill>
+              </a:rPr>
+              <a:t>5 - Flatcoat</a:t>
+            </a:r>
+            <a:endParaRPr>
+              <a:solidFill>
+                <a:schemeClr val="dk1"/>
+              </a:solidFill>
+            </a:endParaRPr>
+          </a:p>
+          <a:p>
+            <a:pPr indent="0" lvl="0" marL="0" rtl="0" algn="l">
+              <a:spcBef>
+                <a:spcPts val="0"/>
+              </a:spcBef>
+              <a:spcAft>
+                <a:spcPts val="0"/>
+              </a:spcAft>
+              <a:buClr>
+                <a:schemeClr val="dk1"/>
+              </a:buClr>
+              <a:buSzPts val="1100"/>
+              <a:buFont typeface="Arial"/>
+              <a:buNone/>
+            </a:pPr>
+            <a:r>
+              <a:rPr lang="en">
+                <a:solidFill>
+                  <a:schemeClr val="dk1"/>
+                </a:solidFill>
+              </a:rPr>
+              <a:t>6 - Grumbar</a:t>
+            </a:r>
+            <a:endParaRPr>
+              <a:solidFill>
+                <a:schemeClr val="dk1"/>
+              </a:solidFill>
+            </a:endParaRPr>
+          </a:p>
+          <a:p>
+            <a:pPr indent="0" lvl="0" marL="0" rtl="0" algn="l">
+              <a:spcBef>
+                <a:spcPts val="0"/>
+              </a:spcBef>
+              <a:spcAft>
+                <a:spcPts val="0"/>
+              </a:spcAft>
+              <a:buClr>
+                <a:schemeClr val="dk1"/>
+              </a:buClr>
+              <a:buSzPts val="1100"/>
+              <a:buFont typeface="Arial"/>
+              <a:buNone/>
+            </a:pPr>
+            <a:r>
+              <a:rPr lang="en">
+                <a:solidFill>
+                  <a:schemeClr val="dk1"/>
+                </a:solidFill>
+              </a:rPr>
+              <a:t>7 - Holdfast</a:t>
+            </a:r>
+            <a:endParaRPr>
+              <a:solidFill>
+                <a:schemeClr val="dk1"/>
+              </a:solidFill>
+            </a:endParaRPr>
+          </a:p>
+          <a:p>
+            <a:pPr indent="0" lvl="0" marL="0" rtl="0" algn="l">
+              <a:spcBef>
+                <a:spcPts val="0"/>
+              </a:spcBef>
+              <a:spcAft>
+                <a:spcPts val="0"/>
+              </a:spcAft>
+              <a:buClr>
+                <a:schemeClr val="dk1"/>
+              </a:buClr>
+              <a:buSzPts val="1100"/>
+              <a:buFont typeface="Arial"/>
+              <a:buNone/>
+            </a:pPr>
+            <a:r>
+              <a:rPr lang="en">
+                <a:solidFill>
+                  <a:schemeClr val="dk1"/>
+                </a:solidFill>
+              </a:rPr>
+              <a:t>8 - Justice Bringers</a:t>
+            </a:r>
+            <a:endParaRPr>
+              <a:solidFill>
+                <a:schemeClr val="dk1"/>
+              </a:solidFill>
+            </a:endParaRPr>
+          </a:p>
+          <a:p>
+            <a:pPr indent="0" lvl="0" marL="0" rtl="0" algn="l">
+              <a:spcBef>
+                <a:spcPts val="0"/>
+              </a:spcBef>
+              <a:spcAft>
+                <a:spcPts val="0"/>
+              </a:spcAft>
+              <a:buClr>
+                <a:schemeClr val="dk1"/>
+              </a:buClr>
+              <a:buSzPts val="1100"/>
+              <a:buFont typeface="Arial"/>
+              <a:buNone/>
+            </a:pPr>
+            <a:r>
+              <a:rPr lang="en">
+                <a:solidFill>
+                  <a:schemeClr val="dk1"/>
+                </a:solidFill>
+              </a:rPr>
+              <a:t>9 - Kelemvor</a:t>
+            </a:r>
+            <a:endParaRPr>
+              <a:solidFill>
+                <a:schemeClr val="dk1"/>
+              </a:solidFill>
+            </a:endParaRPr>
+          </a:p>
+          <a:p>
+            <a:pPr indent="0" lvl="0" marL="0" rtl="0" algn="l">
+              <a:spcBef>
+                <a:spcPts val="0"/>
+              </a:spcBef>
+              <a:spcAft>
+                <a:spcPts val="0"/>
+              </a:spcAft>
+              <a:buClr>
+                <a:schemeClr val="dk1"/>
+              </a:buClr>
+              <a:buSzPts val="1100"/>
+              <a:buFont typeface="Arial"/>
+              <a:buNone/>
+            </a:pPr>
+            <a:r>
+              <a:rPr lang="en">
+                <a:solidFill>
+                  <a:schemeClr val="dk1"/>
+                </a:solidFill>
+              </a:rPr>
+              <a:t>10 - Minaria</a:t>
+            </a:r>
+            <a:endParaRPr>
+              <a:solidFill>
+                <a:schemeClr val="dk1"/>
+              </a:solidFill>
+            </a:endParaRPr>
+          </a:p>
+          <a:p>
+            <a:pPr indent="0" lvl="0" marL="0" rtl="0" algn="l">
+              <a:spcBef>
+                <a:spcPts val="0"/>
+              </a:spcBef>
+              <a:spcAft>
+                <a:spcPts val="0"/>
+              </a:spcAft>
+              <a:buClr>
+                <a:schemeClr val="dk1"/>
+              </a:buClr>
+              <a:buSzPts val="1100"/>
+              <a:buFont typeface="Arial"/>
+              <a:buNone/>
+            </a:pPr>
+            <a:r>
+              <a:rPr lang="en">
+                <a:solidFill>
+                  <a:schemeClr val="dk1"/>
+                </a:solidFill>
+              </a:rPr>
+              <a:t>11 - Myrkul</a:t>
+            </a:r>
+            <a:endParaRPr>
+              <a:solidFill>
+                <a:schemeClr val="dk1"/>
+              </a:solidFill>
+            </a:endParaRPr>
+          </a:p>
+          <a:p>
+            <a:pPr indent="0" lvl="0" marL="0" rtl="0" algn="l">
+              <a:spcBef>
+                <a:spcPts val="0"/>
+              </a:spcBef>
+              <a:spcAft>
+                <a:spcPts val="0"/>
+              </a:spcAft>
+              <a:buClr>
+                <a:schemeClr val="dk1"/>
+              </a:buClr>
+              <a:buSzPts val="1100"/>
+              <a:buFont typeface="Arial"/>
+              <a:buNone/>
+            </a:pPr>
+            <a:r>
+              <a:rPr lang="en">
+                <a:solidFill>
+                  <a:schemeClr val="dk1"/>
+                </a:solidFill>
+              </a:rPr>
+              <a:t>12 - Talos</a:t>
+            </a:r>
+            <a:endParaRPr>
+              <a:solidFill>
+                <a:schemeClr val="dk1"/>
+              </a:solidFill>
+            </a:endParaRPr>
+          </a:p>
+          <a:p>
+            <a:pPr indent="0" lvl="0" marL="0" rtl="0" algn="l">
+              <a:spcBef>
+                <a:spcPts val="0"/>
+              </a:spcBef>
+              <a:spcAft>
+                <a:spcPts val="0"/>
+              </a:spcAft>
+              <a:buClr>
+                <a:schemeClr val="dk1"/>
+              </a:buClr>
+              <a:buSzPts val="1100"/>
+              <a:buFont typeface="Arial"/>
+              <a:buNone/>
+            </a:pPr>
+            <a:r>
+              <a:rPr lang="en">
+                <a:solidFill>
+                  <a:schemeClr val="dk1"/>
+                </a:solidFill>
+              </a:rPr>
+              <a:t>13 - Veronna</a:t>
+            </a:r>
+            <a:endParaRPr>
+              <a:solidFill>
+                <a:schemeClr val="dk1"/>
+              </a:solidFill>
+            </a:endParaRPr>
+          </a:p>
+          <a:p>
+            <a:pPr indent="0" lvl="0" marL="0" rtl="0" algn="l">
+              <a:spcBef>
+                <a:spcPts val="0"/>
+              </a:spcBef>
+              <a:spcAft>
+                <a:spcPts val="0"/>
+              </a:spcAft>
+              <a:buClr>
+                <a:schemeClr val="dk1"/>
+              </a:buClr>
+              <a:buSzPts val="1100"/>
+              <a:buFont typeface="Arial"/>
+              <a:buNone/>
+            </a:pPr>
+            <a:r>
+              <a:rPr lang="en">
+                <a:solidFill>
+                  <a:schemeClr val="dk1"/>
+                </a:solidFill>
+              </a:rPr>
+              <a:t>14 - West Side Minaria</a:t>
+            </a:r>
+            <a:endParaRPr>
+              <a:solidFill>
+                <a:schemeClr val="dk1"/>
+              </a:solidFill>
+            </a:endParaRPr>
+          </a:p>
+          <a:p>
+            <a:pPr indent="0" lvl="0" marL="0" rtl="0" algn="l">
+              <a:spcBef>
+                <a:spcPts val="0"/>
+              </a:spcBef>
+              <a:spcAft>
+                <a:spcPts val="0"/>
+              </a:spcAft>
+              <a:buClr>
+                <a:schemeClr val="dk1"/>
+              </a:buClr>
+              <a:buSzPts val="1100"/>
+              <a:buFont typeface="Arial"/>
+              <a:buNone/>
+            </a:pPr>
+            <a:r>
+              <a:rPr lang="en">
+                <a:solidFill>
+                  <a:schemeClr val="dk1"/>
+                </a:solidFill>
+              </a:rPr>
+              <a:t>15 - Zehir</a:t>
+            </a:r>
+            <a:endParaRPr>
+              <a:solidFill>
+                <a:schemeClr val="dk1"/>
+              </a:solidFill>
+            </a:endParaRPr>
+          </a:p>
+          <a:p>
+            <a:pPr indent="0" lvl="0" marL="0" rtl="0" algn="l">
+              <a:spcBef>
+                <a:spcPts val="0"/>
+              </a:spcBef>
+              <a:spcAft>
+                <a:spcPts val="0"/>
+              </a:spcAft>
+              <a:buClr>
+                <a:schemeClr val="dk1"/>
+              </a:buClr>
+              <a:buSzPts val="1100"/>
+              <a:buFont typeface="Arial"/>
+              <a:buNone/>
+            </a:pPr>
+            <a:r>
+              <a:rPr lang="en">
+                <a:solidFill>
+                  <a:schemeClr val="dk1"/>
+                </a:solidFill>
+              </a:rPr>
+              <a:t>16 - Hadaar</a:t>
+            </a:r>
+            <a:endParaRPr>
+              <a:solidFill>
+                <a:schemeClr val="dk1"/>
+              </a:solidFill>
+            </a:endParaRPr>
+          </a:p>
+          <a:p>
+            <a:pPr indent="0" lvl="0" marL="0" rtl="0" algn="l">
+              <a:spcBef>
+                <a:spcPts val="0"/>
+              </a:spcBef>
+              <a:spcAft>
+                <a:spcPts val="0"/>
+              </a:spcAft>
+              <a:buClr>
+                <a:schemeClr val="dk1"/>
+              </a:buClr>
+              <a:buSzPts val="1100"/>
+              <a:buFont typeface="Arial"/>
+              <a:buNone/>
+            </a:pPr>
+            <a:r>
+              <a:rPr lang="en">
+                <a:solidFill>
+                  <a:schemeClr val="dk1"/>
+                </a:solidFill>
+              </a:rPr>
+              <a:t>17 - Laughing Knives</a:t>
+            </a:r>
+            <a:endParaRPr>
+              <a:solidFill>
+                <a:schemeClr val="dk1"/>
+              </a:solidFill>
+            </a:endParaRPr>
+          </a:p>
+          <a:p>
+            <a:pPr indent="0" lvl="0" marL="0" rtl="0" algn="l">
+              <a:spcBef>
+                <a:spcPts val="0"/>
+              </a:spcBef>
+              <a:spcAft>
+                <a:spcPts val="0"/>
+              </a:spcAft>
+              <a:buClr>
+                <a:schemeClr val="dk1"/>
+              </a:buClr>
+              <a:buSzPts val="1100"/>
+              <a:buFont typeface="Arial"/>
+              <a:buNone/>
+            </a:pPr>
+            <a:r>
+              <a:rPr lang="en">
+                <a:solidFill>
+                  <a:schemeClr val="dk1"/>
+                </a:solidFill>
+              </a:rPr>
+              <a:t>18 - Peralat Sword</a:t>
+            </a:r>
+            <a:endParaRPr>
+              <a:solidFill>
+                <a:schemeClr val="dk1"/>
+              </a:solidFill>
+            </a:endParaRPr>
+          </a:p>
+          <a:p>
+            <a:pPr indent="0" lvl="0" marL="0" rtl="0" algn="l">
+              <a:spcBef>
+                <a:spcPts val="0"/>
+              </a:spcBef>
+              <a:spcAft>
+                <a:spcPts val="0"/>
+              </a:spcAft>
+              <a:buClr>
+                <a:schemeClr val="dk1"/>
+              </a:buClr>
+              <a:buSzPts val="1100"/>
+              <a:buFont typeface="Arial"/>
+              <a:buNone/>
+            </a:pPr>
+            <a:r>
+              <a:rPr lang="en">
+                <a:solidFill>
+                  <a:schemeClr val="dk1"/>
+                </a:solidFill>
+              </a:rPr>
+              <a:t>19 - Peralat Armor</a:t>
+            </a:r>
+            <a:endParaRPr>
+              <a:solidFill>
+                <a:schemeClr val="dk1"/>
+              </a:solidFill>
+            </a:endParaRPr>
+          </a:p>
+          <a:p>
+            <a:pPr indent="0" lvl="0" marL="0" rtl="0" algn="l">
+              <a:spcBef>
+                <a:spcPts val="0"/>
+              </a:spcBef>
+              <a:spcAft>
+                <a:spcPts val="0"/>
+              </a:spcAft>
+              <a:buClr>
+                <a:schemeClr val="dk1"/>
+              </a:buClr>
+              <a:buSzPts val="1100"/>
+              <a:buFont typeface="Arial"/>
+              <a:buNone/>
+            </a:pPr>
+            <a:r>
+              <a:rPr lang="en">
+                <a:solidFill>
+                  <a:schemeClr val="dk1"/>
+                </a:solidFill>
+              </a:rPr>
+              <a:t>20 - Peralat Shield</a:t>
+            </a:r>
+            <a:endParaRPr>
+              <a:solidFill>
+                <a:schemeClr val="dk1"/>
+              </a:solidFill>
+            </a:endParaRPr>
+          </a:p>
+        </p:txBody>
+      </p:sp>
+    </p:spTree>
+  </p:cSld>
+  <p:clrMapOvr>
+    <a:masterClrMapping/>
+  </p:clrMapOvr>
+</p:notes>
+</file>
+
 <file path=ppt/notesSlides/notesSlide2.xml><?xml version="1.0" encoding="utf-8"?>
 <p:notes xmlns:a="http://schemas.openxmlformats.org/drawingml/2006/main" xmlns:r="http://schemas.openxmlformats.org/officeDocument/2006/relationships" xmlns:mc="http://schemas.openxmlformats.org/markup-compatibility/2006" xmlns:mv="urn:schemas-microsoft-com:mac:vml" xmlns:p="http://schemas.openxmlformats.org/presentationml/2006/main" xmlns:c="http://schemas.openxmlformats.org/drawingml/2006/chart" xmlns:dgm="http://schemas.openxmlformats.org/drawingml/2006/diagram" xmlns:o="urn:schemas-microsoft-com:office:office" xmlns:v="urn:schemas-microsoft-com:vml" xmlns:pvml="urn:schemas-microsoft-com:office:powerpoint" xmlns:com="http://schemas.openxmlformats.org/drawingml/2006/compatibility" xmlns:p14="http://schemas.microsoft.com/office/powerpoint/2010/main" xmlns:p15="http://schemas.microsoft.com/office/powerpoint/2012/main" xmlns:ahyp="http://schemas.microsoft.com/office/drawing/2018/hyperlinkcolor" showMasterPhAnim="0" showMasterSp="0">
   <p:cSld>
@@ -6455,6 +7786,678 @@
                 </a:solidFill>
               </a:rPr>
               <a:t>17 - Laughing Knives</a:t>
+            </a:r>
+            <a:endParaRPr>
+              <a:solidFill>
+                <a:schemeClr val="dk1"/>
+              </a:solidFill>
+            </a:endParaRPr>
+          </a:p>
+        </p:txBody>
+      </p:sp>
+    </p:spTree>
+  </p:cSld>
+  <p:clrMapOvr>
+    <a:masterClrMapping/>
+  </p:clrMapOvr>
+</p:notes>
+</file>
+
+<file path=ppt/notesSlides/notesSlide20.xml><?xml version="1.0" encoding="utf-8"?>
+<p:notes xmlns:a="http://schemas.openxmlformats.org/drawingml/2006/main" xmlns:r="http://schemas.openxmlformats.org/officeDocument/2006/relationships" xmlns:mc="http://schemas.openxmlformats.org/markup-compatibility/2006" xmlns:mv="urn:schemas-microsoft-com:mac:vml" xmlns:p="http://schemas.openxmlformats.org/presentationml/2006/main" xmlns:c="http://schemas.openxmlformats.org/drawingml/2006/chart" xmlns:dgm="http://schemas.openxmlformats.org/drawingml/2006/diagram" xmlns:o="urn:schemas-microsoft-com:office:office" xmlns:v="urn:schemas-microsoft-com:vml" xmlns:pvml="urn:schemas-microsoft-com:office:powerpoint" xmlns:com="http://schemas.openxmlformats.org/drawingml/2006/compatibility" xmlns:p14="http://schemas.microsoft.com/office/powerpoint/2010/main" xmlns:p15="http://schemas.microsoft.com/office/powerpoint/2012/main" xmlns:ahyp="http://schemas.microsoft.com/office/drawing/2018/hyperlinkcolor" showMasterPhAnim="0" showMasterSp="0">
+  <p:cSld>
+    <p:spTree>
+      <p:nvGrpSpPr>
+        <p:cNvPr id="145" name="Shape 145"/>
+        <p:cNvGrpSpPr/>
+        <p:nvPr/>
+      </p:nvGrpSpPr>
+      <p:grpSpPr>
+        <a:xfrm>
+          <a:off x="0" y="0"/>
+          <a:ext cx="0" cy="0"/>
+          <a:chOff x="0" y="0"/>
+          <a:chExt cx="0" cy="0"/>
+        </a:xfrm>
+      </p:grpSpPr>
+      <p:sp>
+        <p:nvSpPr>
+          <p:cNvPr id="146" name="Google Shape;146;g2539ed2c52f_0_8:notes"/>
+          <p:cNvSpPr/>
+          <p:nvPr>
+            <p:ph idx="2" type="sldImg"/>
+          </p:nvPr>
+        </p:nvSpPr>
+        <p:spPr>
+          <a:xfrm>
+            <a:off x="381300" y="685800"/>
+            <a:ext cx="6096000" cy="3429000"/>
+          </a:xfrm>
+          <a:custGeom>
+            <a:rect b="b" l="l" r="r" t="t"/>
+            <a:pathLst>
+              <a:path extrusionOk="0" h="120000" w="120000">
+                <a:moveTo>
+                  <a:pt x="0" y="0"/>
+                </a:moveTo>
+                <a:lnTo>
+                  <a:pt x="120000" y="0"/>
+                </a:lnTo>
+                <a:lnTo>
+                  <a:pt x="120000" y="120000"/>
+                </a:lnTo>
+                <a:lnTo>
+                  <a:pt x="0" y="120000"/>
+                </a:lnTo>
+                <a:close/>
+              </a:path>
+            </a:pathLst>
+          </a:custGeom>
+        </p:spPr>
+      </p:sp>
+      <p:sp>
+        <p:nvSpPr>
+          <p:cNvPr id="147" name="Google Shape;147;g2539ed2c52f_0_8:notes"/>
+          <p:cNvSpPr txBox="1"/>
+          <p:nvPr>
+            <p:ph idx="1" type="body"/>
+          </p:nvPr>
+        </p:nvSpPr>
+        <p:spPr>
+          <a:xfrm>
+            <a:off x="685800" y="4343400"/>
+            <a:ext cx="5486400" cy="4114800"/>
+          </a:xfrm>
+          <a:prstGeom prst="rect">
+            <a:avLst/>
+          </a:prstGeom>
+        </p:spPr>
+        <p:txBody>
+          <a:bodyPr anchorCtr="0" anchor="t" bIns="91425" lIns="91425" spcFirstLastPara="1" rIns="91425" wrap="square" tIns="91425">
+            <a:noAutofit/>
+          </a:bodyPr>
+          <a:lstStyle/>
+          <a:p>
+            <a:pPr indent="0" lvl="0" marL="0" rtl="0" algn="l">
+              <a:spcBef>
+                <a:spcPts val="0"/>
+              </a:spcBef>
+              <a:spcAft>
+                <a:spcPts val="0"/>
+              </a:spcAft>
+              <a:buClr>
+                <a:schemeClr val="dk1"/>
+              </a:buClr>
+              <a:buSzPts val="1100"/>
+              <a:buFont typeface="Arial"/>
+              <a:buNone/>
+            </a:pPr>
+            <a:r>
+              <a:rPr lang="en">
+                <a:solidFill>
+                  <a:schemeClr val="dk1"/>
+                </a:solidFill>
+              </a:rPr>
+              <a:t>1 - Central Minaria</a:t>
+            </a:r>
+            <a:endParaRPr>
+              <a:solidFill>
+                <a:schemeClr val="dk1"/>
+              </a:solidFill>
+            </a:endParaRPr>
+          </a:p>
+          <a:p>
+            <a:pPr indent="0" lvl="0" marL="0" rtl="0" algn="l">
+              <a:spcBef>
+                <a:spcPts val="0"/>
+              </a:spcBef>
+              <a:spcAft>
+                <a:spcPts val="0"/>
+              </a:spcAft>
+              <a:buClr>
+                <a:schemeClr val="dk1"/>
+              </a:buClr>
+              <a:buSzPts val="1100"/>
+              <a:buFont typeface="Arial"/>
+              <a:buNone/>
+            </a:pPr>
+            <a:r>
+              <a:rPr lang="en">
+                <a:solidFill>
+                  <a:schemeClr val="dk1"/>
+                </a:solidFill>
+              </a:rPr>
+              <a:t>2 - Chauntea</a:t>
+            </a:r>
+            <a:endParaRPr>
+              <a:solidFill>
+                <a:schemeClr val="dk1"/>
+              </a:solidFill>
+            </a:endParaRPr>
+          </a:p>
+          <a:p>
+            <a:pPr indent="0" lvl="0" marL="0" rtl="0" algn="l">
+              <a:spcBef>
+                <a:spcPts val="0"/>
+              </a:spcBef>
+              <a:spcAft>
+                <a:spcPts val="0"/>
+              </a:spcAft>
+              <a:buClr>
+                <a:schemeClr val="dk1"/>
+              </a:buClr>
+              <a:buSzPts val="1100"/>
+              <a:buFont typeface="Arial"/>
+              <a:buNone/>
+            </a:pPr>
+            <a:r>
+              <a:rPr lang="en">
+                <a:solidFill>
+                  <a:schemeClr val="dk1"/>
+                </a:solidFill>
+              </a:rPr>
+              <a:t>3 - East Side Minaria</a:t>
+            </a:r>
+            <a:endParaRPr>
+              <a:solidFill>
+                <a:schemeClr val="dk1"/>
+              </a:solidFill>
+            </a:endParaRPr>
+          </a:p>
+          <a:p>
+            <a:pPr indent="0" lvl="0" marL="0" rtl="0" algn="l">
+              <a:spcBef>
+                <a:spcPts val="0"/>
+              </a:spcBef>
+              <a:spcAft>
+                <a:spcPts val="0"/>
+              </a:spcAft>
+              <a:buClr>
+                <a:schemeClr val="dk1"/>
+              </a:buClr>
+              <a:buSzPts val="1100"/>
+              <a:buFont typeface="Arial"/>
+              <a:buNone/>
+            </a:pPr>
+            <a:r>
+              <a:rPr lang="en">
+                <a:solidFill>
+                  <a:schemeClr val="dk1"/>
+                </a:solidFill>
+              </a:rPr>
+              <a:t>4 - Exynn</a:t>
+            </a:r>
+            <a:endParaRPr>
+              <a:solidFill>
+                <a:schemeClr val="dk1"/>
+              </a:solidFill>
+            </a:endParaRPr>
+          </a:p>
+          <a:p>
+            <a:pPr indent="0" lvl="0" marL="0" rtl="0" algn="l">
+              <a:spcBef>
+                <a:spcPts val="0"/>
+              </a:spcBef>
+              <a:spcAft>
+                <a:spcPts val="0"/>
+              </a:spcAft>
+              <a:buClr>
+                <a:schemeClr val="dk1"/>
+              </a:buClr>
+              <a:buSzPts val="1100"/>
+              <a:buFont typeface="Arial"/>
+              <a:buNone/>
+            </a:pPr>
+            <a:r>
+              <a:rPr lang="en">
+                <a:solidFill>
+                  <a:schemeClr val="dk1"/>
+                </a:solidFill>
+              </a:rPr>
+              <a:t>5 - Flatcoat</a:t>
+            </a:r>
+            <a:endParaRPr>
+              <a:solidFill>
+                <a:schemeClr val="dk1"/>
+              </a:solidFill>
+            </a:endParaRPr>
+          </a:p>
+          <a:p>
+            <a:pPr indent="0" lvl="0" marL="0" rtl="0" algn="l">
+              <a:spcBef>
+                <a:spcPts val="0"/>
+              </a:spcBef>
+              <a:spcAft>
+                <a:spcPts val="0"/>
+              </a:spcAft>
+              <a:buClr>
+                <a:schemeClr val="dk1"/>
+              </a:buClr>
+              <a:buSzPts val="1100"/>
+              <a:buFont typeface="Arial"/>
+              <a:buNone/>
+            </a:pPr>
+            <a:r>
+              <a:rPr lang="en">
+                <a:solidFill>
+                  <a:schemeClr val="dk1"/>
+                </a:solidFill>
+              </a:rPr>
+              <a:t>6 - Grumbar</a:t>
+            </a:r>
+            <a:endParaRPr>
+              <a:solidFill>
+                <a:schemeClr val="dk1"/>
+              </a:solidFill>
+            </a:endParaRPr>
+          </a:p>
+          <a:p>
+            <a:pPr indent="0" lvl="0" marL="0" rtl="0" algn="l">
+              <a:spcBef>
+                <a:spcPts val="0"/>
+              </a:spcBef>
+              <a:spcAft>
+                <a:spcPts val="0"/>
+              </a:spcAft>
+              <a:buClr>
+                <a:schemeClr val="dk1"/>
+              </a:buClr>
+              <a:buSzPts val="1100"/>
+              <a:buFont typeface="Arial"/>
+              <a:buNone/>
+            </a:pPr>
+            <a:r>
+              <a:rPr lang="en">
+                <a:solidFill>
+                  <a:schemeClr val="dk1"/>
+                </a:solidFill>
+              </a:rPr>
+              <a:t>7 - Holdfast</a:t>
+            </a:r>
+            <a:endParaRPr>
+              <a:solidFill>
+                <a:schemeClr val="dk1"/>
+              </a:solidFill>
+            </a:endParaRPr>
+          </a:p>
+          <a:p>
+            <a:pPr indent="0" lvl="0" marL="0" rtl="0" algn="l">
+              <a:spcBef>
+                <a:spcPts val="0"/>
+              </a:spcBef>
+              <a:spcAft>
+                <a:spcPts val="0"/>
+              </a:spcAft>
+              <a:buClr>
+                <a:schemeClr val="dk1"/>
+              </a:buClr>
+              <a:buSzPts val="1100"/>
+              <a:buFont typeface="Arial"/>
+              <a:buNone/>
+            </a:pPr>
+            <a:r>
+              <a:rPr lang="en">
+                <a:solidFill>
+                  <a:schemeClr val="dk1"/>
+                </a:solidFill>
+              </a:rPr>
+              <a:t>8 - Justice Bringers</a:t>
+            </a:r>
+            <a:endParaRPr>
+              <a:solidFill>
+                <a:schemeClr val="dk1"/>
+              </a:solidFill>
+            </a:endParaRPr>
+          </a:p>
+          <a:p>
+            <a:pPr indent="0" lvl="0" marL="0" rtl="0" algn="l">
+              <a:spcBef>
+                <a:spcPts val="0"/>
+              </a:spcBef>
+              <a:spcAft>
+                <a:spcPts val="0"/>
+              </a:spcAft>
+              <a:buClr>
+                <a:schemeClr val="dk1"/>
+              </a:buClr>
+              <a:buSzPts val="1100"/>
+              <a:buFont typeface="Arial"/>
+              <a:buNone/>
+            </a:pPr>
+            <a:r>
+              <a:rPr lang="en">
+                <a:solidFill>
+                  <a:schemeClr val="dk1"/>
+                </a:solidFill>
+              </a:rPr>
+              <a:t>9 - Kelemvor</a:t>
+            </a:r>
+            <a:endParaRPr>
+              <a:solidFill>
+                <a:schemeClr val="dk1"/>
+              </a:solidFill>
+            </a:endParaRPr>
+          </a:p>
+          <a:p>
+            <a:pPr indent="0" lvl="0" marL="0" rtl="0" algn="l">
+              <a:spcBef>
+                <a:spcPts val="0"/>
+              </a:spcBef>
+              <a:spcAft>
+                <a:spcPts val="0"/>
+              </a:spcAft>
+              <a:buClr>
+                <a:schemeClr val="dk1"/>
+              </a:buClr>
+              <a:buSzPts val="1100"/>
+              <a:buFont typeface="Arial"/>
+              <a:buNone/>
+            </a:pPr>
+            <a:r>
+              <a:rPr lang="en">
+                <a:solidFill>
+                  <a:schemeClr val="dk1"/>
+                </a:solidFill>
+              </a:rPr>
+              <a:t>10 - Minaria</a:t>
+            </a:r>
+            <a:endParaRPr>
+              <a:solidFill>
+                <a:schemeClr val="dk1"/>
+              </a:solidFill>
+            </a:endParaRPr>
+          </a:p>
+          <a:p>
+            <a:pPr indent="0" lvl="0" marL="0" rtl="0" algn="l">
+              <a:spcBef>
+                <a:spcPts val="0"/>
+              </a:spcBef>
+              <a:spcAft>
+                <a:spcPts val="0"/>
+              </a:spcAft>
+              <a:buClr>
+                <a:schemeClr val="dk1"/>
+              </a:buClr>
+              <a:buSzPts val="1100"/>
+              <a:buFont typeface="Arial"/>
+              <a:buNone/>
+            </a:pPr>
+            <a:r>
+              <a:rPr lang="en">
+                <a:solidFill>
+                  <a:schemeClr val="dk1"/>
+                </a:solidFill>
+              </a:rPr>
+              <a:t>11 - Myrkul</a:t>
+            </a:r>
+            <a:endParaRPr>
+              <a:solidFill>
+                <a:schemeClr val="dk1"/>
+              </a:solidFill>
+            </a:endParaRPr>
+          </a:p>
+          <a:p>
+            <a:pPr indent="0" lvl="0" marL="0" rtl="0" algn="l">
+              <a:spcBef>
+                <a:spcPts val="0"/>
+              </a:spcBef>
+              <a:spcAft>
+                <a:spcPts val="0"/>
+              </a:spcAft>
+              <a:buClr>
+                <a:schemeClr val="dk1"/>
+              </a:buClr>
+              <a:buSzPts val="1100"/>
+              <a:buFont typeface="Arial"/>
+              <a:buNone/>
+            </a:pPr>
+            <a:r>
+              <a:rPr lang="en">
+                <a:solidFill>
+                  <a:schemeClr val="dk1"/>
+                </a:solidFill>
+              </a:rPr>
+              <a:t>12 - Talos</a:t>
+            </a:r>
+            <a:endParaRPr>
+              <a:solidFill>
+                <a:schemeClr val="dk1"/>
+              </a:solidFill>
+            </a:endParaRPr>
+          </a:p>
+          <a:p>
+            <a:pPr indent="0" lvl="0" marL="0" rtl="0" algn="l">
+              <a:spcBef>
+                <a:spcPts val="0"/>
+              </a:spcBef>
+              <a:spcAft>
+                <a:spcPts val="0"/>
+              </a:spcAft>
+              <a:buClr>
+                <a:schemeClr val="dk1"/>
+              </a:buClr>
+              <a:buSzPts val="1100"/>
+              <a:buFont typeface="Arial"/>
+              <a:buNone/>
+            </a:pPr>
+            <a:r>
+              <a:rPr lang="en">
+                <a:solidFill>
+                  <a:schemeClr val="dk1"/>
+                </a:solidFill>
+              </a:rPr>
+              <a:t>13 - Veronna</a:t>
+            </a:r>
+            <a:endParaRPr>
+              <a:solidFill>
+                <a:schemeClr val="dk1"/>
+              </a:solidFill>
+            </a:endParaRPr>
+          </a:p>
+          <a:p>
+            <a:pPr indent="0" lvl="0" marL="0" rtl="0" algn="l">
+              <a:spcBef>
+                <a:spcPts val="0"/>
+              </a:spcBef>
+              <a:spcAft>
+                <a:spcPts val="0"/>
+              </a:spcAft>
+              <a:buClr>
+                <a:schemeClr val="dk1"/>
+              </a:buClr>
+              <a:buSzPts val="1100"/>
+              <a:buFont typeface="Arial"/>
+              <a:buNone/>
+            </a:pPr>
+            <a:r>
+              <a:rPr lang="en">
+                <a:solidFill>
+                  <a:schemeClr val="dk1"/>
+                </a:solidFill>
+              </a:rPr>
+              <a:t>14 - West Side Minaria</a:t>
+            </a:r>
+            <a:endParaRPr>
+              <a:solidFill>
+                <a:schemeClr val="dk1"/>
+              </a:solidFill>
+            </a:endParaRPr>
+          </a:p>
+          <a:p>
+            <a:pPr indent="0" lvl="0" marL="0" rtl="0" algn="l">
+              <a:spcBef>
+                <a:spcPts val="0"/>
+              </a:spcBef>
+              <a:spcAft>
+                <a:spcPts val="0"/>
+              </a:spcAft>
+              <a:buClr>
+                <a:schemeClr val="dk1"/>
+              </a:buClr>
+              <a:buSzPts val="1100"/>
+              <a:buFont typeface="Arial"/>
+              <a:buNone/>
+            </a:pPr>
+            <a:r>
+              <a:rPr lang="en">
+                <a:solidFill>
+                  <a:schemeClr val="dk1"/>
+                </a:solidFill>
+              </a:rPr>
+              <a:t>15 - Zehir</a:t>
+            </a:r>
+            <a:endParaRPr>
+              <a:solidFill>
+                <a:schemeClr val="dk1"/>
+              </a:solidFill>
+            </a:endParaRPr>
+          </a:p>
+          <a:p>
+            <a:pPr indent="0" lvl="0" marL="0" rtl="0" algn="l">
+              <a:spcBef>
+                <a:spcPts val="0"/>
+              </a:spcBef>
+              <a:spcAft>
+                <a:spcPts val="0"/>
+              </a:spcAft>
+              <a:buClr>
+                <a:schemeClr val="dk1"/>
+              </a:buClr>
+              <a:buSzPts val="1100"/>
+              <a:buFont typeface="Arial"/>
+              <a:buNone/>
+            </a:pPr>
+            <a:r>
+              <a:rPr lang="en">
+                <a:solidFill>
+                  <a:schemeClr val="dk1"/>
+                </a:solidFill>
+              </a:rPr>
+              <a:t>16 - Hadaar</a:t>
+            </a:r>
+            <a:endParaRPr>
+              <a:solidFill>
+                <a:schemeClr val="dk1"/>
+              </a:solidFill>
+            </a:endParaRPr>
+          </a:p>
+          <a:p>
+            <a:pPr indent="0" lvl="0" marL="0" rtl="0" algn="l">
+              <a:spcBef>
+                <a:spcPts val="0"/>
+              </a:spcBef>
+              <a:spcAft>
+                <a:spcPts val="0"/>
+              </a:spcAft>
+              <a:buClr>
+                <a:schemeClr val="dk1"/>
+              </a:buClr>
+              <a:buSzPts val="1100"/>
+              <a:buFont typeface="Arial"/>
+              <a:buNone/>
+            </a:pPr>
+            <a:r>
+              <a:rPr lang="en">
+                <a:solidFill>
+                  <a:schemeClr val="dk1"/>
+                </a:solidFill>
+              </a:rPr>
+              <a:t>17 - Laughing Knives</a:t>
+            </a:r>
+            <a:endParaRPr>
+              <a:solidFill>
+                <a:schemeClr val="dk1"/>
+              </a:solidFill>
+            </a:endParaRPr>
+          </a:p>
+          <a:p>
+            <a:pPr indent="0" lvl="0" marL="0" rtl="0" algn="l">
+              <a:spcBef>
+                <a:spcPts val="0"/>
+              </a:spcBef>
+              <a:spcAft>
+                <a:spcPts val="0"/>
+              </a:spcAft>
+              <a:buClr>
+                <a:schemeClr val="dk1"/>
+              </a:buClr>
+              <a:buSzPts val="1100"/>
+              <a:buFont typeface="Arial"/>
+              <a:buNone/>
+            </a:pPr>
+            <a:r>
+              <a:rPr lang="en">
+                <a:solidFill>
+                  <a:schemeClr val="dk1"/>
+                </a:solidFill>
+              </a:rPr>
+              <a:t>18 - Peralat Sword</a:t>
+            </a:r>
+            <a:endParaRPr>
+              <a:solidFill>
+                <a:schemeClr val="dk1"/>
+              </a:solidFill>
+            </a:endParaRPr>
+          </a:p>
+          <a:p>
+            <a:pPr indent="0" lvl="0" marL="0" rtl="0" algn="l">
+              <a:spcBef>
+                <a:spcPts val="0"/>
+              </a:spcBef>
+              <a:spcAft>
+                <a:spcPts val="0"/>
+              </a:spcAft>
+              <a:buClr>
+                <a:schemeClr val="dk1"/>
+              </a:buClr>
+              <a:buSzPts val="1100"/>
+              <a:buFont typeface="Arial"/>
+              <a:buNone/>
+            </a:pPr>
+            <a:r>
+              <a:rPr lang="en">
+                <a:solidFill>
+                  <a:schemeClr val="dk1"/>
+                </a:solidFill>
+              </a:rPr>
+              <a:t>19 - </a:t>
+            </a:r>
+            <a:r>
+              <a:rPr lang="en">
+                <a:solidFill>
+                  <a:schemeClr val="dk1"/>
+                </a:solidFill>
+              </a:rPr>
+              <a:t>Peralat Armor</a:t>
+            </a:r>
+            <a:endParaRPr>
+              <a:solidFill>
+                <a:schemeClr val="dk1"/>
+              </a:solidFill>
+            </a:endParaRPr>
+          </a:p>
+          <a:p>
+            <a:pPr indent="0" lvl="0" marL="0" rtl="0" algn="l">
+              <a:spcBef>
+                <a:spcPts val="0"/>
+              </a:spcBef>
+              <a:spcAft>
+                <a:spcPts val="0"/>
+              </a:spcAft>
+              <a:buClr>
+                <a:schemeClr val="dk1"/>
+              </a:buClr>
+              <a:buSzPts val="1100"/>
+              <a:buFont typeface="Arial"/>
+              <a:buNone/>
+            </a:pPr>
+            <a:r>
+              <a:rPr lang="en">
+                <a:solidFill>
+                  <a:schemeClr val="dk1"/>
+                </a:solidFill>
+              </a:rPr>
+              <a:t>20 - Peralat Shield</a:t>
             </a:r>
             <a:endParaRPr>
               <a:solidFill>
@@ -15692,16 +17695,49 @@
           </a:ln>
         </p:spPr>
       </p:pic>
-      <p:sp>
-        <p:nvSpPr>
-          <p:cNvPr id="135" name="Google Shape;135;p29"/>
-          <p:cNvSpPr txBox="1"/>
+    </p:spTree>
+  </p:cSld>
+  <p:clrMapOvr>
+    <a:masterClrMapping/>
+  </p:clrMapOvr>
+</p:sld>
+</file>
+
+<file path=ppt/slides/slide18.xml><?xml version="1.0" encoding="utf-8"?>
+<p:sld xmlns:a="http://schemas.openxmlformats.org/drawingml/2006/main" xmlns:r="http://schemas.openxmlformats.org/officeDocument/2006/relationships" xmlns:mc="http://schemas.openxmlformats.org/markup-compatibility/2006" xmlns:mv="urn:schemas-microsoft-com:mac:vml" xmlns:p="http://schemas.openxmlformats.org/presentationml/2006/main" xmlns:c="http://schemas.openxmlformats.org/drawingml/2006/chart" xmlns:dgm="http://schemas.openxmlformats.org/drawingml/2006/diagram" xmlns:o="urn:schemas-microsoft-com:office:office" xmlns:v="urn:schemas-microsoft-com:vml" xmlns:pvml="urn:schemas-microsoft-com:office:powerpoint" xmlns:com="http://schemas.openxmlformats.org/drawingml/2006/compatibility" xmlns:p14="http://schemas.microsoft.com/office/powerpoint/2010/main" xmlns:p15="http://schemas.microsoft.com/office/powerpoint/2012/main" xmlns:ahyp="http://schemas.microsoft.com/office/drawing/2018/hyperlinkcolor">
+  <p:cSld>
+    <p:spTree>
+      <p:nvGrpSpPr>
+        <p:cNvPr id="138" name="Shape 138"/>
+        <p:cNvGrpSpPr/>
+        <p:nvPr/>
+      </p:nvGrpSpPr>
+      <p:grpSpPr>
+        <a:xfrm>
+          <a:off x="0" y="0"/>
+          <a:ext cx="0" cy="0"/>
+          <a:chOff x="0" y="0"/>
+          <a:chExt cx="0" cy="0"/>
+        </a:xfrm>
+      </p:grpSpPr>
+      <p:pic>
+        <p:nvPicPr>
+          <p:cNvPr id="139" name="Google Shape;139;p30"/>
+          <p:cNvPicPr preferRelativeResize="0"/>
           <p:nvPr/>
-        </p:nvSpPr>
+        </p:nvPicPr>
+        <p:blipFill>
+          <a:blip r:embed="rId3">
+            <a:alphaModFix/>
+          </a:blip>
+          <a:stretch>
+            <a:fillRect/>
+          </a:stretch>
+        </p:blipFill>
         <p:spPr>
           <a:xfrm>
-            <a:off x="152400" y="152400"/>
-            <a:ext cx="3000000" cy="3063000"/>
+            <a:off x="2576513" y="576263"/>
+            <a:ext cx="3990975" cy="3990975"/>
           </a:xfrm>
           <a:prstGeom prst="rect">
             <a:avLst/>
@@ -15711,285 +17747,60 @@
             <a:noFill/>
           </a:ln>
         </p:spPr>
-        <p:txBody>
-          <a:bodyPr anchorCtr="0" anchor="t" bIns="91425" lIns="91425" spcFirstLastPara="1" rIns="91425" wrap="square" tIns="91425">
-            <a:spAutoFit/>
-          </a:bodyPr>
-          <a:lstStyle/>
-          <a:p>
-            <a:pPr indent="0" lvl="0" marL="0" rtl="0" algn="l">
-              <a:spcBef>
-                <a:spcPts val="0"/>
-              </a:spcBef>
-              <a:spcAft>
-                <a:spcPts val="0"/>
-              </a:spcAft>
-              <a:buNone/>
-            </a:pPr>
-            <a:r>
-              <a:rPr lang="en" sz="1100"/>
-              <a:t>1 - Central Minaria</a:t>
-            </a:r>
-            <a:endParaRPr sz="1100"/>
-          </a:p>
-          <a:p>
-            <a:pPr indent="0" lvl="0" marL="0" rtl="0" algn="l">
-              <a:spcBef>
-                <a:spcPts val="0"/>
-              </a:spcBef>
-              <a:spcAft>
-                <a:spcPts val="0"/>
-              </a:spcAft>
-              <a:buNone/>
-            </a:pPr>
-            <a:r>
-              <a:rPr lang="en" sz="1100"/>
-              <a:t>2 - Chauntea</a:t>
-            </a:r>
-            <a:endParaRPr sz="1100"/>
-          </a:p>
-          <a:p>
-            <a:pPr indent="0" lvl="0" marL="0" rtl="0" algn="l">
-              <a:spcBef>
-                <a:spcPts val="0"/>
-              </a:spcBef>
-              <a:spcAft>
-                <a:spcPts val="0"/>
-              </a:spcAft>
-              <a:buNone/>
-            </a:pPr>
-            <a:r>
-              <a:rPr lang="en" sz="1100"/>
-              <a:t>3 - East Side Minaria</a:t>
-            </a:r>
-            <a:endParaRPr sz="1100"/>
-          </a:p>
-          <a:p>
-            <a:pPr indent="0" lvl="0" marL="0" rtl="0" algn="l">
-              <a:spcBef>
-                <a:spcPts val="0"/>
-              </a:spcBef>
-              <a:spcAft>
-                <a:spcPts val="0"/>
-              </a:spcAft>
-              <a:buNone/>
-            </a:pPr>
-            <a:r>
-              <a:rPr lang="en" sz="1100"/>
-              <a:t>4 - Exynn</a:t>
-            </a:r>
-            <a:endParaRPr sz="1100"/>
-          </a:p>
-          <a:p>
-            <a:pPr indent="0" lvl="0" marL="0" rtl="0" algn="l">
-              <a:spcBef>
-                <a:spcPts val="0"/>
-              </a:spcBef>
-              <a:spcAft>
-                <a:spcPts val="0"/>
-              </a:spcAft>
-              <a:buNone/>
-            </a:pPr>
-            <a:r>
-              <a:rPr lang="en" sz="1100"/>
-              <a:t>5 - Flatcoat</a:t>
-            </a:r>
-            <a:endParaRPr sz="1100"/>
-          </a:p>
-          <a:p>
-            <a:pPr indent="0" lvl="0" marL="0" rtl="0" algn="l">
-              <a:spcBef>
-                <a:spcPts val="0"/>
-              </a:spcBef>
-              <a:spcAft>
-                <a:spcPts val="0"/>
-              </a:spcAft>
-              <a:buNone/>
-            </a:pPr>
-            <a:r>
-              <a:rPr lang="en" sz="1100"/>
-              <a:t>6 - Grumbar</a:t>
-            </a:r>
-            <a:endParaRPr sz="1100"/>
-          </a:p>
-          <a:p>
-            <a:pPr indent="0" lvl="0" marL="0" rtl="0" algn="l">
-              <a:spcBef>
-                <a:spcPts val="0"/>
-              </a:spcBef>
-              <a:spcAft>
-                <a:spcPts val="0"/>
-              </a:spcAft>
-              <a:buNone/>
-            </a:pPr>
-            <a:r>
-              <a:rPr lang="en" sz="1100"/>
-              <a:t>7 - Holdfast</a:t>
-            </a:r>
-            <a:endParaRPr sz="1100"/>
-          </a:p>
-          <a:p>
-            <a:pPr indent="0" lvl="0" marL="0" rtl="0" algn="l">
-              <a:spcBef>
-                <a:spcPts val="0"/>
-              </a:spcBef>
-              <a:spcAft>
-                <a:spcPts val="0"/>
-              </a:spcAft>
-              <a:buNone/>
-            </a:pPr>
-            <a:r>
-              <a:rPr lang="en" sz="1100"/>
-              <a:t>8 - Justice Bringers</a:t>
-            </a:r>
-            <a:endParaRPr sz="1100"/>
-          </a:p>
-          <a:p>
-            <a:pPr indent="0" lvl="0" marL="0" rtl="0" algn="l">
-              <a:spcBef>
-                <a:spcPts val="0"/>
-              </a:spcBef>
-              <a:spcAft>
-                <a:spcPts val="0"/>
-              </a:spcAft>
-              <a:buNone/>
-            </a:pPr>
-            <a:r>
-              <a:rPr lang="en" sz="1100"/>
-              <a:t>9 - Kelemvor</a:t>
-            </a:r>
-            <a:endParaRPr sz="1100"/>
-          </a:p>
-          <a:p>
-            <a:pPr indent="0" lvl="0" marL="0" rtl="0" algn="l">
-              <a:spcBef>
-                <a:spcPts val="0"/>
-              </a:spcBef>
-              <a:spcAft>
-                <a:spcPts val="0"/>
-              </a:spcAft>
-              <a:buNone/>
-            </a:pPr>
-            <a:r>
-              <a:rPr lang="en" sz="1100"/>
-              <a:t>10 - Minaria</a:t>
-            </a:r>
-            <a:endParaRPr sz="1100"/>
-          </a:p>
-          <a:p>
-            <a:pPr indent="0" lvl="0" marL="0" rtl="0" algn="l">
-              <a:spcBef>
-                <a:spcPts val="0"/>
-              </a:spcBef>
-              <a:spcAft>
-                <a:spcPts val="0"/>
-              </a:spcAft>
-              <a:buNone/>
-            </a:pPr>
-            <a:r>
-              <a:rPr lang="en" sz="1100"/>
-              <a:t>11 - Myrkul</a:t>
-            </a:r>
-            <a:endParaRPr sz="1100"/>
-          </a:p>
-          <a:p>
-            <a:pPr indent="0" lvl="0" marL="0" rtl="0" algn="l">
-              <a:spcBef>
-                <a:spcPts val="0"/>
-              </a:spcBef>
-              <a:spcAft>
-                <a:spcPts val="0"/>
-              </a:spcAft>
-              <a:buNone/>
-            </a:pPr>
-            <a:r>
-              <a:rPr lang="en" sz="1100"/>
-              <a:t>12 - Talos</a:t>
-            </a:r>
-            <a:endParaRPr sz="1100"/>
-          </a:p>
-          <a:p>
-            <a:pPr indent="0" lvl="0" marL="0" rtl="0" algn="l">
-              <a:spcBef>
-                <a:spcPts val="0"/>
-              </a:spcBef>
-              <a:spcAft>
-                <a:spcPts val="0"/>
-              </a:spcAft>
-              <a:buNone/>
-            </a:pPr>
-            <a:r>
-              <a:rPr lang="en" sz="1100"/>
-              <a:t>13 - Veronna</a:t>
-            </a:r>
-            <a:endParaRPr sz="1100"/>
-          </a:p>
-          <a:p>
-            <a:pPr indent="0" lvl="0" marL="0" rtl="0" algn="l">
-              <a:spcBef>
-                <a:spcPts val="0"/>
-              </a:spcBef>
-              <a:spcAft>
-                <a:spcPts val="0"/>
-              </a:spcAft>
-              <a:buNone/>
-            </a:pPr>
-            <a:r>
-              <a:rPr lang="en" sz="1100"/>
-              <a:t>14 - West Side Minaria</a:t>
-            </a:r>
-            <a:endParaRPr sz="1100"/>
-          </a:p>
-          <a:p>
-            <a:pPr indent="0" lvl="0" marL="0" rtl="0" algn="l">
-              <a:spcBef>
-                <a:spcPts val="0"/>
-              </a:spcBef>
-              <a:spcAft>
-                <a:spcPts val="0"/>
-              </a:spcAft>
-              <a:buNone/>
-            </a:pPr>
-            <a:r>
-              <a:rPr lang="en" sz="1100"/>
-              <a:t>15 - Zehir</a:t>
-            </a:r>
-            <a:endParaRPr sz="1100"/>
-          </a:p>
-          <a:p>
-            <a:pPr indent="0" lvl="0" marL="0" rtl="0" algn="l">
-              <a:spcBef>
-                <a:spcPts val="0"/>
-              </a:spcBef>
-              <a:spcAft>
-                <a:spcPts val="0"/>
-              </a:spcAft>
-              <a:buNone/>
-            </a:pPr>
-            <a:r>
-              <a:rPr lang="en" sz="1100"/>
-              <a:t>16 - Hadaar</a:t>
-            </a:r>
-            <a:endParaRPr sz="1100"/>
-          </a:p>
-          <a:p>
-            <a:pPr indent="0" lvl="0" marL="0" rtl="0" algn="l">
-              <a:spcBef>
-                <a:spcPts val="0"/>
-              </a:spcBef>
-              <a:spcAft>
-                <a:spcPts val="0"/>
-              </a:spcAft>
-              <a:buNone/>
-            </a:pPr>
-            <a:r>
-              <a:rPr lang="en" sz="1100"/>
-              <a:t>17 - Laughing Knives</a:t>
-            </a:r>
-            <a:endParaRPr/>
-          </a:p>
-        </p:txBody>
-      </p:sp>
+      </p:pic>
+    </p:spTree>
+  </p:cSld>
+  <p:clrMapOvr>
+    <a:masterClrMapping/>
+  </p:clrMapOvr>
+</p:sld>
+</file>
+
+<file path=ppt/slides/slide19.xml><?xml version="1.0" encoding="utf-8"?>
+<p:sld xmlns:a="http://schemas.openxmlformats.org/drawingml/2006/main" xmlns:r="http://schemas.openxmlformats.org/officeDocument/2006/relationships" xmlns:mc="http://schemas.openxmlformats.org/markup-compatibility/2006" xmlns:mv="urn:schemas-microsoft-com:mac:vml" xmlns:p="http://schemas.openxmlformats.org/presentationml/2006/main" xmlns:c="http://schemas.openxmlformats.org/drawingml/2006/chart" xmlns:dgm="http://schemas.openxmlformats.org/drawingml/2006/diagram" xmlns:o="urn:schemas-microsoft-com:office:office" xmlns:v="urn:schemas-microsoft-com:vml" xmlns:pvml="urn:schemas-microsoft-com:office:powerpoint" xmlns:com="http://schemas.openxmlformats.org/drawingml/2006/compatibility" xmlns:p14="http://schemas.microsoft.com/office/powerpoint/2010/main" xmlns:p15="http://schemas.microsoft.com/office/powerpoint/2012/main" xmlns:ahyp="http://schemas.microsoft.com/office/drawing/2018/hyperlinkcolor">
+  <p:cSld>
+    <p:spTree>
+      <p:nvGrpSpPr>
+        <p:cNvPr id="143" name="Shape 143"/>
+        <p:cNvGrpSpPr/>
+        <p:nvPr/>
+      </p:nvGrpSpPr>
+      <p:grpSpPr>
+        <a:xfrm>
+          <a:off x="0" y="0"/>
+          <a:ext cx="0" cy="0"/>
+          <a:chOff x="0" y="0"/>
+          <a:chExt cx="0" cy="0"/>
+        </a:xfrm>
+      </p:grpSpPr>
+      <p:pic>
+        <p:nvPicPr>
+          <p:cNvPr id="144" name="Google Shape;144;p31"/>
+          <p:cNvPicPr preferRelativeResize="0"/>
+          <p:nvPr/>
+        </p:nvPicPr>
+        <p:blipFill>
+          <a:blip r:embed="rId3">
+            <a:alphaModFix/>
+          </a:blip>
+          <a:stretch>
+            <a:fillRect/>
+          </a:stretch>
+        </p:blipFill>
+        <p:spPr>
+          <a:xfrm>
+            <a:off x="2576513" y="576263"/>
+            <a:ext cx="3990975" cy="3990975"/>
+          </a:xfrm>
+          <a:prstGeom prst="rect">
+            <a:avLst/>
+          </a:prstGeom>
+          <a:noFill/>
+          <a:ln>
+            <a:noFill/>
+          </a:ln>
+        </p:spPr>
+      </p:pic>
     </p:spTree>
   </p:cSld>
   <p:clrMapOvr>
@@ -16018,6 +17829,59 @@
       <p:pic>
         <p:nvPicPr>
           <p:cNvPr id="59" name="Google Shape;59;p14"/>
+          <p:cNvPicPr preferRelativeResize="0"/>
+          <p:nvPr/>
+        </p:nvPicPr>
+        <p:blipFill>
+          <a:blip r:embed="rId3">
+            <a:alphaModFix/>
+          </a:blip>
+          <a:stretch>
+            <a:fillRect/>
+          </a:stretch>
+        </p:blipFill>
+        <p:spPr>
+          <a:xfrm>
+            <a:off x="2576513" y="576263"/>
+            <a:ext cx="3990975" cy="3990975"/>
+          </a:xfrm>
+          <a:prstGeom prst="rect">
+            <a:avLst/>
+          </a:prstGeom>
+          <a:noFill/>
+          <a:ln>
+            <a:noFill/>
+          </a:ln>
+        </p:spPr>
+      </p:pic>
+    </p:spTree>
+  </p:cSld>
+  <p:clrMapOvr>
+    <a:masterClrMapping/>
+  </p:clrMapOvr>
+</p:sld>
+</file>
+
+<file path=ppt/slides/slide20.xml><?xml version="1.0" encoding="utf-8"?>
+<p:sld xmlns:a="http://schemas.openxmlformats.org/drawingml/2006/main" xmlns:r="http://schemas.openxmlformats.org/officeDocument/2006/relationships" xmlns:mc="http://schemas.openxmlformats.org/markup-compatibility/2006" xmlns:mv="urn:schemas-microsoft-com:mac:vml" xmlns:p="http://schemas.openxmlformats.org/presentationml/2006/main" xmlns:c="http://schemas.openxmlformats.org/drawingml/2006/chart" xmlns:dgm="http://schemas.openxmlformats.org/drawingml/2006/diagram" xmlns:o="urn:schemas-microsoft-com:office:office" xmlns:v="urn:schemas-microsoft-com:vml" xmlns:pvml="urn:schemas-microsoft-com:office:powerpoint" xmlns:com="http://schemas.openxmlformats.org/drawingml/2006/compatibility" xmlns:p14="http://schemas.microsoft.com/office/powerpoint/2010/main" xmlns:p15="http://schemas.microsoft.com/office/powerpoint/2012/main" xmlns:ahyp="http://schemas.microsoft.com/office/drawing/2018/hyperlinkcolor">
+  <p:cSld>
+    <p:spTree>
+      <p:nvGrpSpPr>
+        <p:cNvPr id="148" name="Shape 148"/>
+        <p:cNvGrpSpPr/>
+        <p:nvPr/>
+      </p:nvGrpSpPr>
+      <p:grpSpPr>
+        <a:xfrm>
+          <a:off x="0" y="0"/>
+          <a:ext cx="0" cy="0"/>
+          <a:chOff x="0" y="0"/>
+          <a:chExt cx="0" cy="0"/>
+        </a:xfrm>
+      </p:grpSpPr>
+      <p:pic>
+        <p:nvPicPr>
+          <p:cNvPr id="149" name="Google Shape;149;p32"/>
           <p:cNvPicPr preferRelativeResize="0"/>
           <p:nvPr/>
         </p:nvPicPr>
@@ -16422,6 +18286,285 @@
 </file>
 
 <file path=ppt/theme/theme1.xml><?xml version="1.0" encoding="utf-8"?>
+<a:theme xmlns:a="http://schemas.openxmlformats.org/drawingml/2006/main" xmlns:r="http://schemas.openxmlformats.org/officeDocument/2006/relationships" name="Simple Dark">
+  <a:themeElements>
+    <a:clrScheme name="Simple Dark">
+      <a:dk1>
+        <a:srgbClr val="FFFFFF"/>
+      </a:dk1>
+      <a:lt1>
+        <a:srgbClr val="212121"/>
+      </a:lt1>
+      <a:dk2>
+        <a:srgbClr val="303030"/>
+      </a:dk2>
+      <a:lt2>
+        <a:srgbClr val="ADADAD"/>
+      </a:lt2>
+      <a:accent1>
+        <a:srgbClr val="009688"/>
+      </a:accent1>
+      <a:accent2>
+        <a:srgbClr val="EEEEEE"/>
+      </a:accent2>
+      <a:accent3>
+        <a:srgbClr val="78909C"/>
+      </a:accent3>
+      <a:accent4>
+        <a:srgbClr val="FFAB40"/>
+      </a:accent4>
+      <a:accent5>
+        <a:srgbClr val="4DD0E1"/>
+      </a:accent5>
+      <a:accent6>
+        <a:srgbClr val="EEFF41"/>
+      </a:accent6>
+      <a:hlink>
+        <a:srgbClr val="4DD0E1"/>
+      </a:hlink>
+      <a:folHlink>
+        <a:srgbClr val="4DD0E1"/>
+      </a:folHlink>
+    </a:clrScheme>
+    <a:fontScheme name="Office">
+      <a:majorFont>
+        <a:latin typeface="Arial"/>
+        <a:ea typeface=""/>
+        <a:cs typeface=""/>
+        <a:font script="Jpan" typeface="ＭＳ Ｐゴシック"/>
+        <a:font script="Hang" typeface="맑은 고딕"/>
+        <a:font script="Hans" typeface="宋体"/>
+        <a:font script="Hant" typeface="新細明體"/>
+        <a:font script="Arab" typeface="Times New Roman"/>
+        <a:font script="Hebr" typeface="Times New Roman"/>
+        <a:font script="Thai" typeface="Angsana New"/>
+        <a:font script="Ethi" typeface="Nyala"/>
+        <a:font script="Beng" typeface="Vrinda"/>
+        <a:font script="Gujr" typeface="Shruti"/>
+        <a:font script="Khmr" typeface="MoolBoran"/>
+        <a:font script="Knda" typeface="Tunga"/>
+        <a:font script="Guru" typeface="Raavi"/>
+        <a:font script="Cans" typeface="Euphemia"/>
+        <a:font script="Cher" typeface="Plantagenet Cherokee"/>
+        <a:font script="Yiii" typeface="Microsoft Yi Baiti"/>
+        <a:font script="Tibt" typeface="Microsoft Himalaya"/>
+        <a:font script="Thaa" typeface="MV Boli"/>
+        <a:font script="Deva" typeface="Mangal"/>
+        <a:font script="Telu" typeface="Gautami"/>
+        <a:font script="Taml" typeface="Latha"/>
+        <a:font script="Syrc" typeface="Estrangelo Edessa"/>
+        <a:font script="Orya" typeface="Kalinga"/>
+        <a:font script="Mlym" typeface="Kartika"/>
+        <a:font script="Laoo" typeface="DokChampa"/>
+        <a:font script="Sinh" typeface="Iskoola Pota"/>
+        <a:font script="Mong" typeface="Mongolian Baiti"/>
+        <a:font script="Viet" typeface="Times New Roman"/>
+        <a:font script="Uigh" typeface="Microsoft Uighur"/>
+        <a:font script="Geor" typeface="Sylfaen"/>
+      </a:majorFont>
+      <a:minorFont>
+        <a:latin typeface="Arial"/>
+        <a:ea typeface=""/>
+        <a:cs typeface=""/>
+        <a:font script="Jpan" typeface="ＭＳ Ｐゴシック"/>
+        <a:font script="Hang" typeface="맑은 고딕"/>
+        <a:font script="Hans" typeface="宋体"/>
+        <a:font script="Hant" typeface="新細明體"/>
+        <a:font script="Arab" typeface="Arial"/>
+        <a:font script="Hebr" typeface="Arial"/>
+        <a:font script="Thai" typeface="Cordia New"/>
+        <a:font script="Ethi" typeface="Nyala"/>
+        <a:font script="Beng" typeface="Vrinda"/>
+        <a:font script="Gujr" typeface="Shruti"/>
+        <a:font script="Khmr" typeface="DaunPenh"/>
+        <a:font script="Knda" typeface="Tunga"/>
+        <a:font script="Guru" typeface="Raavi"/>
+        <a:font script="Cans" typeface="Euphemia"/>
+        <a:font script="Cher" typeface="Plantagenet Cherokee"/>
+        <a:font script="Yiii" typeface="Microsoft Yi Baiti"/>
+        <a:font script="Tibt" typeface="Microsoft Himalaya"/>
+        <a:font script="Thaa" typeface="MV Boli"/>
+        <a:font script="Deva" typeface="Mangal"/>
+        <a:font script="Telu" typeface="Gautami"/>
+        <a:font script="Taml" typeface="Latha"/>
+        <a:font script="Syrc" typeface="Estrangelo Edessa"/>
+        <a:font script="Orya" typeface="Kalinga"/>
+        <a:font script="Mlym" typeface="Kartika"/>
+        <a:font script="Laoo" typeface="DokChampa"/>
+        <a:font script="Sinh" typeface="Iskoola Pota"/>
+        <a:font script="Mong" typeface="Mongolian Baiti"/>
+        <a:font script="Viet" typeface="Arial"/>
+        <a:font script="Uigh" typeface="Microsoft Uighur"/>
+        <a:font script="Geor" typeface="Sylfaen"/>
+      </a:minorFont>
+    </a:fontScheme>
+    <a:fmtScheme name="Office">
+      <a:fillStyleLst>
+        <a:solidFill>
+          <a:schemeClr val="phClr"/>
+        </a:solidFill>
+        <a:gradFill rotWithShape="1">
+          <a:gsLst>
+            <a:gs pos="0">
+              <a:schemeClr val="phClr">
+                <a:tint val="50000"/>
+                <a:satMod val="300000"/>
+              </a:schemeClr>
+            </a:gs>
+            <a:gs pos="35000">
+              <a:schemeClr val="phClr">
+                <a:tint val="37000"/>
+                <a:satMod val="300000"/>
+              </a:schemeClr>
+            </a:gs>
+            <a:gs pos="100000">
+              <a:schemeClr val="phClr">
+                <a:tint val="15000"/>
+                <a:satMod val="350000"/>
+              </a:schemeClr>
+            </a:gs>
+          </a:gsLst>
+          <a:lin ang="16200000" scaled="1"/>
+        </a:gradFill>
+        <a:gradFill rotWithShape="1">
+          <a:gsLst>
+            <a:gs pos="0">
+              <a:schemeClr val="phClr">
+                <a:tint val="100000"/>
+                <a:shade val="100000"/>
+                <a:satMod val="130000"/>
+              </a:schemeClr>
+            </a:gs>
+            <a:gs pos="100000">
+              <a:schemeClr val="phClr">
+                <a:tint val="50000"/>
+                <a:shade val="100000"/>
+                <a:satMod val="350000"/>
+              </a:schemeClr>
+            </a:gs>
+          </a:gsLst>
+          <a:lin ang="16200000" scaled="0"/>
+        </a:gradFill>
+      </a:fillStyleLst>
+      <a:lnStyleLst>
+        <a:ln w="9525" cap="flat" cmpd="sng" algn="ctr">
+          <a:solidFill>
+            <a:schemeClr val="phClr">
+              <a:shade val="95000"/>
+              <a:satMod val="105000"/>
+            </a:schemeClr>
+          </a:solidFill>
+          <a:prstDash val="solid"/>
+        </a:ln>
+        <a:ln w="25400" cap="flat" cmpd="sng" algn="ctr">
+          <a:solidFill>
+            <a:schemeClr val="phClr"/>
+          </a:solidFill>
+          <a:prstDash val="solid"/>
+        </a:ln>
+        <a:ln w="38100" cap="flat" cmpd="sng" algn="ctr">
+          <a:solidFill>
+            <a:schemeClr val="phClr"/>
+          </a:solidFill>
+          <a:prstDash val="solid"/>
+        </a:ln>
+      </a:lnStyleLst>
+      <a:effectStyleLst>
+        <a:effectStyle>
+          <a:effectLst>
+            <a:outerShdw blurRad="40000" dist="20000" dir="5400000" rotWithShape="0">
+              <a:srgbClr val="000000">
+                <a:alpha val="38000"/>
+              </a:srgbClr>
+            </a:outerShdw>
+          </a:effectLst>
+        </a:effectStyle>
+        <a:effectStyle>
+          <a:effectLst>
+            <a:outerShdw blurRad="40000" dist="23000" dir="5400000" rotWithShape="0">
+              <a:srgbClr val="000000">
+                <a:alpha val="35000"/>
+              </a:srgbClr>
+            </a:outerShdw>
+          </a:effectLst>
+        </a:effectStyle>
+        <a:effectStyle>
+          <a:effectLst>
+            <a:outerShdw blurRad="40000" dist="23000" dir="5400000" rotWithShape="0">
+              <a:srgbClr val="000000">
+                <a:alpha val="35000"/>
+              </a:srgbClr>
+            </a:outerShdw>
+          </a:effectLst>
+          <a:scene3d>
+            <a:camera prst="orthographicFront">
+              <a:rot lat="0" lon="0" rev="0"/>
+            </a:camera>
+            <a:lightRig rig="threePt" dir="t">
+              <a:rot lat="0" lon="0" rev="1200000"/>
+            </a:lightRig>
+          </a:scene3d>
+          <a:sp3d>
+            <a:bevelT w="63500" h="25400"/>
+          </a:sp3d>
+        </a:effectStyle>
+      </a:effectStyleLst>
+      <a:bgFillStyleLst>
+        <a:solidFill>
+          <a:schemeClr val="phClr"/>
+        </a:solidFill>
+        <a:gradFill rotWithShape="1">
+          <a:gsLst>
+            <a:gs pos="0">
+              <a:schemeClr val="phClr">
+                <a:tint val="40000"/>
+                <a:satMod val="350000"/>
+              </a:schemeClr>
+            </a:gs>
+            <a:gs pos="40000">
+              <a:schemeClr val="phClr">
+                <a:tint val="45000"/>
+                <a:shade val="99000"/>
+                <a:satMod val="350000"/>
+              </a:schemeClr>
+            </a:gs>
+            <a:gs pos="100000">
+              <a:schemeClr val="phClr">
+                <a:shade val="20000"/>
+                <a:satMod val="255000"/>
+              </a:schemeClr>
+            </a:gs>
+          </a:gsLst>
+          <a:path path="circle">
+            <a:fillToRect l="50000" t="-80000" r="50000" b="180000"/>
+          </a:path>
+        </a:gradFill>
+        <a:gradFill rotWithShape="1">
+          <a:gsLst>
+            <a:gs pos="0">
+              <a:schemeClr val="phClr">
+                <a:tint val="80000"/>
+                <a:satMod val="300000"/>
+              </a:schemeClr>
+            </a:gs>
+            <a:gs pos="100000">
+              <a:schemeClr val="phClr">
+                <a:shade val="30000"/>
+                <a:satMod val="200000"/>
+              </a:schemeClr>
+            </a:gs>
+          </a:gsLst>
+          <a:path path="circle">
+            <a:fillToRect l="50000" t="50000" r="50000" b="50000"/>
+          </a:path>
+        </a:gradFill>
+      </a:bgFillStyleLst>
+    </a:fmtScheme>
+  </a:themeElements>
+</a:theme>
+</file>
+
+<file path=ppt/theme/theme2.xml><?xml version="1.0" encoding="utf-8"?>
 <a:theme xmlns:a="http://schemas.openxmlformats.org/drawingml/2006/main" xmlns:r="http://schemas.openxmlformats.org/officeDocument/2006/relationships">
   <a:themeElements>
     <a:clrScheme name="Default">
@@ -16698,283 +18841,4 @@
     </a:fmtScheme>
   </a:themeElements>
 </a:theme>
-</file>
-
-<file path=ppt/theme/theme2.xml><?xml version="1.0" encoding="utf-8"?>
-<a:theme xmlns:a="http://schemas.openxmlformats.org/drawingml/2006/main" xmlns:r="http://schemas.openxmlformats.org/officeDocument/2006/relationships" name="Simple Dark">
-  <a:themeElements>
-    <a:clrScheme name="Simple Dark">
-      <a:dk1>
-        <a:srgbClr val="FFFFFF"/>
-      </a:dk1>
-      <a:lt1>
-        <a:srgbClr val="212121"/>
-      </a:lt1>
-      <a:dk2>
-        <a:srgbClr val="303030"/>
-      </a:dk2>
-      <a:lt2>
-        <a:srgbClr val="ADADAD"/>
-      </a:lt2>
-      <a:accent1>
-        <a:srgbClr val="009688"/>
-      </a:accent1>
-      <a:accent2>
-        <a:srgbClr val="EEEEEE"/>
-      </a:accent2>
-      <a:accent3>
-        <a:srgbClr val="78909C"/>
-      </a:accent3>
-      <a:accent4>
-        <a:srgbClr val="FFAB40"/>
-      </a:accent4>
-      <a:accent5>
-        <a:srgbClr val="4DD0E1"/>
-      </a:accent5>
-      <a:accent6>
-        <a:srgbClr val="EEFF41"/>
-      </a:accent6>
-      <a:hlink>
-        <a:srgbClr val="4DD0E1"/>
-      </a:hlink>
-      <a:folHlink>
-        <a:srgbClr val="4DD0E1"/>
-      </a:folHlink>
-    </a:clrScheme>
-    <a:fontScheme name="Office">
-      <a:majorFont>
-        <a:latin typeface="Arial"/>
-        <a:ea typeface=""/>
-        <a:cs typeface=""/>
-        <a:font script="Jpan" typeface="ＭＳ Ｐゴシック"/>
-        <a:font script="Hang" typeface="맑은 고딕"/>
-        <a:font script="Hans" typeface="宋体"/>
-        <a:font script="Hant" typeface="新細明體"/>
-        <a:font script="Arab" typeface="Times New Roman"/>
-        <a:font script="Hebr" typeface="Times New Roman"/>
-        <a:font script="Thai" typeface="Angsana New"/>
-        <a:font script="Ethi" typeface="Nyala"/>
-        <a:font script="Beng" typeface="Vrinda"/>
-        <a:font script="Gujr" typeface="Shruti"/>
-        <a:font script="Khmr" typeface="MoolBoran"/>
-        <a:font script="Knda" typeface="Tunga"/>
-        <a:font script="Guru" typeface="Raavi"/>
-        <a:font script="Cans" typeface="Euphemia"/>
-        <a:font script="Cher" typeface="Plantagenet Cherokee"/>
-        <a:font script="Yiii" typeface="Microsoft Yi Baiti"/>
-        <a:font script="Tibt" typeface="Microsoft Himalaya"/>
-        <a:font script="Thaa" typeface="MV Boli"/>
-        <a:font script="Deva" typeface="Mangal"/>
-        <a:font script="Telu" typeface="Gautami"/>
-        <a:font script="Taml" typeface="Latha"/>
-        <a:font script="Syrc" typeface="Estrangelo Edessa"/>
-        <a:font script="Orya" typeface="Kalinga"/>
-        <a:font script="Mlym" typeface="Kartika"/>
-        <a:font script="Laoo" typeface="DokChampa"/>
-        <a:font script="Sinh" typeface="Iskoola Pota"/>
-        <a:font script="Mong" typeface="Mongolian Baiti"/>
-        <a:font script="Viet" typeface="Times New Roman"/>
-        <a:font script="Uigh" typeface="Microsoft Uighur"/>
-        <a:font script="Geor" typeface="Sylfaen"/>
-      </a:majorFont>
-      <a:minorFont>
-        <a:latin typeface="Arial"/>
-        <a:ea typeface=""/>
-        <a:cs typeface=""/>
-        <a:font script="Jpan" typeface="ＭＳ Ｐゴシック"/>
-        <a:font script="Hang" typeface="맑은 고딕"/>
-        <a:font script="Hans" typeface="宋体"/>
-        <a:font script="Hant" typeface="新細明體"/>
-        <a:font script="Arab" typeface="Arial"/>
-        <a:font script="Hebr" typeface="Arial"/>
-        <a:font script="Thai" typeface="Cordia New"/>
-        <a:font script="Ethi" typeface="Nyala"/>
-        <a:font script="Beng" typeface="Vrinda"/>
-        <a:font script="Gujr" typeface="Shruti"/>
-        <a:font script="Khmr" typeface="DaunPenh"/>
-        <a:font script="Knda" typeface="Tunga"/>
-        <a:font script="Guru" typeface="Raavi"/>
-        <a:font script="Cans" typeface="Euphemia"/>
-        <a:font script="Cher" typeface="Plantagenet Cherokee"/>
-        <a:font script="Yiii" typeface="Microsoft Yi Baiti"/>
-        <a:font script="Tibt" typeface="Microsoft Himalaya"/>
-        <a:font script="Thaa" typeface="MV Boli"/>
-        <a:font script="Deva" typeface="Mangal"/>
-        <a:font script="Telu" typeface="Gautami"/>
-        <a:font script="Taml" typeface="Latha"/>
-        <a:font script="Syrc" typeface="Estrangelo Edessa"/>
-        <a:font script="Orya" typeface="Kalinga"/>
-        <a:font script="Mlym" typeface="Kartika"/>
-        <a:font script="Laoo" typeface="DokChampa"/>
-        <a:font script="Sinh" typeface="Iskoola Pota"/>
-        <a:font script="Mong" typeface="Mongolian Baiti"/>
-        <a:font script="Viet" typeface="Arial"/>
-        <a:font script="Uigh" typeface="Microsoft Uighur"/>
-        <a:font script="Geor" typeface="Sylfaen"/>
-      </a:minorFont>
-    </a:fontScheme>
-    <a:fmtScheme name="Office">
-      <a:fillStyleLst>
-        <a:solidFill>
-          <a:schemeClr val="phClr"/>
-        </a:solidFill>
-        <a:gradFill rotWithShape="1">
-          <a:gsLst>
-            <a:gs pos="0">
-              <a:schemeClr val="phClr">
-                <a:tint val="50000"/>
-                <a:satMod val="300000"/>
-              </a:schemeClr>
-            </a:gs>
-            <a:gs pos="35000">
-              <a:schemeClr val="phClr">
-                <a:tint val="37000"/>
-                <a:satMod val="300000"/>
-              </a:schemeClr>
-            </a:gs>
-            <a:gs pos="100000">
-              <a:schemeClr val="phClr">
-                <a:tint val="15000"/>
-                <a:satMod val="350000"/>
-              </a:schemeClr>
-            </a:gs>
-          </a:gsLst>
-          <a:lin ang="16200000" scaled="1"/>
-        </a:gradFill>
-        <a:gradFill rotWithShape="1">
-          <a:gsLst>
-            <a:gs pos="0">
-              <a:schemeClr val="phClr">
-                <a:tint val="100000"/>
-                <a:shade val="100000"/>
-                <a:satMod val="130000"/>
-              </a:schemeClr>
-            </a:gs>
-            <a:gs pos="100000">
-              <a:schemeClr val="phClr">
-                <a:tint val="50000"/>
-                <a:shade val="100000"/>
-                <a:satMod val="350000"/>
-              </a:schemeClr>
-            </a:gs>
-          </a:gsLst>
-          <a:lin ang="16200000" scaled="0"/>
-        </a:gradFill>
-      </a:fillStyleLst>
-      <a:lnStyleLst>
-        <a:ln w="9525" cap="flat" cmpd="sng" algn="ctr">
-          <a:solidFill>
-            <a:schemeClr val="phClr">
-              <a:shade val="95000"/>
-              <a:satMod val="105000"/>
-            </a:schemeClr>
-          </a:solidFill>
-          <a:prstDash val="solid"/>
-        </a:ln>
-        <a:ln w="25400" cap="flat" cmpd="sng" algn="ctr">
-          <a:solidFill>
-            <a:schemeClr val="phClr"/>
-          </a:solidFill>
-          <a:prstDash val="solid"/>
-        </a:ln>
-        <a:ln w="38100" cap="flat" cmpd="sng" algn="ctr">
-          <a:solidFill>
-            <a:schemeClr val="phClr"/>
-          </a:solidFill>
-          <a:prstDash val="solid"/>
-        </a:ln>
-      </a:lnStyleLst>
-      <a:effectStyleLst>
-        <a:effectStyle>
-          <a:effectLst>
-            <a:outerShdw blurRad="40000" dist="20000" dir="5400000" rotWithShape="0">
-              <a:srgbClr val="000000">
-                <a:alpha val="38000"/>
-              </a:srgbClr>
-            </a:outerShdw>
-          </a:effectLst>
-        </a:effectStyle>
-        <a:effectStyle>
-          <a:effectLst>
-            <a:outerShdw blurRad="40000" dist="23000" dir="5400000" rotWithShape="0">
-              <a:srgbClr val="000000">
-                <a:alpha val="35000"/>
-              </a:srgbClr>
-            </a:outerShdw>
-          </a:effectLst>
-        </a:effectStyle>
-        <a:effectStyle>
-          <a:effectLst>
-            <a:outerShdw blurRad="40000" dist="23000" dir="5400000" rotWithShape="0">
-              <a:srgbClr val="000000">
-                <a:alpha val="35000"/>
-              </a:srgbClr>
-            </a:outerShdw>
-          </a:effectLst>
-          <a:scene3d>
-            <a:camera prst="orthographicFront">
-              <a:rot lat="0" lon="0" rev="0"/>
-            </a:camera>
-            <a:lightRig rig="threePt" dir="t">
-              <a:rot lat="0" lon="0" rev="1200000"/>
-            </a:lightRig>
-          </a:scene3d>
-          <a:sp3d>
-            <a:bevelT w="63500" h="25400"/>
-          </a:sp3d>
-        </a:effectStyle>
-      </a:effectStyleLst>
-      <a:bgFillStyleLst>
-        <a:solidFill>
-          <a:schemeClr val="phClr"/>
-        </a:solidFill>
-        <a:gradFill rotWithShape="1">
-          <a:gsLst>
-            <a:gs pos="0">
-              <a:schemeClr val="phClr">
-                <a:tint val="40000"/>
-                <a:satMod val="350000"/>
-              </a:schemeClr>
-            </a:gs>
-            <a:gs pos="40000">
-              <a:schemeClr val="phClr">
-                <a:tint val="45000"/>
-                <a:shade val="99000"/>
-                <a:satMod val="350000"/>
-              </a:schemeClr>
-            </a:gs>
-            <a:gs pos="100000">
-              <a:schemeClr val="phClr">
-                <a:shade val="20000"/>
-                <a:satMod val="255000"/>
-              </a:schemeClr>
-            </a:gs>
-          </a:gsLst>
-          <a:path path="circle">
-            <a:fillToRect l="50000" t="-80000" r="50000" b="180000"/>
-          </a:path>
-        </a:gradFill>
-        <a:gradFill rotWithShape="1">
-          <a:gsLst>
-            <a:gs pos="0">
-              <a:schemeClr val="phClr">
-                <a:tint val="80000"/>
-                <a:satMod val="300000"/>
-              </a:schemeClr>
-            </a:gs>
-            <a:gs pos="100000">
-              <a:schemeClr val="phClr">
-                <a:shade val="30000"/>
-                <a:satMod val="200000"/>
-              </a:schemeClr>
-            </a:gs>
-          </a:gsLst>
-          <a:path path="circle">
-            <a:fillToRect l="50000" t="50000" r="50000" b="50000"/>
-          </a:path>
-        </a:gradFill>
-      </a:bgFillStyleLst>
-    </a:fmtScheme>
-  </a:themeElements>
-</a:theme>
 </file>
</xml_diff>